<commit_message>
Excel and powerpoint update
</commit_message>
<xml_diff>
--- a/Strassen Multiplication Algorithm.pptx
+++ b/Strassen Multiplication Algorithm.pptx
@@ -12,6 +12,7 @@
     <p:sldId id="260" r:id="rId6"/>
     <p:sldId id="261" r:id="rId7"/>
     <p:sldId id="262" r:id="rId8"/>
+    <p:sldId id="263" r:id="rId9"/>
   </p:sldIdLst>
   <p:sldSz cx="9144000" cy="6858000" type="screen4x3"/>
   <p:notesSz cx="6858000" cy="9144000"/>
@@ -4819,6 +4820,107 @@
 </p:sld>
 </file>
 
+<file path=ppt/slides/slide8.xml><?xml version="1.0" encoding="utf-8"?>
+<p:sld xmlns:a="http://schemas.openxmlformats.org/drawingml/2006/main" xmlns:r="http://schemas.openxmlformats.org/officeDocument/2006/relationships" xmlns:p="http://schemas.openxmlformats.org/presentationml/2006/main">
+  <p:cSld>
+    <p:spTree>
+      <p:nvGrpSpPr>
+        <p:cNvPr id="1" name=""/>
+        <p:cNvGrpSpPr/>
+        <p:nvPr/>
+      </p:nvGrpSpPr>
+      <p:grpSpPr>
+        <a:xfrm>
+          <a:off x="0" y="0"/>
+          <a:ext cx="0" cy="0"/>
+          <a:chOff x="0" y="0"/>
+          <a:chExt cx="0" cy="0"/>
+        </a:xfrm>
+      </p:grpSpPr>
+      <p:sp>
+        <p:nvSpPr>
+          <p:cNvPr id="2" name="Title 1"/>
+          <p:cNvSpPr>
+            <a:spLocks noGrp="1"/>
+          </p:cNvSpPr>
+          <p:nvPr>
+            <p:ph type="title"/>
+          </p:nvPr>
+        </p:nvSpPr>
+        <p:spPr/>
+        <p:txBody>
+          <a:bodyPr/>
+          <a:lstStyle/>
+          <a:p>
+            <a:r>
+              <a:rPr lang="en-US" dirty="0" smtClean="0"/>
+              <a:t>Results</a:t>
+            </a:r>
+            <a:endParaRPr lang="en-US" dirty="0"/>
+          </a:p>
+        </p:txBody>
+      </p:sp>
+      <p:sp>
+        <p:nvSpPr>
+          <p:cNvPr id="3" name="Content Placeholder 2"/>
+          <p:cNvSpPr>
+            <a:spLocks noGrp="1"/>
+          </p:cNvSpPr>
+          <p:nvPr>
+            <p:ph idx="1"/>
+          </p:nvPr>
+        </p:nvSpPr>
+        <p:spPr/>
+        <p:txBody>
+          <a:bodyPr/>
+          <a:lstStyle/>
+          <a:p>
+            <a:r>
+              <a:rPr lang="en-US" dirty="0" smtClean="0"/>
+              <a:t>Significant speedup for large matrices</a:t>
+            </a:r>
+            <a:endParaRPr lang="en-US" dirty="0" smtClean="0"/>
+          </a:p>
+          <a:p>
+            <a:r>
+              <a:rPr lang="en-US" dirty="0" err="1" smtClean="0"/>
+              <a:t>Strassen</a:t>
+            </a:r>
+            <a:r>
+              <a:rPr lang="en-US" dirty="0" smtClean="0"/>
+              <a:t> algorithm slower for smaller matrices</a:t>
+            </a:r>
+          </a:p>
+          <a:p>
+            <a:r>
+              <a:rPr lang="en-US" dirty="0" smtClean="0"/>
+              <a:t>Parallel algorithm is faster than serial one.</a:t>
+            </a:r>
+          </a:p>
+          <a:p>
+            <a:r>
+              <a:rPr lang="en-US" dirty="0" smtClean="0"/>
+              <a:t>Granularity changes for different matrix sizes to avoid memory overflow.</a:t>
+            </a:r>
+          </a:p>
+          <a:p>
+            <a:endParaRPr lang="en-US" dirty="0"/>
+          </a:p>
+        </p:txBody>
+      </p:sp>
+    </p:spTree>
+    <p:extLst>
+      <p:ext uri="{BB962C8B-B14F-4D97-AF65-F5344CB8AC3E}">
+        <p14:creationId xmlns:p14="http://schemas.microsoft.com/office/powerpoint/2010/main" val="2617217995"/>
+      </p:ext>
+    </p:extLst>
+  </p:cSld>
+  <p:clrMapOvr>
+    <a:masterClrMapping/>
+  </p:clrMapOvr>
+</p:sld>
+</file>
+
 <file path=ppt/theme/theme1.xml><?xml version="1.0" encoding="utf-8"?>
 <a:theme xmlns:a="http://schemas.openxmlformats.org/drawingml/2006/main" name="Office Theme">
   <a:themeElements>

</xml_diff>

<commit_message>
Added Nifty transistions to the powerpoint presentation
</commit_message>
<xml_diff>
--- a/Strassen Multiplication Algorithm.pptx
+++ b/Strassen Multiplication Algorithm.pptx
@@ -115,1390 +115,6 @@
     </a:lvl9pPr>
   </p:defaultTextStyle>
 </p:presentation>
-</file>
-
-<file path=ppt/charts/chart1.xml><?xml version="1.0" encoding="utf-8"?>
-<c:chartSpace xmlns:c="http://schemas.openxmlformats.org/drawingml/2006/chart" xmlns:a="http://schemas.openxmlformats.org/drawingml/2006/main" xmlns:r="http://schemas.openxmlformats.org/officeDocument/2006/relationships">
-  <c:date1904 val="0"/>
-  <c:lang val="en-US"/>
-  <c:roundedCorners val="0"/>
-  <mc:AlternateContent xmlns:mc="http://schemas.openxmlformats.org/markup-compatibility/2006">
-    <mc:Choice xmlns:c14="http://schemas.microsoft.com/office/drawing/2007/8/2/chart" Requires="c14">
-      <c14:style val="102"/>
-    </mc:Choice>
-    <mc:Fallback>
-      <c:style val="2"/>
-    </mc:Fallback>
-  </mc:AlternateContent>
-  <c:chart>
-    <c:title>
-      <c:tx>
-        <c:rich>
-          <a:bodyPr/>
-          <a:lstStyle/>
-          <a:p>
-            <a:pPr>
-              <a:defRPr sz="2400" baseline="0"/>
-            </a:pPr>
-            <a:r>
-              <a:rPr lang="en-US" sz="2400" baseline="0"/>
-              <a:t>Strassen algorithm vs Triple loop</a:t>
-            </a:r>
-          </a:p>
-        </c:rich>
-      </c:tx>
-      <c:layout/>
-      <c:overlay val="0"/>
-    </c:title>
-    <c:autoTitleDeleted val="0"/>
-    <c:plotArea>
-      <c:layout/>
-      <c:scatterChart>
-        <c:scatterStyle val="smoothMarker"/>
-        <c:varyColors val="0"/>
-        <c:ser>
-          <c:idx val="0"/>
-          <c:order val="0"/>
-          <c:tx>
-            <c:v>Strassen 4t</c:v>
-          </c:tx>
-          <c:spPr>
-            <a:ln>
-              <a:solidFill>
-                <a:srgbClr xmlns:mc="http://schemas.openxmlformats.org/markup-compatibility/2006" xmlns:a14="http://schemas.microsoft.com/office/drawing/2010/main" val="C00000" mc:Ignorable=""/>
-              </a:solidFill>
-            </a:ln>
-          </c:spPr>
-          <c:xVal>
-            <c:numRef>
-              <c:f>Sheet1!$B$2:$H$2</c:f>
-              <c:numCache>
-                <c:formatCode>General</c:formatCode>
-                <c:ptCount val="7"/>
-                <c:pt idx="0">
-                  <c:v>64</c:v>
-                </c:pt>
-                <c:pt idx="1">
-                  <c:v>128</c:v>
-                </c:pt>
-                <c:pt idx="2">
-                  <c:v>256</c:v>
-                </c:pt>
-                <c:pt idx="3">
-                  <c:v>512</c:v>
-                </c:pt>
-                <c:pt idx="4">
-                  <c:v>1024</c:v>
-                </c:pt>
-                <c:pt idx="5">
-                  <c:v>2048</c:v>
-                </c:pt>
-                <c:pt idx="6">
-                  <c:v>4096</c:v>
-                </c:pt>
-              </c:numCache>
-            </c:numRef>
-          </c:xVal>
-          <c:yVal>
-            <c:numRef>
-              <c:f>Sheet1!$B$6:$H$6</c:f>
-              <c:numCache>
-                <c:formatCode>General</c:formatCode>
-                <c:ptCount val="7"/>
-                <c:pt idx="0">
-                  <c:v>2.9020000000000001E-3</c:v>
-                </c:pt>
-                <c:pt idx="1">
-                  <c:v>1.9668999999999999E-2</c:v>
-                </c:pt>
-                <c:pt idx="2">
-                  <c:v>5.8347999999999997E-2</c:v>
-                </c:pt>
-                <c:pt idx="3">
-                  <c:v>0.32338499999999998</c:v>
-                </c:pt>
-                <c:pt idx="4">
-                  <c:v>2.1996790000000002</c:v>
-                </c:pt>
-                <c:pt idx="5">
-                  <c:v>15.210084</c:v>
-                </c:pt>
-                <c:pt idx="6">
-                  <c:v>182.46132600000001</c:v>
-                </c:pt>
-              </c:numCache>
-            </c:numRef>
-          </c:yVal>
-          <c:smooth val="1"/>
-        </c:ser>
-        <c:ser>
-          <c:idx val="1"/>
-          <c:order val="1"/>
-          <c:tx>
-            <c:v>Strassen 3t</c:v>
-          </c:tx>
-          <c:spPr>
-            <a:ln>
-              <a:solidFill>
-                <a:schemeClr val="accent3"/>
-              </a:solidFill>
-            </a:ln>
-          </c:spPr>
-          <c:xVal>
-            <c:numRef>
-              <c:f>Sheet1!$B$2:$H$2</c:f>
-              <c:numCache>
-                <c:formatCode>General</c:formatCode>
-                <c:ptCount val="7"/>
-                <c:pt idx="0">
-                  <c:v>64</c:v>
-                </c:pt>
-                <c:pt idx="1">
-                  <c:v>128</c:v>
-                </c:pt>
-                <c:pt idx="2">
-                  <c:v>256</c:v>
-                </c:pt>
-                <c:pt idx="3">
-                  <c:v>512</c:v>
-                </c:pt>
-                <c:pt idx="4">
-                  <c:v>1024</c:v>
-                </c:pt>
-                <c:pt idx="5">
-                  <c:v>2048</c:v>
-                </c:pt>
-                <c:pt idx="6">
-                  <c:v>4096</c:v>
-                </c:pt>
-              </c:numCache>
-            </c:numRef>
-          </c:xVal>
-          <c:yVal>
-            <c:numRef>
-              <c:f>Sheet1!$B$5:$H$5</c:f>
-              <c:numCache>
-                <c:formatCode>General</c:formatCode>
-                <c:ptCount val="7"/>
-                <c:pt idx="0">
-                  <c:v>3.0199999999999997E-3</c:v>
-                </c:pt>
-                <c:pt idx="1">
-                  <c:v>2.0309999999999998E-2</c:v>
-                </c:pt>
-                <c:pt idx="2">
-                  <c:v>6.5093999999999999E-2</c:v>
-                </c:pt>
-                <c:pt idx="3">
-                  <c:v>0.41586299999999998</c:v>
-                </c:pt>
-                <c:pt idx="4">
-                  <c:v>2.8744510000000001</c:v>
-                </c:pt>
-                <c:pt idx="5">
-                  <c:v>20.225168</c:v>
-                </c:pt>
-                <c:pt idx="6">
-                  <c:v>221.195179</c:v>
-                </c:pt>
-              </c:numCache>
-            </c:numRef>
-          </c:yVal>
-          <c:smooth val="1"/>
-        </c:ser>
-        <c:ser>
-          <c:idx val="2"/>
-          <c:order val="2"/>
-          <c:tx>
-            <c:v>Strassen 2t</c:v>
-          </c:tx>
-          <c:spPr>
-            <a:ln>
-              <a:solidFill>
-                <a:schemeClr val="accent6"/>
-              </a:solidFill>
-            </a:ln>
-          </c:spPr>
-          <c:xVal>
-            <c:numRef>
-              <c:f>Sheet1!$B$2:$H$2</c:f>
-              <c:numCache>
-                <c:formatCode>General</c:formatCode>
-                <c:ptCount val="7"/>
-                <c:pt idx="0">
-                  <c:v>64</c:v>
-                </c:pt>
-                <c:pt idx="1">
-                  <c:v>128</c:v>
-                </c:pt>
-                <c:pt idx="2">
-                  <c:v>256</c:v>
-                </c:pt>
-                <c:pt idx="3">
-                  <c:v>512</c:v>
-                </c:pt>
-                <c:pt idx="4">
-                  <c:v>1024</c:v>
-                </c:pt>
-                <c:pt idx="5">
-                  <c:v>2048</c:v>
-                </c:pt>
-                <c:pt idx="6">
-                  <c:v>4096</c:v>
-                </c:pt>
-              </c:numCache>
-            </c:numRef>
-          </c:xVal>
-          <c:yVal>
-            <c:numRef>
-              <c:f>Sheet1!$B$4:$H$4</c:f>
-              <c:numCache>
-                <c:formatCode>General</c:formatCode>
-                <c:ptCount val="7"/>
-                <c:pt idx="0">
-                  <c:v>4.5950000000000001E-3</c:v>
-                </c:pt>
-                <c:pt idx="1">
-                  <c:v>2.2102E-2</c:v>
-                </c:pt>
-                <c:pt idx="2">
-                  <c:v>9.3118999999999993E-2</c:v>
-                </c:pt>
-                <c:pt idx="3">
-                  <c:v>0.56717299999999993</c:v>
-                </c:pt>
-                <c:pt idx="4">
-                  <c:v>4.1615320000000002</c:v>
-                </c:pt>
-                <c:pt idx="5">
-                  <c:v>30.030116</c:v>
-                </c:pt>
-                <c:pt idx="6">
-                  <c:v>315.187275</c:v>
-                </c:pt>
-              </c:numCache>
-            </c:numRef>
-          </c:yVal>
-          <c:smooth val="1"/>
-        </c:ser>
-        <c:ser>
-          <c:idx val="3"/>
-          <c:order val="3"/>
-          <c:tx>
-            <c:v>Strassen 1t</c:v>
-          </c:tx>
-          <c:spPr>
-            <a:ln>
-              <a:solidFill>
-                <a:schemeClr val="accent4"/>
-              </a:solidFill>
-            </a:ln>
-          </c:spPr>
-          <c:xVal>
-            <c:numRef>
-              <c:f>Sheet1!$B$2:$H$2</c:f>
-              <c:numCache>
-                <c:formatCode>General</c:formatCode>
-                <c:ptCount val="7"/>
-                <c:pt idx="0">
-                  <c:v>64</c:v>
-                </c:pt>
-                <c:pt idx="1">
-                  <c:v>128</c:v>
-                </c:pt>
-                <c:pt idx="2">
-                  <c:v>256</c:v>
-                </c:pt>
-                <c:pt idx="3">
-                  <c:v>512</c:v>
-                </c:pt>
-                <c:pt idx="4">
-                  <c:v>1024</c:v>
-                </c:pt>
-                <c:pt idx="5">
-                  <c:v>2048</c:v>
-                </c:pt>
-                <c:pt idx="6">
-                  <c:v>4096</c:v>
-                </c:pt>
-              </c:numCache>
-            </c:numRef>
-          </c:xVal>
-          <c:yVal>
-            <c:numRef>
-              <c:f>Sheet1!$B$3:$H$3</c:f>
-              <c:numCache>
-                <c:formatCode>General</c:formatCode>
-                <c:ptCount val="7"/>
-                <c:pt idx="0">
-                  <c:v>4.6309999999999997E-3</c:v>
-                </c:pt>
-                <c:pt idx="1">
-                  <c:v>2.7961999999999997E-2</c:v>
-                </c:pt>
-                <c:pt idx="2">
-                  <c:v>0.15857599999999999</c:v>
-                </c:pt>
-                <c:pt idx="3">
-                  <c:v>1.049974</c:v>
-                </c:pt>
-                <c:pt idx="4">
-                  <c:v>7.7579570000000002</c:v>
-                </c:pt>
-                <c:pt idx="5">
-                  <c:v>55.477885000000001</c:v>
-                </c:pt>
-                <c:pt idx="6">
-                  <c:v>638.63927899999999</c:v>
-                </c:pt>
-              </c:numCache>
-            </c:numRef>
-          </c:yVal>
-          <c:smooth val="1"/>
-        </c:ser>
-        <c:ser>
-          <c:idx val="4"/>
-          <c:order val="4"/>
-          <c:tx>
-            <c:v>Regular 1t</c:v>
-          </c:tx>
-          <c:spPr>
-            <a:ln>
-              <a:solidFill>
-                <a:schemeClr val="accent4"/>
-              </a:solidFill>
-              <a:prstDash val="sysDot"/>
-            </a:ln>
-          </c:spPr>
-          <c:xVal>
-            <c:numRef>
-              <c:f>Sheet1!$B$9:$H$9</c:f>
-              <c:numCache>
-                <c:formatCode>General</c:formatCode>
-                <c:ptCount val="7"/>
-                <c:pt idx="0">
-                  <c:v>64</c:v>
-                </c:pt>
-                <c:pt idx="1">
-                  <c:v>128</c:v>
-                </c:pt>
-                <c:pt idx="2">
-                  <c:v>256</c:v>
-                </c:pt>
-                <c:pt idx="3">
-                  <c:v>512</c:v>
-                </c:pt>
-                <c:pt idx="4">
-                  <c:v>1024</c:v>
-                </c:pt>
-                <c:pt idx="5">
-                  <c:v>2048</c:v>
-                </c:pt>
-                <c:pt idx="6">
-                  <c:v>4096</c:v>
-                </c:pt>
-              </c:numCache>
-            </c:numRef>
-          </c:xVal>
-          <c:yVal>
-            <c:numRef>
-              <c:f>Sheet1!$B$10:$H$10</c:f>
-              <c:numCache>
-                <c:formatCode>General</c:formatCode>
-                <c:ptCount val="7"/>
-                <c:pt idx="0">
-                  <c:v>4.058E-3</c:v>
-                </c:pt>
-                <c:pt idx="1">
-                  <c:v>1.7877999999999998E-2</c:v>
-                </c:pt>
-                <c:pt idx="2">
-                  <c:v>0.14174499999999998</c:v>
-                </c:pt>
-                <c:pt idx="3">
-                  <c:v>1.2158929999999999</c:v>
-                </c:pt>
-                <c:pt idx="4">
-                  <c:v>11.172612000000001</c:v>
-                </c:pt>
-                <c:pt idx="5">
-                  <c:v>105.337958</c:v>
-                </c:pt>
-                <c:pt idx="6">
-                  <c:v>1084.4397120000001</c:v>
-                </c:pt>
-              </c:numCache>
-            </c:numRef>
-          </c:yVal>
-          <c:smooth val="1"/>
-        </c:ser>
-        <c:ser>
-          <c:idx val="5"/>
-          <c:order val="5"/>
-          <c:tx>
-            <c:v>Regular 2t</c:v>
-          </c:tx>
-          <c:spPr>
-            <a:ln>
-              <a:solidFill>
-                <a:schemeClr val="accent6"/>
-              </a:solidFill>
-              <a:prstDash val="sysDot"/>
-            </a:ln>
-          </c:spPr>
-          <c:marker>
-            <c:spPr>
-              <a:ln cmpd="sng">
-                <a:prstDash val="solid"/>
-              </a:ln>
-            </c:spPr>
-          </c:marker>
-          <c:xVal>
-            <c:numRef>
-              <c:f>Sheet1!$B$9:$H$9</c:f>
-              <c:numCache>
-                <c:formatCode>General</c:formatCode>
-                <c:ptCount val="7"/>
-                <c:pt idx="0">
-                  <c:v>64</c:v>
-                </c:pt>
-                <c:pt idx="1">
-                  <c:v>128</c:v>
-                </c:pt>
-                <c:pt idx="2">
-                  <c:v>256</c:v>
-                </c:pt>
-                <c:pt idx="3">
-                  <c:v>512</c:v>
-                </c:pt>
-                <c:pt idx="4">
-                  <c:v>1024</c:v>
-                </c:pt>
-                <c:pt idx="5">
-                  <c:v>2048</c:v>
-                </c:pt>
-                <c:pt idx="6">
-                  <c:v>4096</c:v>
-                </c:pt>
-              </c:numCache>
-            </c:numRef>
-          </c:xVal>
-          <c:yVal>
-            <c:numRef>
-              <c:f>Sheet1!$B$11:$H$11</c:f>
-              <c:numCache>
-                <c:formatCode>General</c:formatCode>
-                <c:ptCount val="7"/>
-                <c:pt idx="0">
-                  <c:v>2.052E-3</c:v>
-                </c:pt>
-                <c:pt idx="1">
-                  <c:v>1.4022999999999999E-2</c:v>
-                </c:pt>
-                <c:pt idx="2">
-                  <c:v>7.5482999999999995E-2</c:v>
-                </c:pt>
-                <c:pt idx="3">
-                  <c:v>0.62887399999999993</c:v>
-                </c:pt>
-                <c:pt idx="4">
-                  <c:v>5.6212679999999997</c:v>
-                </c:pt>
-                <c:pt idx="5">
-                  <c:v>55.299827999999998</c:v>
-                </c:pt>
-                <c:pt idx="6">
-                  <c:v>578.07848200000001</c:v>
-                </c:pt>
-              </c:numCache>
-            </c:numRef>
-          </c:yVal>
-          <c:smooth val="1"/>
-        </c:ser>
-        <c:ser>
-          <c:idx val="6"/>
-          <c:order val="6"/>
-          <c:tx>
-            <c:v>Regular 3t</c:v>
-          </c:tx>
-          <c:spPr>
-            <a:ln>
-              <a:solidFill>
-                <a:schemeClr val="accent3"/>
-              </a:solidFill>
-              <a:prstDash val="sysDot"/>
-            </a:ln>
-          </c:spPr>
-          <c:xVal>
-            <c:numRef>
-              <c:f>Sheet1!$B$9:$H$9</c:f>
-              <c:numCache>
-                <c:formatCode>General</c:formatCode>
-                <c:ptCount val="7"/>
-                <c:pt idx="0">
-                  <c:v>64</c:v>
-                </c:pt>
-                <c:pt idx="1">
-                  <c:v>128</c:v>
-                </c:pt>
-                <c:pt idx="2">
-                  <c:v>256</c:v>
-                </c:pt>
-                <c:pt idx="3">
-                  <c:v>512</c:v>
-                </c:pt>
-                <c:pt idx="4">
-                  <c:v>1024</c:v>
-                </c:pt>
-                <c:pt idx="5">
-                  <c:v>2048</c:v>
-                </c:pt>
-                <c:pt idx="6">
-                  <c:v>4096</c:v>
-                </c:pt>
-              </c:numCache>
-            </c:numRef>
-          </c:xVal>
-          <c:yVal>
-            <c:numRef>
-              <c:f>Sheet1!$B$12:$H$12</c:f>
-              <c:numCache>
-                <c:formatCode>General</c:formatCode>
-                <c:ptCount val="7"/>
-                <c:pt idx="0">
-                  <c:v>1.4349999999999999E-3</c:v>
-                </c:pt>
-                <c:pt idx="1">
-                  <c:v>1.1018E-2</c:v>
-                </c:pt>
-                <c:pt idx="2">
-                  <c:v>4.9995999999999999E-2</c:v>
-                </c:pt>
-                <c:pt idx="3">
-                  <c:v>0.42952299999999999</c:v>
-                </c:pt>
-                <c:pt idx="4">
-                  <c:v>3.6760539999999997</c:v>
-                </c:pt>
-                <c:pt idx="5">
-                  <c:v>36.570000999999998</c:v>
-                </c:pt>
-                <c:pt idx="6">
-                  <c:v>384.28114199999999</c:v>
-                </c:pt>
-              </c:numCache>
-            </c:numRef>
-          </c:yVal>
-          <c:smooth val="1"/>
-        </c:ser>
-        <c:ser>
-          <c:idx val="7"/>
-          <c:order val="7"/>
-          <c:tx>
-            <c:v>Regular 4t</c:v>
-          </c:tx>
-          <c:spPr>
-            <a:ln>
-              <a:solidFill>
-                <a:srgbClr xmlns:mc="http://schemas.openxmlformats.org/markup-compatibility/2006" xmlns:a14="http://schemas.microsoft.com/office/drawing/2010/main" val="C00000" mc:Ignorable=""/>
-              </a:solidFill>
-              <a:prstDash val="sysDot"/>
-            </a:ln>
-          </c:spPr>
-          <c:xVal>
-            <c:numRef>
-              <c:f>Sheet1!$B$9:$H$9</c:f>
-              <c:numCache>
-                <c:formatCode>General</c:formatCode>
-                <c:ptCount val="7"/>
-                <c:pt idx="0">
-                  <c:v>64</c:v>
-                </c:pt>
-                <c:pt idx="1">
-                  <c:v>128</c:v>
-                </c:pt>
-                <c:pt idx="2">
-                  <c:v>256</c:v>
-                </c:pt>
-                <c:pt idx="3">
-                  <c:v>512</c:v>
-                </c:pt>
-                <c:pt idx="4">
-                  <c:v>1024</c:v>
-                </c:pt>
-                <c:pt idx="5">
-                  <c:v>2048</c:v>
-                </c:pt>
-                <c:pt idx="6">
-                  <c:v>4096</c:v>
-                </c:pt>
-              </c:numCache>
-            </c:numRef>
-          </c:xVal>
-          <c:yVal>
-            <c:numRef>
-              <c:f>Sheet1!$B$13:$H$13</c:f>
-              <c:numCache>
-                <c:formatCode>General</c:formatCode>
-                <c:ptCount val="7"/>
-                <c:pt idx="0">
-                  <c:v>1.0449999999999999E-3</c:v>
-                </c:pt>
-                <c:pt idx="1">
-                  <c:v>7.899999999999999E-3</c:v>
-                </c:pt>
-                <c:pt idx="2">
-                  <c:v>3.7266000000000001E-2</c:v>
-                </c:pt>
-                <c:pt idx="3">
-                  <c:v>0.31682699999999997</c:v>
-                </c:pt>
-                <c:pt idx="4">
-                  <c:v>2.764364</c:v>
-                </c:pt>
-                <c:pt idx="5">
-                  <c:v>27.990532000000002</c:v>
-                </c:pt>
-                <c:pt idx="6">
-                  <c:v>304.08810699999998</c:v>
-                </c:pt>
-              </c:numCache>
-            </c:numRef>
-          </c:yVal>
-          <c:smooth val="1"/>
-        </c:ser>
-        <c:dLbls>
-          <c:showLegendKey val="0"/>
-          <c:showVal val="0"/>
-          <c:showCatName val="0"/>
-          <c:showSerName val="0"/>
-          <c:showPercent val="0"/>
-          <c:showBubbleSize val="0"/>
-        </c:dLbls>
-        <c:axId val="55046912"/>
-        <c:axId val="55048832"/>
-      </c:scatterChart>
-      <c:valAx>
-        <c:axId val="55046912"/>
-        <c:scaling>
-          <c:orientation val="minMax"/>
-        </c:scaling>
-        <c:delete val="0"/>
-        <c:axPos val="b"/>
-        <c:title>
-          <c:tx>
-            <c:rich>
-              <a:bodyPr/>
-              <a:lstStyle/>
-              <a:p>
-                <a:pPr>
-                  <a:defRPr sz="2000" baseline="0"/>
-                </a:pPr>
-                <a:r>
-                  <a:rPr lang="en-US" sz="2000" baseline="0"/>
-                  <a:t>N - matrix size</a:t>
-                </a:r>
-              </a:p>
-            </c:rich>
-          </c:tx>
-          <c:layout/>
-          <c:overlay val="0"/>
-        </c:title>
-        <c:numFmt formatCode="General" sourceLinked="1"/>
-        <c:majorTickMark val="out"/>
-        <c:minorTickMark val="none"/>
-        <c:tickLblPos val="nextTo"/>
-        <c:txPr>
-          <a:bodyPr/>
-          <a:lstStyle/>
-          <a:p>
-            <a:pPr>
-              <a:defRPr sz="1400" baseline="0"/>
-            </a:pPr>
-            <a:endParaRPr lang="en-US"/>
-          </a:p>
-        </c:txPr>
-        <c:crossAx val="55048832"/>
-        <c:crosses val="autoZero"/>
-        <c:crossBetween val="midCat"/>
-      </c:valAx>
-      <c:valAx>
-        <c:axId val="55048832"/>
-        <c:scaling>
-          <c:orientation val="minMax"/>
-        </c:scaling>
-        <c:delete val="0"/>
-        <c:axPos val="l"/>
-        <c:majorGridlines/>
-        <c:title>
-          <c:tx>
-            <c:rich>
-              <a:bodyPr rot="-5400000" vert="horz"/>
-              <a:lstStyle/>
-              <a:p>
-                <a:pPr>
-                  <a:defRPr sz="2000" baseline="0"/>
-                </a:pPr>
-                <a:r>
-                  <a:rPr lang="en-US" sz="2000" baseline="0"/>
-                  <a:t>Time taken (s)</a:t>
-                </a:r>
-              </a:p>
-            </c:rich>
-          </c:tx>
-          <c:layout/>
-          <c:overlay val="0"/>
-        </c:title>
-        <c:numFmt formatCode="General" sourceLinked="1"/>
-        <c:majorTickMark val="out"/>
-        <c:minorTickMark val="none"/>
-        <c:tickLblPos val="nextTo"/>
-        <c:txPr>
-          <a:bodyPr/>
-          <a:lstStyle/>
-          <a:p>
-            <a:pPr>
-              <a:defRPr sz="1400" baseline="0"/>
-            </a:pPr>
-            <a:endParaRPr lang="en-US"/>
-          </a:p>
-        </c:txPr>
-        <c:crossAx val="55046912"/>
-        <c:crosses val="autoZero"/>
-        <c:crossBetween val="midCat"/>
-      </c:valAx>
-    </c:plotArea>
-    <c:legend>
-      <c:legendPos val="r"/>
-      <c:layout/>
-      <c:overlay val="0"/>
-      <c:txPr>
-        <a:bodyPr/>
-        <a:lstStyle/>
-        <a:p>
-          <a:pPr>
-            <a:defRPr sz="1600" baseline="0"/>
-          </a:pPr>
-          <a:endParaRPr lang="en-US"/>
-        </a:p>
-      </c:txPr>
-    </c:legend>
-    <c:plotVisOnly val="1"/>
-    <c:dispBlanksAs val="gap"/>
-    <c:showDLblsOverMax val="0"/>
-  </c:chart>
-  <c:externalData r:id="rId1">
-    <c:autoUpdate val="0"/>
-  </c:externalData>
-</c:chartSpace>
-</file>
-
-<file path=ppt/charts/chart2.xml><?xml version="1.0" encoding="utf-8"?>
-<c:chartSpace xmlns:c="http://schemas.openxmlformats.org/drawingml/2006/chart" xmlns:a="http://schemas.openxmlformats.org/drawingml/2006/main" xmlns:r="http://schemas.openxmlformats.org/officeDocument/2006/relationships">
-  <c:date1904 val="0"/>
-  <c:lang val="en-US"/>
-  <c:roundedCorners val="0"/>
-  <mc:AlternateContent xmlns:mc="http://schemas.openxmlformats.org/markup-compatibility/2006">
-    <mc:Choice xmlns:c14="http://schemas.microsoft.com/office/drawing/2007/8/2/chart" Requires="c14">
-      <c14:style val="102"/>
-    </mc:Choice>
-    <mc:Fallback>
-      <c:style val="2"/>
-    </mc:Fallback>
-  </mc:AlternateContent>
-  <c:chart>
-    <c:title>
-      <c:tx>
-        <c:rich>
-          <a:bodyPr/>
-          <a:lstStyle/>
-          <a:p>
-            <a:pPr>
-              <a:defRPr/>
-            </a:pPr>
-            <a:r>
-              <a:rPr lang="en-US" sz="2400" baseline="0" dirty="0"/>
-              <a:t>4 Threads</a:t>
-            </a:r>
-          </a:p>
-        </c:rich>
-      </c:tx>
-      <c:layout/>
-      <c:overlay val="0"/>
-    </c:title>
-    <c:autoTitleDeleted val="0"/>
-    <c:plotArea>
-      <c:layout/>
-      <c:scatterChart>
-        <c:scatterStyle val="smoothMarker"/>
-        <c:varyColors val="0"/>
-        <c:ser>
-          <c:idx val="0"/>
-          <c:order val="0"/>
-          <c:tx>
-            <c:v>Strassen 4t</c:v>
-          </c:tx>
-          <c:xVal>
-            <c:numRef>
-              <c:f>Sheet1!$B$2:$H$2</c:f>
-              <c:numCache>
-                <c:formatCode>General</c:formatCode>
-                <c:ptCount val="7"/>
-                <c:pt idx="0">
-                  <c:v>64</c:v>
-                </c:pt>
-                <c:pt idx="1">
-                  <c:v>128</c:v>
-                </c:pt>
-                <c:pt idx="2">
-                  <c:v>256</c:v>
-                </c:pt>
-                <c:pt idx="3">
-                  <c:v>512</c:v>
-                </c:pt>
-                <c:pt idx="4">
-                  <c:v>1024</c:v>
-                </c:pt>
-                <c:pt idx="5">
-                  <c:v>2048</c:v>
-                </c:pt>
-                <c:pt idx="6">
-                  <c:v>4096</c:v>
-                </c:pt>
-              </c:numCache>
-            </c:numRef>
-          </c:xVal>
-          <c:yVal>
-            <c:numRef>
-              <c:f>Sheet1!$B$6:$H$6</c:f>
-              <c:numCache>
-                <c:formatCode>General</c:formatCode>
-                <c:ptCount val="7"/>
-                <c:pt idx="0">
-                  <c:v>2.9020000000000001E-3</c:v>
-                </c:pt>
-                <c:pt idx="1">
-                  <c:v>1.9668999999999999E-2</c:v>
-                </c:pt>
-                <c:pt idx="2">
-                  <c:v>5.8347999999999997E-2</c:v>
-                </c:pt>
-                <c:pt idx="3">
-                  <c:v>0.32338499999999998</c:v>
-                </c:pt>
-                <c:pt idx="4">
-                  <c:v>2.1996790000000002</c:v>
-                </c:pt>
-                <c:pt idx="5">
-                  <c:v>15.210084</c:v>
-                </c:pt>
-                <c:pt idx="6">
-                  <c:v>182.46132600000001</c:v>
-                </c:pt>
-              </c:numCache>
-            </c:numRef>
-          </c:yVal>
-          <c:smooth val="1"/>
-        </c:ser>
-        <c:ser>
-          <c:idx val="1"/>
-          <c:order val="1"/>
-          <c:tx>
-            <c:v>Regular 4t</c:v>
-          </c:tx>
-          <c:xVal>
-            <c:numRef>
-              <c:f>Sheet1!$B$9:$H$9</c:f>
-              <c:numCache>
-                <c:formatCode>General</c:formatCode>
-                <c:ptCount val="7"/>
-                <c:pt idx="0">
-                  <c:v>64</c:v>
-                </c:pt>
-                <c:pt idx="1">
-                  <c:v>128</c:v>
-                </c:pt>
-                <c:pt idx="2">
-                  <c:v>256</c:v>
-                </c:pt>
-                <c:pt idx="3">
-                  <c:v>512</c:v>
-                </c:pt>
-                <c:pt idx="4">
-                  <c:v>1024</c:v>
-                </c:pt>
-                <c:pt idx="5">
-                  <c:v>2048</c:v>
-                </c:pt>
-                <c:pt idx="6">
-                  <c:v>4096</c:v>
-                </c:pt>
-              </c:numCache>
-            </c:numRef>
-          </c:xVal>
-          <c:yVal>
-            <c:numRef>
-              <c:f>Sheet1!$B$13:$H$13</c:f>
-              <c:numCache>
-                <c:formatCode>General</c:formatCode>
-                <c:ptCount val="7"/>
-                <c:pt idx="0">
-                  <c:v>1.0449999999999999E-3</c:v>
-                </c:pt>
-                <c:pt idx="1">
-                  <c:v>7.899999999999999E-3</c:v>
-                </c:pt>
-                <c:pt idx="2">
-                  <c:v>3.7266000000000001E-2</c:v>
-                </c:pt>
-                <c:pt idx="3">
-                  <c:v>0.31682699999999997</c:v>
-                </c:pt>
-                <c:pt idx="4">
-                  <c:v>2.764364</c:v>
-                </c:pt>
-                <c:pt idx="5">
-                  <c:v>27.990532000000002</c:v>
-                </c:pt>
-                <c:pt idx="6">
-                  <c:v>304.08810699999998</c:v>
-                </c:pt>
-              </c:numCache>
-            </c:numRef>
-          </c:yVal>
-          <c:smooth val="1"/>
-        </c:ser>
-        <c:dLbls>
-          <c:showLegendKey val="0"/>
-          <c:showVal val="0"/>
-          <c:showCatName val="0"/>
-          <c:showSerName val="0"/>
-          <c:showPercent val="0"/>
-          <c:showBubbleSize val="0"/>
-        </c:dLbls>
-        <c:axId val="55516544"/>
-        <c:axId val="56882688"/>
-      </c:scatterChart>
-      <c:valAx>
-        <c:axId val="55516544"/>
-        <c:scaling>
-          <c:orientation val="minMax"/>
-        </c:scaling>
-        <c:delete val="0"/>
-        <c:axPos val="b"/>
-        <c:title>
-          <c:tx>
-            <c:rich>
-              <a:bodyPr/>
-              <a:lstStyle/>
-              <a:p>
-                <a:pPr>
-                  <a:defRPr/>
-                </a:pPr>
-                <a:r>
-                  <a:rPr lang="en-US" sz="2000" baseline="0" dirty="0"/>
-                  <a:t>N - matrix size</a:t>
-                </a:r>
-              </a:p>
-            </c:rich>
-          </c:tx>
-          <c:layout/>
-          <c:overlay val="0"/>
-        </c:title>
-        <c:numFmt formatCode="General" sourceLinked="1"/>
-        <c:majorTickMark val="out"/>
-        <c:minorTickMark val="none"/>
-        <c:tickLblPos val="nextTo"/>
-        <c:spPr>
-          <a:ln w="25400"/>
-        </c:spPr>
-        <c:txPr>
-          <a:bodyPr/>
-          <a:lstStyle/>
-          <a:p>
-            <a:pPr>
-              <a:defRPr sz="1400" baseline="0"/>
-            </a:pPr>
-            <a:endParaRPr lang="en-US"/>
-          </a:p>
-        </c:txPr>
-        <c:crossAx val="56882688"/>
-        <c:crosses val="autoZero"/>
-        <c:crossBetween val="midCat"/>
-      </c:valAx>
-      <c:valAx>
-        <c:axId val="56882688"/>
-        <c:scaling>
-          <c:orientation val="minMax"/>
-        </c:scaling>
-        <c:delete val="0"/>
-        <c:axPos val="l"/>
-        <c:majorGridlines/>
-        <c:title>
-          <c:tx>
-            <c:rich>
-              <a:bodyPr rot="-5400000" vert="horz"/>
-              <a:lstStyle/>
-              <a:p>
-                <a:pPr>
-                  <a:defRPr/>
-                </a:pPr>
-                <a:r>
-                  <a:rPr lang="en-US" sz="2000" baseline="0" dirty="0"/>
-                  <a:t>Time taken (s)</a:t>
-                </a:r>
-              </a:p>
-            </c:rich>
-          </c:tx>
-          <c:layout/>
-          <c:overlay val="0"/>
-        </c:title>
-        <c:numFmt formatCode="General" sourceLinked="1"/>
-        <c:majorTickMark val="out"/>
-        <c:minorTickMark val="none"/>
-        <c:tickLblPos val="nextTo"/>
-        <c:spPr>
-          <a:ln w="25400"/>
-        </c:spPr>
-        <c:txPr>
-          <a:bodyPr/>
-          <a:lstStyle/>
-          <a:p>
-            <a:pPr>
-              <a:defRPr sz="1400" baseline="0"/>
-            </a:pPr>
-            <a:endParaRPr lang="en-US"/>
-          </a:p>
-        </c:txPr>
-        <c:crossAx val="55516544"/>
-        <c:crosses val="autoZero"/>
-        <c:crossBetween val="midCat"/>
-      </c:valAx>
-    </c:plotArea>
-    <c:legend>
-      <c:legendPos val="r"/>
-      <c:layout/>
-      <c:overlay val="0"/>
-      <c:txPr>
-        <a:bodyPr/>
-        <a:lstStyle/>
-        <a:p>
-          <a:pPr>
-            <a:defRPr sz="1600" baseline="0"/>
-          </a:pPr>
-          <a:endParaRPr lang="en-US"/>
-        </a:p>
-      </c:txPr>
-    </c:legend>
-    <c:plotVisOnly val="1"/>
-    <c:dispBlanksAs val="gap"/>
-    <c:showDLblsOverMax val="0"/>
-  </c:chart>
-  <c:externalData r:id="rId1">
-    <c:autoUpdate val="0"/>
-  </c:externalData>
-</c:chartSpace>
-</file>
-
-<file path=ppt/charts/chart3.xml><?xml version="1.0" encoding="utf-8"?>
-<c:chartSpace xmlns:c="http://schemas.openxmlformats.org/drawingml/2006/chart" xmlns:a="http://schemas.openxmlformats.org/drawingml/2006/main" xmlns:r="http://schemas.openxmlformats.org/officeDocument/2006/relationships">
-  <c:date1904 val="0"/>
-  <c:lang val="en-US"/>
-  <c:roundedCorners val="0"/>
-  <mc:AlternateContent xmlns:mc="http://schemas.openxmlformats.org/markup-compatibility/2006">
-    <mc:Choice xmlns:c14="http://schemas.microsoft.com/office/drawing/2007/8/2/chart" Requires="c14">
-      <c14:style val="102"/>
-    </mc:Choice>
-    <mc:Fallback>
-      <c:style val="2"/>
-    </mc:Fallback>
-  </mc:AlternateContent>
-  <c:chart>
-    <c:title>
-      <c:tx>
-        <c:rich>
-          <a:bodyPr/>
-          <a:lstStyle/>
-          <a:p>
-            <a:pPr>
-              <a:defRPr sz="2400" baseline="0"/>
-            </a:pPr>
-            <a:r>
-              <a:rPr lang="en-US" sz="2400" baseline="0"/>
-              <a:t>1 Thread</a:t>
-            </a:r>
-          </a:p>
-        </c:rich>
-      </c:tx>
-      <c:layout/>
-      <c:overlay val="0"/>
-    </c:title>
-    <c:autoTitleDeleted val="0"/>
-    <c:plotArea>
-      <c:layout/>
-      <c:scatterChart>
-        <c:scatterStyle val="smoothMarker"/>
-        <c:varyColors val="0"/>
-        <c:ser>
-          <c:idx val="0"/>
-          <c:order val="0"/>
-          <c:tx>
-            <c:v>Strassen 1t</c:v>
-          </c:tx>
-          <c:xVal>
-            <c:numRef>
-              <c:f>Sheet1!$B$2:$H$2</c:f>
-              <c:numCache>
-                <c:formatCode>General</c:formatCode>
-                <c:ptCount val="7"/>
-                <c:pt idx="0">
-                  <c:v>64</c:v>
-                </c:pt>
-                <c:pt idx="1">
-                  <c:v>128</c:v>
-                </c:pt>
-                <c:pt idx="2">
-                  <c:v>256</c:v>
-                </c:pt>
-                <c:pt idx="3">
-                  <c:v>512</c:v>
-                </c:pt>
-                <c:pt idx="4">
-                  <c:v>1024</c:v>
-                </c:pt>
-                <c:pt idx="5">
-                  <c:v>2048</c:v>
-                </c:pt>
-                <c:pt idx="6">
-                  <c:v>4096</c:v>
-                </c:pt>
-              </c:numCache>
-            </c:numRef>
-          </c:xVal>
-          <c:yVal>
-            <c:numRef>
-              <c:f>Sheet1!$B$3:$H$3</c:f>
-              <c:numCache>
-                <c:formatCode>General</c:formatCode>
-                <c:ptCount val="7"/>
-                <c:pt idx="0">
-                  <c:v>4.6309999999999997E-3</c:v>
-                </c:pt>
-                <c:pt idx="1">
-                  <c:v>2.7961999999999997E-2</c:v>
-                </c:pt>
-                <c:pt idx="2">
-                  <c:v>0.15857599999999999</c:v>
-                </c:pt>
-                <c:pt idx="3">
-                  <c:v>1.049974</c:v>
-                </c:pt>
-                <c:pt idx="4">
-                  <c:v>7.7579570000000002</c:v>
-                </c:pt>
-                <c:pt idx="5">
-                  <c:v>55.477885000000001</c:v>
-                </c:pt>
-                <c:pt idx="6">
-                  <c:v>638.63927899999999</c:v>
-                </c:pt>
-              </c:numCache>
-            </c:numRef>
-          </c:yVal>
-          <c:smooth val="1"/>
-        </c:ser>
-        <c:ser>
-          <c:idx val="1"/>
-          <c:order val="1"/>
-          <c:tx>
-            <c:v>Regular 1t</c:v>
-          </c:tx>
-          <c:xVal>
-            <c:numRef>
-              <c:f>Sheet1!$B$9:$H$9</c:f>
-              <c:numCache>
-                <c:formatCode>General</c:formatCode>
-                <c:ptCount val="7"/>
-                <c:pt idx="0">
-                  <c:v>64</c:v>
-                </c:pt>
-                <c:pt idx="1">
-                  <c:v>128</c:v>
-                </c:pt>
-                <c:pt idx="2">
-                  <c:v>256</c:v>
-                </c:pt>
-                <c:pt idx="3">
-                  <c:v>512</c:v>
-                </c:pt>
-                <c:pt idx="4">
-                  <c:v>1024</c:v>
-                </c:pt>
-                <c:pt idx="5">
-                  <c:v>2048</c:v>
-                </c:pt>
-                <c:pt idx="6">
-                  <c:v>4096</c:v>
-                </c:pt>
-              </c:numCache>
-            </c:numRef>
-          </c:xVal>
-          <c:yVal>
-            <c:numRef>
-              <c:f>Sheet1!$B$10:$H$10</c:f>
-              <c:numCache>
-                <c:formatCode>General</c:formatCode>
-                <c:ptCount val="7"/>
-                <c:pt idx="0">
-                  <c:v>4.058E-3</c:v>
-                </c:pt>
-                <c:pt idx="1">
-                  <c:v>1.7877999999999998E-2</c:v>
-                </c:pt>
-                <c:pt idx="2">
-                  <c:v>0.14174499999999998</c:v>
-                </c:pt>
-                <c:pt idx="3">
-                  <c:v>1.2158929999999999</c:v>
-                </c:pt>
-                <c:pt idx="4">
-                  <c:v>11.172612000000001</c:v>
-                </c:pt>
-                <c:pt idx="5">
-                  <c:v>105.337958</c:v>
-                </c:pt>
-                <c:pt idx="6">
-                  <c:v>1084.4397120000001</c:v>
-                </c:pt>
-              </c:numCache>
-            </c:numRef>
-          </c:yVal>
-          <c:smooth val="1"/>
-        </c:ser>
-        <c:dLbls>
-          <c:showLegendKey val="0"/>
-          <c:showVal val="0"/>
-          <c:showCatName val="0"/>
-          <c:showSerName val="0"/>
-          <c:showPercent val="0"/>
-          <c:showBubbleSize val="0"/>
-        </c:dLbls>
-        <c:axId val="83300352"/>
-        <c:axId val="83702144"/>
-      </c:scatterChart>
-      <c:valAx>
-        <c:axId val="83300352"/>
-        <c:scaling>
-          <c:orientation val="minMax"/>
-        </c:scaling>
-        <c:delete val="0"/>
-        <c:axPos val="b"/>
-        <c:title>
-          <c:tx>
-            <c:rich>
-              <a:bodyPr/>
-              <a:lstStyle/>
-              <a:p>
-                <a:pPr>
-                  <a:defRPr sz="2000" baseline="0"/>
-                </a:pPr>
-                <a:r>
-                  <a:rPr lang="en-US" sz="2000" baseline="0"/>
-                  <a:t>N - matrix size</a:t>
-                </a:r>
-              </a:p>
-            </c:rich>
-          </c:tx>
-          <c:layout/>
-          <c:overlay val="0"/>
-        </c:title>
-        <c:numFmt formatCode="General" sourceLinked="1"/>
-        <c:majorTickMark val="out"/>
-        <c:minorTickMark val="none"/>
-        <c:tickLblPos val="nextTo"/>
-        <c:txPr>
-          <a:bodyPr/>
-          <a:lstStyle/>
-          <a:p>
-            <a:pPr>
-              <a:defRPr sz="1400" baseline="0"/>
-            </a:pPr>
-            <a:endParaRPr lang="en-US"/>
-          </a:p>
-        </c:txPr>
-        <c:crossAx val="83702144"/>
-        <c:crosses val="autoZero"/>
-        <c:crossBetween val="midCat"/>
-      </c:valAx>
-      <c:valAx>
-        <c:axId val="83702144"/>
-        <c:scaling>
-          <c:orientation val="minMax"/>
-        </c:scaling>
-        <c:delete val="0"/>
-        <c:axPos val="l"/>
-        <c:majorGridlines/>
-        <c:title>
-          <c:tx>
-            <c:rich>
-              <a:bodyPr rot="-5400000" vert="horz"/>
-              <a:lstStyle/>
-              <a:p>
-                <a:pPr>
-                  <a:defRPr sz="2000" baseline="0"/>
-                </a:pPr>
-                <a:r>
-                  <a:rPr lang="en-US" sz="2000" baseline="0"/>
-                  <a:t>Time Taken (s)</a:t>
-                </a:r>
-              </a:p>
-            </c:rich>
-          </c:tx>
-          <c:layout/>
-          <c:overlay val="0"/>
-        </c:title>
-        <c:numFmt formatCode="General" sourceLinked="1"/>
-        <c:majorTickMark val="out"/>
-        <c:minorTickMark val="none"/>
-        <c:tickLblPos val="nextTo"/>
-        <c:txPr>
-          <a:bodyPr/>
-          <a:lstStyle/>
-          <a:p>
-            <a:pPr>
-              <a:defRPr sz="1400" baseline="0"/>
-            </a:pPr>
-            <a:endParaRPr lang="en-US"/>
-          </a:p>
-        </c:txPr>
-        <c:crossAx val="83300352"/>
-        <c:crosses val="autoZero"/>
-        <c:crossBetween val="midCat"/>
-      </c:valAx>
-    </c:plotArea>
-    <c:legend>
-      <c:legendPos val="r"/>
-      <c:layout/>
-      <c:overlay val="0"/>
-      <c:txPr>
-        <a:bodyPr/>
-        <a:lstStyle/>
-        <a:p>
-          <a:pPr>
-            <a:defRPr sz="1600" baseline="0"/>
-          </a:pPr>
-          <a:endParaRPr lang="en-US"/>
-        </a:p>
-      </c:txPr>
-    </c:legend>
-    <c:plotVisOnly val="1"/>
-    <c:dispBlanksAs val="gap"/>
-    <c:showDLblsOverMax val="0"/>
-  </c:chart>
-  <c:externalData r:id="rId1">
-    <c:autoUpdate val="0"/>
-  </c:externalData>
-</c:chartSpace>
 </file>
 
 <file path=ppt/diagrams/colors1.xml><?xml version="1.0" encoding="utf-8"?>
@@ -2828,6 +1444,13 @@
         </dgm:presLayoutVars>
       </dgm:prSet>
       <dgm:spPr/>
+      <dgm:t>
+        <a:bodyPr/>
+        <a:lstStyle/>
+        <a:p>
+          <a:endParaRPr lang="en-US"/>
+        </a:p>
+      </dgm:t>
     </dgm:pt>
     <dgm:pt modelId="{E5CC5CD4-C6B6-4841-89EE-0C5B74D56200}" type="pres">
       <dgm:prSet presAssocID="{9CD19278-969C-4F0D-85A4-8845764C9A27}" presName="root1" presStyleCnt="0"/>
@@ -2840,6 +1463,13 @@
         </dgm:presLayoutVars>
       </dgm:prSet>
       <dgm:spPr/>
+      <dgm:t>
+        <a:bodyPr/>
+        <a:lstStyle/>
+        <a:p>
+          <a:endParaRPr lang="en-US"/>
+        </a:p>
+      </dgm:t>
     </dgm:pt>
     <dgm:pt modelId="{691509C8-803F-4EE5-907D-83240494F0CB}" type="pres">
       <dgm:prSet presAssocID="{9CD19278-969C-4F0D-85A4-8845764C9A27}" presName="level2hierChild" presStyleCnt="0"/>
@@ -2848,10 +1478,24 @@
     <dgm:pt modelId="{D620CD2F-5F4B-4796-9BDF-F5B0408B9880}" type="pres">
       <dgm:prSet presAssocID="{F6AE08F5-8603-4C68-A685-53BC1EF1A6A9}" presName="conn2-1" presStyleLbl="parChTrans1D2" presStyleIdx="0" presStyleCnt="7"/>
       <dgm:spPr/>
+      <dgm:t>
+        <a:bodyPr/>
+        <a:lstStyle/>
+        <a:p>
+          <a:endParaRPr lang="en-US"/>
+        </a:p>
+      </dgm:t>
     </dgm:pt>
     <dgm:pt modelId="{1D7C97A5-E2D3-498B-8BD5-D6AD2F96BD82}" type="pres">
       <dgm:prSet presAssocID="{F6AE08F5-8603-4C68-A685-53BC1EF1A6A9}" presName="connTx" presStyleLbl="parChTrans1D2" presStyleIdx="0" presStyleCnt="7"/>
       <dgm:spPr/>
+      <dgm:t>
+        <a:bodyPr/>
+        <a:lstStyle/>
+        <a:p>
+          <a:endParaRPr lang="en-US"/>
+        </a:p>
+      </dgm:t>
     </dgm:pt>
     <dgm:pt modelId="{E3AE0761-F7BD-45FB-B368-B842A4FAF3B6}" type="pres">
       <dgm:prSet presAssocID="{B2C2E35C-84C2-4FD0-9FA2-13F20C4AD50D}" presName="root2" presStyleCnt="0"/>
@@ -2864,6 +1508,13 @@
         </dgm:presLayoutVars>
       </dgm:prSet>
       <dgm:spPr/>
+      <dgm:t>
+        <a:bodyPr/>
+        <a:lstStyle/>
+        <a:p>
+          <a:endParaRPr lang="en-US"/>
+        </a:p>
+      </dgm:t>
     </dgm:pt>
     <dgm:pt modelId="{E192B425-68AF-40F1-8FF9-E26F053F40A2}" type="pres">
       <dgm:prSet presAssocID="{B2C2E35C-84C2-4FD0-9FA2-13F20C4AD50D}" presName="level3hierChild" presStyleCnt="0"/>
@@ -2872,10 +1523,24 @@
     <dgm:pt modelId="{6F0209B6-2E0C-4076-98A3-C8469917EE3C}" type="pres">
       <dgm:prSet presAssocID="{614E427C-C930-4AB4-ADA6-EC75E3E1E495}" presName="conn2-1" presStyleLbl="parChTrans1D3" presStyleIdx="0" presStyleCnt="7"/>
       <dgm:spPr/>
+      <dgm:t>
+        <a:bodyPr/>
+        <a:lstStyle/>
+        <a:p>
+          <a:endParaRPr lang="en-US"/>
+        </a:p>
+      </dgm:t>
     </dgm:pt>
     <dgm:pt modelId="{B28893E8-0FD5-4766-89B6-E2C2FDE7726C}" type="pres">
       <dgm:prSet presAssocID="{614E427C-C930-4AB4-ADA6-EC75E3E1E495}" presName="connTx" presStyleLbl="parChTrans1D3" presStyleIdx="0" presStyleCnt="7"/>
       <dgm:spPr/>
+      <dgm:t>
+        <a:bodyPr/>
+        <a:lstStyle/>
+        <a:p>
+          <a:endParaRPr lang="en-US"/>
+        </a:p>
+      </dgm:t>
     </dgm:pt>
     <dgm:pt modelId="{5346BAF4-6E02-49B0-9EBB-AF2C541F1FD9}" type="pres">
       <dgm:prSet presAssocID="{A8FF6D3A-1B51-4A55-9C90-CE9E42F5200F}" presName="root2" presStyleCnt="0"/>
@@ -2903,10 +1568,24 @@
     <dgm:pt modelId="{AC04C81B-5314-44B6-BF96-174793ADFD4A}" type="pres">
       <dgm:prSet presAssocID="{0640D400-C3BA-46A4-B8DC-165BCD786153}" presName="conn2-1" presStyleLbl="parChTrans1D3" presStyleIdx="1" presStyleCnt="7"/>
       <dgm:spPr/>
+      <dgm:t>
+        <a:bodyPr/>
+        <a:lstStyle/>
+        <a:p>
+          <a:endParaRPr lang="en-US"/>
+        </a:p>
+      </dgm:t>
     </dgm:pt>
     <dgm:pt modelId="{2B8AB3A9-E020-46FC-8B40-70959922D30F}" type="pres">
       <dgm:prSet presAssocID="{0640D400-C3BA-46A4-B8DC-165BCD786153}" presName="connTx" presStyleLbl="parChTrans1D3" presStyleIdx="1" presStyleCnt="7"/>
       <dgm:spPr/>
+      <dgm:t>
+        <a:bodyPr/>
+        <a:lstStyle/>
+        <a:p>
+          <a:endParaRPr lang="en-US"/>
+        </a:p>
+      </dgm:t>
     </dgm:pt>
     <dgm:pt modelId="{0B8C9603-96CF-4492-A6BE-613AF74109A9}" type="pres">
       <dgm:prSet presAssocID="{8B866F2C-7D39-478F-AD03-1C1E3C8BE267}" presName="root2" presStyleCnt="0"/>
@@ -2934,10 +1613,24 @@
     <dgm:pt modelId="{CE4B3453-3B1D-454F-971B-26657C7A941B}" type="pres">
       <dgm:prSet presAssocID="{90B16CFE-2E0A-4EDF-B5F9-AB5151AF36E9}" presName="conn2-1" presStyleLbl="parChTrans1D3" presStyleIdx="2" presStyleCnt="7"/>
       <dgm:spPr/>
+      <dgm:t>
+        <a:bodyPr/>
+        <a:lstStyle/>
+        <a:p>
+          <a:endParaRPr lang="en-US"/>
+        </a:p>
+      </dgm:t>
     </dgm:pt>
     <dgm:pt modelId="{019BC42C-FDBE-47FD-A949-0E1DD6BD602E}" type="pres">
       <dgm:prSet presAssocID="{90B16CFE-2E0A-4EDF-B5F9-AB5151AF36E9}" presName="connTx" presStyleLbl="parChTrans1D3" presStyleIdx="2" presStyleCnt="7"/>
       <dgm:spPr/>
+      <dgm:t>
+        <a:bodyPr/>
+        <a:lstStyle/>
+        <a:p>
+          <a:endParaRPr lang="en-US"/>
+        </a:p>
+      </dgm:t>
     </dgm:pt>
     <dgm:pt modelId="{FE1DAEF8-B2E1-4E08-8A34-34395714266D}" type="pres">
       <dgm:prSet presAssocID="{1E0B254F-5886-42A9-9034-E6DED189B319}" presName="root2" presStyleCnt="0"/>
@@ -2950,6 +1643,13 @@
         </dgm:presLayoutVars>
       </dgm:prSet>
       <dgm:spPr/>
+      <dgm:t>
+        <a:bodyPr/>
+        <a:lstStyle/>
+        <a:p>
+          <a:endParaRPr lang="en-US"/>
+        </a:p>
+      </dgm:t>
     </dgm:pt>
     <dgm:pt modelId="{D5B47D62-0CC5-4673-92AB-0541BBF664B5}" type="pres">
       <dgm:prSet presAssocID="{1E0B254F-5886-42A9-9034-E6DED189B319}" presName="level3hierChild" presStyleCnt="0"/>
@@ -2958,10 +1658,24 @@
     <dgm:pt modelId="{47822757-93D5-4E73-8149-6D92465F1113}" type="pres">
       <dgm:prSet presAssocID="{4AE3558E-A748-48ED-A2A1-046C2A60BD67}" presName="conn2-1" presStyleLbl="parChTrans1D3" presStyleIdx="3" presStyleCnt="7"/>
       <dgm:spPr/>
+      <dgm:t>
+        <a:bodyPr/>
+        <a:lstStyle/>
+        <a:p>
+          <a:endParaRPr lang="en-US"/>
+        </a:p>
+      </dgm:t>
     </dgm:pt>
     <dgm:pt modelId="{89F13134-EEAE-4100-A2C4-FE851C7BF54A}" type="pres">
       <dgm:prSet presAssocID="{4AE3558E-A748-48ED-A2A1-046C2A60BD67}" presName="connTx" presStyleLbl="parChTrans1D3" presStyleIdx="3" presStyleCnt="7"/>
       <dgm:spPr/>
+      <dgm:t>
+        <a:bodyPr/>
+        <a:lstStyle/>
+        <a:p>
+          <a:endParaRPr lang="en-US"/>
+        </a:p>
+      </dgm:t>
     </dgm:pt>
     <dgm:pt modelId="{184B33E6-5061-4A1E-B9C6-88E107A29133}" type="pres">
       <dgm:prSet presAssocID="{13CBB1D2-84BF-4047-AED6-A36C520425E5}" presName="root2" presStyleCnt="0"/>
@@ -2974,6 +1688,13 @@
         </dgm:presLayoutVars>
       </dgm:prSet>
       <dgm:spPr/>
+      <dgm:t>
+        <a:bodyPr/>
+        <a:lstStyle/>
+        <a:p>
+          <a:endParaRPr lang="en-US"/>
+        </a:p>
+      </dgm:t>
     </dgm:pt>
     <dgm:pt modelId="{890F4415-780D-4069-B73D-4806D9C7FD8F}" type="pres">
       <dgm:prSet presAssocID="{13CBB1D2-84BF-4047-AED6-A36C520425E5}" presName="level3hierChild" presStyleCnt="0"/>
@@ -2982,10 +1703,24 @@
     <dgm:pt modelId="{997A3AE9-1692-405C-8A81-DE09033570A2}" type="pres">
       <dgm:prSet presAssocID="{6BA06561-B62B-4791-9739-0A0FD4C65D36}" presName="conn2-1" presStyleLbl="parChTrans1D2" presStyleIdx="1" presStyleCnt="7"/>
       <dgm:spPr/>
+      <dgm:t>
+        <a:bodyPr/>
+        <a:lstStyle/>
+        <a:p>
+          <a:endParaRPr lang="en-US"/>
+        </a:p>
+      </dgm:t>
     </dgm:pt>
     <dgm:pt modelId="{2B193996-3B04-4801-8F45-E05B4289BE97}" type="pres">
       <dgm:prSet presAssocID="{6BA06561-B62B-4791-9739-0A0FD4C65D36}" presName="connTx" presStyleLbl="parChTrans1D2" presStyleIdx="1" presStyleCnt="7"/>
       <dgm:spPr/>
+      <dgm:t>
+        <a:bodyPr/>
+        <a:lstStyle/>
+        <a:p>
+          <a:endParaRPr lang="en-US"/>
+        </a:p>
+      </dgm:t>
     </dgm:pt>
     <dgm:pt modelId="{1F7166FD-A4C9-4530-86C8-D94BDE6D55A1}" type="pres">
       <dgm:prSet presAssocID="{CF39036C-6868-4C5A-8EF0-EFAE2A6B10C7}" presName="root2" presStyleCnt="0"/>
@@ -2998,6 +1733,13 @@
         </dgm:presLayoutVars>
       </dgm:prSet>
       <dgm:spPr/>
+      <dgm:t>
+        <a:bodyPr/>
+        <a:lstStyle/>
+        <a:p>
+          <a:endParaRPr lang="en-US"/>
+        </a:p>
+      </dgm:t>
     </dgm:pt>
     <dgm:pt modelId="{D34FB4E6-DEF4-4115-B943-0B507B390EA9}" type="pres">
       <dgm:prSet presAssocID="{CF39036C-6868-4C5A-8EF0-EFAE2A6B10C7}" presName="level3hierChild" presStyleCnt="0"/>
@@ -3006,10 +1748,24 @@
     <dgm:pt modelId="{DB324566-1607-4DB0-AC7C-32254B5A63FF}" type="pres">
       <dgm:prSet presAssocID="{5C315AFD-BC05-4150-AE8E-26CCE5CCE374}" presName="conn2-1" presStyleLbl="parChTrans1D3" presStyleIdx="4" presStyleCnt="7"/>
       <dgm:spPr/>
+      <dgm:t>
+        <a:bodyPr/>
+        <a:lstStyle/>
+        <a:p>
+          <a:endParaRPr lang="en-US"/>
+        </a:p>
+      </dgm:t>
     </dgm:pt>
     <dgm:pt modelId="{2E6541AD-3DCC-44F0-857D-E5ADCC5EF3A1}" type="pres">
       <dgm:prSet presAssocID="{5C315AFD-BC05-4150-AE8E-26CCE5CCE374}" presName="connTx" presStyleLbl="parChTrans1D3" presStyleIdx="4" presStyleCnt="7"/>
       <dgm:spPr/>
+      <dgm:t>
+        <a:bodyPr/>
+        <a:lstStyle/>
+        <a:p>
+          <a:endParaRPr lang="en-US"/>
+        </a:p>
+      </dgm:t>
     </dgm:pt>
     <dgm:pt modelId="{4ABC0CAB-3D14-4738-A823-509526C921AA}" type="pres">
       <dgm:prSet presAssocID="{2F2FB0B4-ECFC-45CE-811D-4D1F664C7D61}" presName="root2" presStyleCnt="0"/>
@@ -3022,6 +1778,13 @@
         </dgm:presLayoutVars>
       </dgm:prSet>
       <dgm:spPr/>
+      <dgm:t>
+        <a:bodyPr/>
+        <a:lstStyle/>
+        <a:p>
+          <a:endParaRPr lang="en-US"/>
+        </a:p>
+      </dgm:t>
     </dgm:pt>
     <dgm:pt modelId="{26E6A01A-CAAB-46DC-BE48-DD571BAD4BAC}" type="pres">
       <dgm:prSet presAssocID="{2F2FB0B4-ECFC-45CE-811D-4D1F664C7D61}" presName="level3hierChild" presStyleCnt="0"/>
@@ -3030,10 +1793,24 @@
     <dgm:pt modelId="{89879B4E-C57A-443B-9F6C-1A1A453238A1}" type="pres">
       <dgm:prSet presAssocID="{16463E81-F320-4A1C-873E-FA24CCEB0DDB}" presName="conn2-1" presStyleLbl="parChTrans1D2" presStyleIdx="2" presStyleCnt="7"/>
       <dgm:spPr/>
+      <dgm:t>
+        <a:bodyPr/>
+        <a:lstStyle/>
+        <a:p>
+          <a:endParaRPr lang="en-US"/>
+        </a:p>
+      </dgm:t>
     </dgm:pt>
     <dgm:pt modelId="{8038DBA2-81FD-4736-8BCB-FAE74F4F2A57}" type="pres">
       <dgm:prSet presAssocID="{16463E81-F320-4A1C-873E-FA24CCEB0DDB}" presName="connTx" presStyleLbl="parChTrans1D2" presStyleIdx="2" presStyleCnt="7"/>
       <dgm:spPr/>
+      <dgm:t>
+        <a:bodyPr/>
+        <a:lstStyle/>
+        <a:p>
+          <a:endParaRPr lang="en-US"/>
+        </a:p>
+      </dgm:t>
     </dgm:pt>
     <dgm:pt modelId="{16900B15-A0DF-4B7E-8989-7418F7E00341}" type="pres">
       <dgm:prSet presAssocID="{2FAB8AFB-1C15-43C2-B9D9-8DFF80D2EC29}" presName="root2" presStyleCnt="0"/>
@@ -3061,10 +1838,24 @@
     <dgm:pt modelId="{6E727B0D-0D9D-476B-9EED-4CBAD4FA2965}" type="pres">
       <dgm:prSet presAssocID="{F4C2FACF-5025-4304-B787-69E9F2D6840F}" presName="conn2-1" presStyleLbl="parChTrans1D3" presStyleIdx="5" presStyleCnt="7"/>
       <dgm:spPr/>
+      <dgm:t>
+        <a:bodyPr/>
+        <a:lstStyle/>
+        <a:p>
+          <a:endParaRPr lang="en-US"/>
+        </a:p>
+      </dgm:t>
     </dgm:pt>
     <dgm:pt modelId="{B078DD3B-06E8-4C0F-AECC-010FDD8E0859}" type="pres">
       <dgm:prSet presAssocID="{F4C2FACF-5025-4304-B787-69E9F2D6840F}" presName="connTx" presStyleLbl="parChTrans1D3" presStyleIdx="5" presStyleCnt="7"/>
       <dgm:spPr/>
+      <dgm:t>
+        <a:bodyPr/>
+        <a:lstStyle/>
+        <a:p>
+          <a:endParaRPr lang="en-US"/>
+        </a:p>
+      </dgm:t>
     </dgm:pt>
     <dgm:pt modelId="{CCD8263C-7B6E-46EF-94FA-3400C4870F6D}" type="pres">
       <dgm:prSet presAssocID="{7BD570A5-FEA3-44DD-A067-A50241F4BD7A}" presName="root2" presStyleCnt="0"/>
@@ -3092,10 +1883,24 @@
     <dgm:pt modelId="{6A582C07-D287-4666-8F52-00E924175022}" type="pres">
       <dgm:prSet presAssocID="{9221A63F-33E6-461F-82E5-D5410F221417}" presName="conn2-1" presStyleLbl="parChTrans1D2" presStyleIdx="3" presStyleCnt="7"/>
       <dgm:spPr/>
+      <dgm:t>
+        <a:bodyPr/>
+        <a:lstStyle/>
+        <a:p>
+          <a:endParaRPr lang="en-US"/>
+        </a:p>
+      </dgm:t>
     </dgm:pt>
     <dgm:pt modelId="{BD1544F7-61EA-4095-BFB8-580317E9A2DA}" type="pres">
       <dgm:prSet presAssocID="{9221A63F-33E6-461F-82E5-D5410F221417}" presName="connTx" presStyleLbl="parChTrans1D2" presStyleIdx="3" presStyleCnt="7"/>
       <dgm:spPr/>
+      <dgm:t>
+        <a:bodyPr/>
+        <a:lstStyle/>
+        <a:p>
+          <a:endParaRPr lang="en-US"/>
+        </a:p>
+      </dgm:t>
     </dgm:pt>
     <dgm:pt modelId="{F887017B-58BA-4A82-AACD-B54FA4148643}" type="pres">
       <dgm:prSet presAssocID="{A2034A88-8EC6-4531-96CD-BE2234A48731}" presName="root2" presStyleCnt="0"/>
@@ -3108,6 +1913,13 @@
         </dgm:presLayoutVars>
       </dgm:prSet>
       <dgm:spPr/>
+      <dgm:t>
+        <a:bodyPr/>
+        <a:lstStyle/>
+        <a:p>
+          <a:endParaRPr lang="en-US"/>
+        </a:p>
+      </dgm:t>
     </dgm:pt>
     <dgm:pt modelId="{A30A2D44-28CC-41F2-920F-6051A4DBCDCC}" type="pres">
       <dgm:prSet presAssocID="{A2034A88-8EC6-4531-96CD-BE2234A48731}" presName="level3hierChild" presStyleCnt="0"/>
@@ -3116,10 +1928,24 @@
     <dgm:pt modelId="{57C9861F-5B74-4F9F-9749-44DD2D446056}" type="pres">
       <dgm:prSet presAssocID="{7CDEF922-5210-4217-B03E-0707E8B38A8F}" presName="conn2-1" presStyleLbl="parChTrans1D3" presStyleIdx="6" presStyleCnt="7"/>
       <dgm:spPr/>
+      <dgm:t>
+        <a:bodyPr/>
+        <a:lstStyle/>
+        <a:p>
+          <a:endParaRPr lang="en-US"/>
+        </a:p>
+      </dgm:t>
     </dgm:pt>
     <dgm:pt modelId="{8C596E3E-EFBB-452D-A73C-A3662C5D3041}" type="pres">
       <dgm:prSet presAssocID="{7CDEF922-5210-4217-B03E-0707E8B38A8F}" presName="connTx" presStyleLbl="parChTrans1D3" presStyleIdx="6" presStyleCnt="7"/>
       <dgm:spPr/>
+      <dgm:t>
+        <a:bodyPr/>
+        <a:lstStyle/>
+        <a:p>
+          <a:endParaRPr lang="en-US"/>
+        </a:p>
+      </dgm:t>
     </dgm:pt>
     <dgm:pt modelId="{8CBA8070-747B-409E-9788-7D2161CDCBCF}" type="pres">
       <dgm:prSet presAssocID="{F5F91F04-DABF-4A33-B09C-1FA4D250B3A2}" presName="root2" presStyleCnt="0"/>
@@ -3147,10 +1973,24 @@
     <dgm:pt modelId="{142134EC-2FCE-4F28-9E94-2762A7496F95}" type="pres">
       <dgm:prSet presAssocID="{3DAAABA6-6453-45C9-8D2A-9C29AAF83A5E}" presName="conn2-1" presStyleLbl="parChTrans1D2" presStyleIdx="4" presStyleCnt="7"/>
       <dgm:spPr/>
+      <dgm:t>
+        <a:bodyPr/>
+        <a:lstStyle/>
+        <a:p>
+          <a:endParaRPr lang="en-US"/>
+        </a:p>
+      </dgm:t>
     </dgm:pt>
     <dgm:pt modelId="{261E14A8-1BB2-4356-A252-225415CBC485}" type="pres">
       <dgm:prSet presAssocID="{3DAAABA6-6453-45C9-8D2A-9C29AAF83A5E}" presName="connTx" presStyleLbl="parChTrans1D2" presStyleIdx="4" presStyleCnt="7"/>
       <dgm:spPr/>
+      <dgm:t>
+        <a:bodyPr/>
+        <a:lstStyle/>
+        <a:p>
+          <a:endParaRPr lang="en-US"/>
+        </a:p>
+      </dgm:t>
     </dgm:pt>
     <dgm:pt modelId="{FE354A72-1848-4FD7-AD5B-71B0FF327FF0}" type="pres">
       <dgm:prSet presAssocID="{184C1A6B-64E3-46F4-9F35-31B26FF42C2F}" presName="root2" presStyleCnt="0"/>
@@ -3163,6 +2003,13 @@
         </dgm:presLayoutVars>
       </dgm:prSet>
       <dgm:spPr/>
+      <dgm:t>
+        <a:bodyPr/>
+        <a:lstStyle/>
+        <a:p>
+          <a:endParaRPr lang="en-US"/>
+        </a:p>
+      </dgm:t>
     </dgm:pt>
     <dgm:pt modelId="{55397190-CBC2-4F7C-991E-9306C4AFEF8C}" type="pres">
       <dgm:prSet presAssocID="{184C1A6B-64E3-46F4-9F35-31B26FF42C2F}" presName="level3hierChild" presStyleCnt="0"/>
@@ -3171,10 +2018,24 @@
     <dgm:pt modelId="{26211C8B-5BFA-48DB-9A5A-6FDB7D1C8FFB}" type="pres">
       <dgm:prSet presAssocID="{E25C0734-2A08-4354-B145-5393E595DA80}" presName="conn2-1" presStyleLbl="parChTrans1D2" presStyleIdx="5" presStyleCnt="7"/>
       <dgm:spPr/>
+      <dgm:t>
+        <a:bodyPr/>
+        <a:lstStyle/>
+        <a:p>
+          <a:endParaRPr lang="en-US"/>
+        </a:p>
+      </dgm:t>
     </dgm:pt>
     <dgm:pt modelId="{47D29A3D-D75D-4643-AEE0-E448555A856E}" type="pres">
       <dgm:prSet presAssocID="{E25C0734-2A08-4354-B145-5393E595DA80}" presName="connTx" presStyleLbl="parChTrans1D2" presStyleIdx="5" presStyleCnt="7"/>
       <dgm:spPr/>
+      <dgm:t>
+        <a:bodyPr/>
+        <a:lstStyle/>
+        <a:p>
+          <a:endParaRPr lang="en-US"/>
+        </a:p>
+      </dgm:t>
     </dgm:pt>
     <dgm:pt modelId="{5607DF2A-13B7-424E-9D72-425251AF8E9D}" type="pres">
       <dgm:prSet presAssocID="{67DE2454-BE2E-4CDF-83C0-61A0F7DECCC8}" presName="root2" presStyleCnt="0"/>
@@ -3187,6 +2048,13 @@
         </dgm:presLayoutVars>
       </dgm:prSet>
       <dgm:spPr/>
+      <dgm:t>
+        <a:bodyPr/>
+        <a:lstStyle/>
+        <a:p>
+          <a:endParaRPr lang="en-US"/>
+        </a:p>
+      </dgm:t>
     </dgm:pt>
     <dgm:pt modelId="{C152D82D-C6A0-496A-8AF4-60E67116E3A4}" type="pres">
       <dgm:prSet presAssocID="{67DE2454-BE2E-4CDF-83C0-61A0F7DECCC8}" presName="level3hierChild" presStyleCnt="0"/>
@@ -3195,10 +2063,24 @@
     <dgm:pt modelId="{39BDA215-38FB-4429-8E62-5011ED01F196}" type="pres">
       <dgm:prSet presAssocID="{7C5ACCCD-3DEA-4261-8473-1ACE98F1EE01}" presName="conn2-1" presStyleLbl="parChTrans1D2" presStyleIdx="6" presStyleCnt="7"/>
       <dgm:spPr/>
+      <dgm:t>
+        <a:bodyPr/>
+        <a:lstStyle/>
+        <a:p>
+          <a:endParaRPr lang="en-US"/>
+        </a:p>
+      </dgm:t>
     </dgm:pt>
     <dgm:pt modelId="{347E78AE-1FC2-4E2C-A0CD-38CB23E9332A}" type="pres">
       <dgm:prSet presAssocID="{7C5ACCCD-3DEA-4261-8473-1ACE98F1EE01}" presName="connTx" presStyleLbl="parChTrans1D2" presStyleIdx="6" presStyleCnt="7"/>
       <dgm:spPr/>
+      <dgm:t>
+        <a:bodyPr/>
+        <a:lstStyle/>
+        <a:p>
+          <a:endParaRPr lang="en-US"/>
+        </a:p>
+      </dgm:t>
     </dgm:pt>
     <dgm:pt modelId="{7AB4C846-B931-406C-AC31-E4BF4C2D5EDF}" type="pres">
       <dgm:prSet presAssocID="{16DD32BE-4C52-4879-9D73-23B226E647A7}" presName="root2" presStyleCnt="0"/>
@@ -3211,6 +2093,13 @@
         </dgm:presLayoutVars>
       </dgm:prSet>
       <dgm:spPr/>
+      <dgm:t>
+        <a:bodyPr/>
+        <a:lstStyle/>
+        <a:p>
+          <a:endParaRPr lang="en-US"/>
+        </a:p>
+      </dgm:t>
     </dgm:pt>
     <dgm:pt modelId="{62C83757-12B2-40D1-9AF7-E4FF45FDA03F}" type="pres">
       <dgm:prSet presAssocID="{16DD32BE-4C52-4879-9D73-23B226E647A7}" presName="level3hierChild" presStyleCnt="0"/>
@@ -3241,8 +2130,8 @@
     <dgm:cxn modelId="{626AAF04-B39E-420E-8836-9576061E269E}" type="presOf" srcId="{7C5ACCCD-3DEA-4261-8473-1ACE98F1EE01}" destId="{39BDA215-38FB-4429-8E62-5011ED01F196}" srcOrd="0" destOrd="0" presId="urn:microsoft.com/office/officeart/2005/8/layout/hierarchy2"/>
     <dgm:cxn modelId="{499ED43A-B53F-48AA-84AB-81CC8BF63682}" srcId="{9CD19278-969C-4F0D-85A4-8845764C9A27}" destId="{CF39036C-6868-4C5A-8EF0-EFAE2A6B10C7}" srcOrd="1" destOrd="0" parTransId="{6BA06561-B62B-4791-9739-0A0FD4C65D36}" sibTransId="{D31E48FD-07B5-4606-93DE-E0CA11E08410}"/>
     <dgm:cxn modelId="{1F99D193-4452-4FA7-9792-FCEBA03E0B61}" type="presOf" srcId="{13CBB1D2-84BF-4047-AED6-A36C520425E5}" destId="{2B2A7D31-AB56-4A58-AB0C-7D65CAFBC0C8}" srcOrd="0" destOrd="0" presId="urn:microsoft.com/office/officeart/2005/8/layout/hierarchy2"/>
+    <dgm:cxn modelId="{4C3F6DAC-34FE-44AF-B229-1CBEC53B78D2}" type="presOf" srcId="{4AE3558E-A748-48ED-A2A1-046C2A60BD67}" destId="{47822757-93D5-4E73-8149-6D92465F1113}" srcOrd="0" destOrd="0" presId="urn:microsoft.com/office/officeart/2005/8/layout/hierarchy2"/>
     <dgm:cxn modelId="{D98530E8-8CA9-4EF6-AF16-7387FC6366DF}" type="presOf" srcId="{614E427C-C930-4AB4-ADA6-EC75E3E1E495}" destId="{6F0209B6-2E0C-4076-98A3-C8469917EE3C}" srcOrd="0" destOrd="0" presId="urn:microsoft.com/office/officeart/2005/8/layout/hierarchy2"/>
-    <dgm:cxn modelId="{4C3F6DAC-34FE-44AF-B229-1CBEC53B78D2}" type="presOf" srcId="{4AE3558E-A748-48ED-A2A1-046C2A60BD67}" destId="{47822757-93D5-4E73-8149-6D92465F1113}" srcOrd="0" destOrd="0" presId="urn:microsoft.com/office/officeart/2005/8/layout/hierarchy2"/>
     <dgm:cxn modelId="{42E20650-0FD8-4182-81DD-D08FC55BAA0E}" type="presOf" srcId="{7C5ACCCD-3DEA-4261-8473-1ACE98F1EE01}" destId="{347E78AE-1FC2-4E2C-A0CD-38CB23E9332A}" srcOrd="1" destOrd="0" presId="urn:microsoft.com/office/officeart/2005/8/layout/hierarchy2"/>
     <dgm:cxn modelId="{3D152AB2-65F1-4A89-ABCF-BF5EF7057C27}" srcId="{B2C2E35C-84C2-4FD0-9FA2-13F20C4AD50D}" destId="{8B866F2C-7D39-478F-AD03-1C1E3C8BE267}" srcOrd="1" destOrd="0" parTransId="{0640D400-C3BA-46A4-B8DC-165BCD786153}" sibTransId="{9E98D50E-4D63-4550-954E-9B065960FD37}"/>
     <dgm:cxn modelId="{27307D6B-F439-4BA8-A7FE-16A79461B5FA}" type="presOf" srcId="{F4C2FACF-5025-4304-B787-69E9F2D6840F}" destId="{6E727B0D-0D9D-476B-9EED-4CBAD4FA2965}" srcOrd="0" destOrd="0" presId="urn:microsoft.com/office/officeart/2005/8/layout/hierarchy2"/>
@@ -3420,12 +2309,12 @@
         </a:fontRef>
       </dsp:style>
       <dsp:txBody>
-        <a:bodyPr spcFirstLastPara="0" vert="horz" wrap="square" lIns="10795" tIns="10795" rIns="10795" bIns="10795" numCol="1" spcCol="1270" anchor="ctr" anchorCtr="0">
+        <a:bodyPr spcFirstLastPara="0" vert="horz" wrap="square" lIns="10160" tIns="10160" rIns="10160" bIns="10160" numCol="1" spcCol="1270" anchor="ctr" anchorCtr="0">
           <a:noAutofit/>
         </a:bodyPr>
         <a:lstStyle/>
         <a:p>
-          <a:pPr lvl="0" algn="ctr" defTabSz="755650">
+          <a:pPr lvl="0" algn="ctr" defTabSz="711200">
             <a:lnSpc>
               <a:spcPct val="90000"/>
             </a:lnSpc>
@@ -3437,10 +2326,10 @@
             </a:spcAft>
           </a:pPr>
           <a:r>
-            <a:rPr lang="en-US" sz="1700" kern="1200" dirty="0" smtClean="0"/>
+            <a:rPr lang="en-US" sz="1600" kern="1200" dirty="0" smtClean="0"/>
             <a:t>C=A*B</a:t>
           </a:r>
-          <a:endParaRPr lang="en-US" sz="1700" kern="1200" dirty="0"/>
+          <a:endParaRPr lang="en-US" sz="1600" kern="1200" dirty="0"/>
         </a:p>
       </dsp:txBody>
       <dsp:txXfrm>
@@ -3578,12 +2467,12 @@
         </a:fontRef>
       </dsp:style>
       <dsp:txBody>
-        <a:bodyPr spcFirstLastPara="0" vert="horz" wrap="square" lIns="10795" tIns="10795" rIns="10795" bIns="10795" numCol="1" spcCol="1270" anchor="ctr" anchorCtr="0">
+        <a:bodyPr spcFirstLastPara="0" vert="horz" wrap="square" lIns="10160" tIns="10160" rIns="10160" bIns="10160" numCol="1" spcCol="1270" anchor="ctr" anchorCtr="0">
           <a:noAutofit/>
         </a:bodyPr>
         <a:lstStyle/>
         <a:p>
-          <a:pPr lvl="0" algn="ctr" defTabSz="755650">
+          <a:pPr lvl="0" algn="ctr" defTabSz="711200">
             <a:lnSpc>
               <a:spcPct val="90000"/>
             </a:lnSpc>
@@ -3595,10 +2484,10 @@
             </a:spcAft>
           </a:pPr>
           <a:r>
-            <a:rPr lang="en-US" sz="1700" kern="1200" dirty="0" smtClean="0"/>
+            <a:rPr lang="en-US" sz="1600" kern="1200" dirty="0" smtClean="0"/>
             <a:t>M1</a:t>
           </a:r>
-          <a:endParaRPr lang="en-US" sz="1700" kern="1200" dirty="0"/>
+          <a:endParaRPr lang="en-US" sz="1600" kern="1200" dirty="0"/>
         </a:p>
       </dsp:txBody>
       <dsp:txXfrm>
@@ -3736,12 +2625,12 @@
         </a:fontRef>
       </dsp:style>
       <dsp:txBody>
-        <a:bodyPr spcFirstLastPara="0" vert="horz" wrap="square" lIns="10795" tIns="10795" rIns="10795" bIns="10795" numCol="1" spcCol="1270" anchor="ctr" anchorCtr="0">
+        <a:bodyPr spcFirstLastPara="0" vert="horz" wrap="square" lIns="10160" tIns="10160" rIns="10160" bIns="10160" numCol="1" spcCol="1270" anchor="ctr" anchorCtr="0">
           <a:noAutofit/>
         </a:bodyPr>
         <a:lstStyle/>
         <a:p>
-          <a:pPr lvl="0" algn="ctr" defTabSz="755650">
+          <a:pPr lvl="0" algn="ctr" defTabSz="711200">
             <a:lnSpc>
               <a:spcPct val="90000"/>
             </a:lnSpc>
@@ -3753,10 +2642,10 @@
             </a:spcAft>
           </a:pPr>
           <a:r>
-            <a:rPr lang="en-US" sz="1700" kern="1200" dirty="0" smtClean="0"/>
+            <a:rPr lang="en-US" sz="1600" kern="1200" dirty="0" smtClean="0"/>
             <a:t>M1-&gt;M1</a:t>
           </a:r>
-          <a:endParaRPr lang="en-US" sz="1700" kern="1200" dirty="0"/>
+          <a:endParaRPr lang="en-US" sz="1600" kern="1200" dirty="0"/>
         </a:p>
       </dsp:txBody>
       <dsp:txXfrm>
@@ -3894,12 +2783,12 @@
         </a:fontRef>
       </dsp:style>
       <dsp:txBody>
-        <a:bodyPr spcFirstLastPara="0" vert="horz" wrap="square" lIns="10795" tIns="10795" rIns="10795" bIns="10795" numCol="1" spcCol="1270" anchor="ctr" anchorCtr="0">
+        <a:bodyPr spcFirstLastPara="0" vert="horz" wrap="square" lIns="10160" tIns="10160" rIns="10160" bIns="10160" numCol="1" spcCol="1270" anchor="ctr" anchorCtr="0">
           <a:noAutofit/>
         </a:bodyPr>
         <a:lstStyle/>
         <a:p>
-          <a:pPr lvl="0" algn="ctr" defTabSz="755650">
+          <a:pPr lvl="0" algn="ctr" defTabSz="711200">
             <a:lnSpc>
               <a:spcPct val="90000"/>
             </a:lnSpc>
@@ -3911,10 +2800,10 @@
             </a:spcAft>
           </a:pPr>
           <a:r>
-            <a:rPr lang="en-US" sz="1700" kern="1200" dirty="0" smtClean="0"/>
+            <a:rPr lang="en-US" sz="1600" kern="1200" dirty="0" smtClean="0"/>
             <a:t>M1-&gt;M2</a:t>
           </a:r>
-          <a:endParaRPr lang="en-US" sz="1700" kern="1200" dirty="0"/>
+          <a:endParaRPr lang="en-US" sz="1600" kern="1200" dirty="0"/>
         </a:p>
       </dsp:txBody>
       <dsp:txXfrm>
@@ -4052,12 +2941,12 @@
         </a:fontRef>
       </dsp:style>
       <dsp:txBody>
-        <a:bodyPr spcFirstLastPara="0" vert="horz" wrap="square" lIns="10795" tIns="10795" rIns="10795" bIns="10795" numCol="1" spcCol="1270" anchor="ctr" anchorCtr="0">
+        <a:bodyPr spcFirstLastPara="0" vert="horz" wrap="square" lIns="10160" tIns="10160" rIns="10160" bIns="10160" numCol="1" spcCol="1270" anchor="ctr" anchorCtr="0">
           <a:noAutofit/>
         </a:bodyPr>
         <a:lstStyle/>
         <a:p>
-          <a:pPr lvl="0" algn="ctr" defTabSz="755650">
+          <a:pPr lvl="0" algn="ctr" defTabSz="711200">
             <a:lnSpc>
               <a:spcPct val="90000"/>
             </a:lnSpc>
@@ -4069,10 +2958,10 @@
             </a:spcAft>
           </a:pPr>
           <a:r>
-            <a:rPr lang="en-US" sz="1700" kern="1200" dirty="0" smtClean="0"/>
+            <a:rPr lang="en-US" sz="1600" kern="1200" dirty="0" smtClean="0"/>
             <a:t>M1-&gt;M3</a:t>
           </a:r>
-          <a:endParaRPr lang="en-US" sz="1700" kern="1200" dirty="0"/>
+          <a:endParaRPr lang="en-US" sz="1600" kern="1200" dirty="0"/>
         </a:p>
       </dsp:txBody>
       <dsp:txXfrm>
@@ -4210,12 +3099,12 @@
         </a:fontRef>
       </dsp:style>
       <dsp:txBody>
-        <a:bodyPr spcFirstLastPara="0" vert="horz" wrap="square" lIns="10795" tIns="10795" rIns="10795" bIns="10795" numCol="1" spcCol="1270" anchor="ctr" anchorCtr="0">
+        <a:bodyPr spcFirstLastPara="0" vert="horz" wrap="square" lIns="10160" tIns="10160" rIns="10160" bIns="10160" numCol="1" spcCol="1270" anchor="ctr" anchorCtr="0">
           <a:noAutofit/>
         </a:bodyPr>
         <a:lstStyle/>
         <a:p>
-          <a:pPr lvl="0" algn="ctr" defTabSz="755650">
+          <a:pPr lvl="0" algn="ctr" defTabSz="711200">
             <a:lnSpc>
               <a:spcPct val="90000"/>
             </a:lnSpc>
@@ -4227,10 +3116,10 @@
             </a:spcAft>
           </a:pPr>
           <a:r>
-            <a:rPr lang="en-US" sz="1700" kern="1200" dirty="0" smtClean="0"/>
+            <a:rPr lang="en-US" sz="1600" kern="1200" dirty="0" smtClean="0"/>
             <a:t>……</a:t>
           </a:r>
-          <a:endParaRPr lang="en-US" sz="1700" kern="1200" dirty="0"/>
+          <a:endParaRPr lang="en-US" sz="1600" kern="1200" dirty="0"/>
         </a:p>
       </dsp:txBody>
       <dsp:txXfrm>
@@ -4368,12 +3257,12 @@
         </a:fontRef>
       </dsp:style>
       <dsp:txBody>
-        <a:bodyPr spcFirstLastPara="0" vert="horz" wrap="square" lIns="10795" tIns="10795" rIns="10795" bIns="10795" numCol="1" spcCol="1270" anchor="ctr" anchorCtr="0">
+        <a:bodyPr spcFirstLastPara="0" vert="horz" wrap="square" lIns="10160" tIns="10160" rIns="10160" bIns="10160" numCol="1" spcCol="1270" anchor="ctr" anchorCtr="0">
           <a:noAutofit/>
         </a:bodyPr>
         <a:lstStyle/>
         <a:p>
-          <a:pPr lvl="0" algn="ctr" defTabSz="755650">
+          <a:pPr lvl="0" algn="ctr" defTabSz="711200">
             <a:lnSpc>
               <a:spcPct val="90000"/>
             </a:lnSpc>
@@ -4385,10 +3274,10 @@
             </a:spcAft>
           </a:pPr>
           <a:r>
-            <a:rPr lang="en-US" sz="1700" kern="1200" dirty="0" smtClean="0"/>
+            <a:rPr lang="en-US" sz="1600" kern="1200" dirty="0" smtClean="0"/>
             <a:t>M2</a:t>
           </a:r>
-          <a:endParaRPr lang="en-US" sz="1700" kern="1200" dirty="0"/>
+          <a:endParaRPr lang="en-US" sz="1600" kern="1200" dirty="0"/>
         </a:p>
       </dsp:txBody>
       <dsp:txXfrm>
@@ -4526,12 +3415,12 @@
         </a:fontRef>
       </dsp:style>
       <dsp:txBody>
-        <a:bodyPr spcFirstLastPara="0" vert="horz" wrap="square" lIns="10795" tIns="10795" rIns="10795" bIns="10795" numCol="1" spcCol="1270" anchor="ctr" anchorCtr="0">
+        <a:bodyPr spcFirstLastPara="0" vert="horz" wrap="square" lIns="10160" tIns="10160" rIns="10160" bIns="10160" numCol="1" spcCol="1270" anchor="ctr" anchorCtr="0">
           <a:noAutofit/>
         </a:bodyPr>
         <a:lstStyle/>
         <a:p>
-          <a:pPr lvl="0" algn="ctr" defTabSz="755650">
+          <a:pPr lvl="0" algn="ctr" defTabSz="711200">
             <a:lnSpc>
               <a:spcPct val="90000"/>
             </a:lnSpc>
@@ -4543,10 +3432,10 @@
             </a:spcAft>
           </a:pPr>
           <a:r>
-            <a:rPr lang="en-US" sz="1700" kern="1200" dirty="0" smtClean="0"/>
+            <a:rPr lang="en-US" sz="1600" kern="1200" dirty="0" smtClean="0"/>
             <a:t>……</a:t>
           </a:r>
-          <a:endParaRPr lang="en-US" sz="1700" kern="1200" dirty="0"/>
+          <a:endParaRPr lang="en-US" sz="1600" kern="1200" dirty="0"/>
         </a:p>
       </dsp:txBody>
       <dsp:txXfrm>
@@ -4684,12 +3573,12 @@
         </a:fontRef>
       </dsp:style>
       <dsp:txBody>
-        <a:bodyPr spcFirstLastPara="0" vert="horz" wrap="square" lIns="10795" tIns="10795" rIns="10795" bIns="10795" numCol="1" spcCol="1270" anchor="ctr" anchorCtr="0">
+        <a:bodyPr spcFirstLastPara="0" vert="horz" wrap="square" lIns="10160" tIns="10160" rIns="10160" bIns="10160" numCol="1" spcCol="1270" anchor="ctr" anchorCtr="0">
           <a:noAutofit/>
         </a:bodyPr>
         <a:lstStyle/>
         <a:p>
-          <a:pPr lvl="0" algn="ctr" defTabSz="755650">
+          <a:pPr lvl="0" algn="ctr" defTabSz="711200">
             <a:lnSpc>
               <a:spcPct val="90000"/>
             </a:lnSpc>
@@ -4701,10 +3590,10 @@
             </a:spcAft>
           </a:pPr>
           <a:r>
-            <a:rPr lang="en-US" sz="1700" kern="1200" dirty="0" smtClean="0"/>
+            <a:rPr lang="en-US" sz="1600" kern="1200" dirty="0" smtClean="0"/>
             <a:t>M3</a:t>
           </a:r>
-          <a:endParaRPr lang="en-US" sz="1700" kern="1200" dirty="0"/>
+          <a:endParaRPr lang="en-US" sz="1600" kern="1200" dirty="0"/>
         </a:p>
       </dsp:txBody>
       <dsp:txXfrm>
@@ -4842,12 +3731,12 @@
         </a:fontRef>
       </dsp:style>
       <dsp:txBody>
-        <a:bodyPr spcFirstLastPara="0" vert="horz" wrap="square" lIns="10795" tIns="10795" rIns="10795" bIns="10795" numCol="1" spcCol="1270" anchor="ctr" anchorCtr="0">
+        <a:bodyPr spcFirstLastPara="0" vert="horz" wrap="square" lIns="10160" tIns="10160" rIns="10160" bIns="10160" numCol="1" spcCol="1270" anchor="ctr" anchorCtr="0">
           <a:noAutofit/>
         </a:bodyPr>
         <a:lstStyle/>
         <a:p>
-          <a:pPr lvl="0" algn="ctr" defTabSz="755650">
+          <a:pPr lvl="0" algn="ctr" defTabSz="711200">
             <a:lnSpc>
               <a:spcPct val="90000"/>
             </a:lnSpc>
@@ -4859,10 +3748,10 @@
             </a:spcAft>
           </a:pPr>
           <a:r>
-            <a:rPr lang="en-US" sz="1700" kern="1200" dirty="0" smtClean="0"/>
+            <a:rPr lang="en-US" sz="1600" kern="1200" dirty="0" smtClean="0"/>
             <a:t>……</a:t>
           </a:r>
-          <a:endParaRPr lang="en-US" sz="1700" kern="1200" dirty="0"/>
+          <a:endParaRPr lang="en-US" sz="1600" kern="1200" dirty="0"/>
         </a:p>
       </dsp:txBody>
       <dsp:txXfrm>
@@ -5000,12 +3889,12 @@
         </a:fontRef>
       </dsp:style>
       <dsp:txBody>
-        <a:bodyPr spcFirstLastPara="0" vert="horz" wrap="square" lIns="10795" tIns="10795" rIns="10795" bIns="10795" numCol="1" spcCol="1270" anchor="ctr" anchorCtr="0">
+        <a:bodyPr spcFirstLastPara="0" vert="horz" wrap="square" lIns="10160" tIns="10160" rIns="10160" bIns="10160" numCol="1" spcCol="1270" anchor="ctr" anchorCtr="0">
           <a:noAutofit/>
         </a:bodyPr>
         <a:lstStyle/>
         <a:p>
-          <a:pPr lvl="0" algn="ctr" defTabSz="755650">
+          <a:pPr lvl="0" algn="ctr" defTabSz="711200">
             <a:lnSpc>
               <a:spcPct val="90000"/>
             </a:lnSpc>
@@ -5017,10 +3906,10 @@
             </a:spcAft>
           </a:pPr>
           <a:r>
-            <a:rPr lang="en-US" sz="1700" kern="1200" dirty="0" smtClean="0"/>
+            <a:rPr lang="en-US" sz="1600" kern="1200" dirty="0" smtClean="0"/>
             <a:t>M4</a:t>
           </a:r>
-          <a:endParaRPr lang="en-US" sz="1700" kern="1200" dirty="0"/>
+          <a:endParaRPr lang="en-US" sz="1600" kern="1200" dirty="0"/>
         </a:p>
       </dsp:txBody>
       <dsp:txXfrm>
@@ -5158,12 +4047,12 @@
         </a:fontRef>
       </dsp:style>
       <dsp:txBody>
-        <a:bodyPr spcFirstLastPara="0" vert="horz" wrap="square" lIns="10795" tIns="10795" rIns="10795" bIns="10795" numCol="1" spcCol="1270" anchor="ctr" anchorCtr="0">
+        <a:bodyPr spcFirstLastPara="0" vert="horz" wrap="square" lIns="10160" tIns="10160" rIns="10160" bIns="10160" numCol="1" spcCol="1270" anchor="ctr" anchorCtr="0">
           <a:noAutofit/>
         </a:bodyPr>
         <a:lstStyle/>
         <a:p>
-          <a:pPr lvl="0" algn="ctr" defTabSz="755650">
+          <a:pPr lvl="0" algn="ctr" defTabSz="711200">
             <a:lnSpc>
               <a:spcPct val="90000"/>
             </a:lnSpc>
@@ -5175,10 +4064,10 @@
             </a:spcAft>
           </a:pPr>
           <a:r>
-            <a:rPr lang="en-US" sz="1700" kern="1200" dirty="0" smtClean="0"/>
+            <a:rPr lang="en-US" sz="1600" kern="1200" dirty="0" smtClean="0"/>
             <a:t>……</a:t>
           </a:r>
-          <a:endParaRPr lang="en-US" sz="1700" kern="1200" dirty="0"/>
+          <a:endParaRPr lang="en-US" sz="1600" kern="1200" dirty="0"/>
         </a:p>
       </dsp:txBody>
       <dsp:txXfrm>
@@ -5316,12 +4205,12 @@
         </a:fontRef>
       </dsp:style>
       <dsp:txBody>
-        <a:bodyPr spcFirstLastPara="0" vert="horz" wrap="square" lIns="10795" tIns="10795" rIns="10795" bIns="10795" numCol="1" spcCol="1270" anchor="ctr" anchorCtr="0">
+        <a:bodyPr spcFirstLastPara="0" vert="horz" wrap="square" lIns="10160" tIns="10160" rIns="10160" bIns="10160" numCol="1" spcCol="1270" anchor="ctr" anchorCtr="0">
           <a:noAutofit/>
         </a:bodyPr>
         <a:lstStyle/>
         <a:p>
-          <a:pPr lvl="0" algn="ctr" defTabSz="755650">
+          <a:pPr lvl="0" algn="ctr" defTabSz="711200">
             <a:lnSpc>
               <a:spcPct val="90000"/>
             </a:lnSpc>
@@ -5333,10 +4222,10 @@
             </a:spcAft>
           </a:pPr>
           <a:r>
-            <a:rPr lang="en-US" sz="1700" kern="1200" dirty="0" smtClean="0"/>
+            <a:rPr lang="en-US" sz="1600" kern="1200" dirty="0" smtClean="0"/>
             <a:t>M5</a:t>
           </a:r>
-          <a:endParaRPr lang="en-US" sz="1700" kern="1200" dirty="0"/>
+          <a:endParaRPr lang="en-US" sz="1600" kern="1200" dirty="0"/>
         </a:p>
       </dsp:txBody>
       <dsp:txXfrm>
@@ -5474,12 +4363,12 @@
         </a:fontRef>
       </dsp:style>
       <dsp:txBody>
-        <a:bodyPr spcFirstLastPara="0" vert="horz" wrap="square" lIns="10795" tIns="10795" rIns="10795" bIns="10795" numCol="1" spcCol="1270" anchor="ctr" anchorCtr="0">
+        <a:bodyPr spcFirstLastPara="0" vert="horz" wrap="square" lIns="10160" tIns="10160" rIns="10160" bIns="10160" numCol="1" spcCol="1270" anchor="ctr" anchorCtr="0">
           <a:noAutofit/>
         </a:bodyPr>
         <a:lstStyle/>
         <a:p>
-          <a:pPr lvl="0" algn="ctr" defTabSz="755650">
+          <a:pPr lvl="0" algn="ctr" defTabSz="711200">
             <a:lnSpc>
               <a:spcPct val="90000"/>
             </a:lnSpc>
@@ -5491,10 +4380,10 @@
             </a:spcAft>
           </a:pPr>
           <a:r>
-            <a:rPr lang="en-US" sz="1700" kern="1200" dirty="0" smtClean="0"/>
+            <a:rPr lang="en-US" sz="1600" kern="1200" dirty="0" smtClean="0"/>
             <a:t>M6</a:t>
           </a:r>
-          <a:endParaRPr lang="en-US" sz="1700" kern="1200" dirty="0"/>
+          <a:endParaRPr lang="en-US" sz="1600" kern="1200" dirty="0"/>
         </a:p>
       </dsp:txBody>
       <dsp:txXfrm>
@@ -5632,12 +4521,12 @@
         </a:fontRef>
       </dsp:style>
       <dsp:txBody>
-        <a:bodyPr spcFirstLastPara="0" vert="horz" wrap="square" lIns="10795" tIns="10795" rIns="10795" bIns="10795" numCol="1" spcCol="1270" anchor="ctr" anchorCtr="0">
+        <a:bodyPr spcFirstLastPara="0" vert="horz" wrap="square" lIns="10160" tIns="10160" rIns="10160" bIns="10160" numCol="1" spcCol="1270" anchor="ctr" anchorCtr="0">
           <a:noAutofit/>
         </a:bodyPr>
         <a:lstStyle/>
         <a:p>
-          <a:pPr lvl="0" algn="ctr" defTabSz="755650">
+          <a:pPr lvl="0" algn="ctr" defTabSz="711200">
             <a:lnSpc>
               <a:spcPct val="90000"/>
             </a:lnSpc>
@@ -5649,10 +4538,10 @@
             </a:spcAft>
           </a:pPr>
           <a:r>
-            <a:rPr lang="en-US" sz="1700" kern="1200" dirty="0" smtClean="0"/>
+            <a:rPr lang="en-US" sz="1600" kern="1200" dirty="0" smtClean="0"/>
             <a:t>M7</a:t>
           </a:r>
-          <a:endParaRPr lang="en-US" sz="1700" kern="1200" dirty="0"/>
+          <a:endParaRPr lang="en-US" sz="1600" kern="1200" dirty="0"/>
         </a:p>
       </dsp:txBody>
       <dsp:txXfrm>
@@ -7152,7 +6041,7 @@
           <a:p>
             <a:fld id="{97406A20-164F-454F-9228-81D3270AA27A}" type="datetimeFigureOut">
               <a:rPr lang="en-US" smtClean="0"/>
-              <a:t>5/2/2010</a:t>
+              <a:t>5/3/2010</a:t>
             </a:fld>
             <a:endParaRPr lang="en-US"/>
           </a:p>
@@ -7465,7 +6354,7 @@
           <a:p>
             <a:fld id="{97406A20-164F-454F-9228-81D3270AA27A}" type="datetimeFigureOut">
               <a:rPr lang="en-US" smtClean="0"/>
-              <a:t>5/2/2010</a:t>
+              <a:t>5/3/2010</a:t>
             </a:fld>
             <a:endParaRPr lang="en-US"/>
           </a:p>
@@ -7650,7 +6539,7 @@
           <a:p>
             <a:fld id="{97406A20-164F-454F-9228-81D3270AA27A}" type="datetimeFigureOut">
               <a:rPr lang="en-US" smtClean="0"/>
-              <a:t>5/2/2010</a:t>
+              <a:t>5/3/2010</a:t>
             </a:fld>
             <a:endParaRPr lang="en-US"/>
           </a:p>
@@ -7825,7 +6714,7 @@
           <a:p>
             <a:fld id="{97406A20-164F-454F-9228-81D3270AA27A}" type="datetimeFigureOut">
               <a:rPr lang="en-US" smtClean="0"/>
-              <a:t>5/2/2010</a:t>
+              <a:t>5/3/2010</a:t>
             </a:fld>
             <a:endParaRPr lang="en-US"/>
           </a:p>
@@ -8093,7 +6982,7 @@
           <a:p>
             <a:fld id="{97406A20-164F-454F-9228-81D3270AA27A}" type="datetimeFigureOut">
               <a:rPr lang="en-US" smtClean="0"/>
-              <a:t>5/2/2010</a:t>
+              <a:t>5/3/2010</a:t>
             </a:fld>
             <a:endParaRPr lang="en-US"/>
           </a:p>
@@ -8561,7 +7450,7 @@
           <a:p>
             <a:fld id="{97406A20-164F-454F-9228-81D3270AA27A}" type="datetimeFigureOut">
               <a:rPr lang="en-US" smtClean="0"/>
-              <a:t>5/2/2010</a:t>
+              <a:t>5/3/2010</a:t>
             </a:fld>
             <a:endParaRPr lang="en-US"/>
           </a:p>
@@ -9050,7 +7939,7 @@
           <a:p>
             <a:fld id="{97406A20-164F-454F-9228-81D3270AA27A}" type="datetimeFigureOut">
               <a:rPr lang="en-US" smtClean="0"/>
-              <a:t>5/2/2010</a:t>
+              <a:t>5/3/2010</a:t>
             </a:fld>
             <a:endParaRPr lang="en-US"/>
           </a:p>
@@ -9176,7 +8065,7 @@
           <a:p>
             <a:fld id="{97406A20-164F-454F-9228-81D3270AA27A}" type="datetimeFigureOut">
               <a:rPr lang="en-US" smtClean="0"/>
-              <a:t>5/2/2010</a:t>
+              <a:t>5/3/2010</a:t>
             </a:fld>
             <a:endParaRPr lang="en-US"/>
           </a:p>
@@ -9320,7 +8209,7 @@
           <a:p>
             <a:fld id="{97406A20-164F-454F-9228-81D3270AA27A}" type="datetimeFigureOut">
               <a:rPr lang="en-US" smtClean="0"/>
-              <a:t>5/2/2010</a:t>
+              <a:t>5/3/2010</a:t>
             </a:fld>
             <a:endParaRPr lang="en-US"/>
           </a:p>
@@ -9642,7 +8531,7 @@
           <a:p>
             <a:fld id="{97406A20-164F-454F-9228-81D3270AA27A}" type="datetimeFigureOut">
               <a:rPr lang="en-US" smtClean="0"/>
-              <a:t>5/2/2010</a:t>
+              <a:t>5/3/2010</a:t>
             </a:fld>
             <a:endParaRPr lang="en-US"/>
           </a:p>
@@ -9776,7 +8665,7 @@
           <a:p>
             <a:fld id="{97406A20-164F-454F-9228-81D3270AA27A}" type="datetimeFigureOut">
               <a:rPr lang="en-US" smtClean="0"/>
-              <a:t>5/2/2010</a:t>
+              <a:t>5/3/2010</a:t>
             </a:fld>
             <a:endParaRPr lang="en-US"/>
           </a:p>
@@ -10557,7 +9446,7 @@
           <a:p>
             <a:fld id="{97406A20-164F-454F-9228-81D3270AA27A}" type="datetimeFigureOut">
               <a:rPr lang="en-US" smtClean="0"/>
-              <a:t>5/2/2010</a:t>
+              <a:t>5/3/2010</a:t>
             </a:fld>
             <a:endParaRPr lang="en-US"/>
           </a:p>
@@ -11080,15 +9969,7 @@
             </a:r>
             <a:r>
               <a:rPr lang="en-US" dirty="0" smtClean="0"/>
-              <a:t> </a:t>
-            </a:r>
-            <a:r>
-              <a:rPr lang="en-US" dirty="0" smtClean="0"/>
-              <a:t>Matrix Multiplication </a:t>
-            </a:r>
-            <a:r>
-              <a:rPr lang="en-US" dirty="0" smtClean="0"/>
-              <a:t>Algorithm</a:t>
+              <a:t> Matrix Multiplication Algorithm</a:t>
             </a:r>
             <a:endParaRPr lang="en-US" dirty="0"/>
           </a:p>
@@ -11133,6 +10014,18 @@
   <p:clrMapOvr>
     <a:masterClrMapping/>
   </p:clrMapOvr>
+  <mc:AlternateContent xmlns:mc="http://schemas.openxmlformats.org/markup-compatibility/2006" xmlns:p14="http://schemas.microsoft.com/office/powerpoint/2010/main">
+    <mc:Choice Requires="p14">
+      <p:transition spd="med" p14:dur="699">
+        <p:fade/>
+      </p:transition>
+    </mc:Choice>
+    <mc:Fallback xmlns="">
+      <p:transition xmlns:p14="http://schemas.microsoft.com/office/powerpoint/2010/main" spd="med">
+        <p:fade/>
+      </p:transition>
+    </mc:Fallback>
+  </mc:AlternateContent>
   <p:timing>
     <p:tnLst>
       <p:par>
@@ -11177,36 +10070,89 @@
           <a:p>
             <a:r>
               <a:rPr lang="en-US" dirty="0" smtClean="0"/>
-              <a:t>Results</a:t>
+              <a:t>Results Single-</a:t>
+            </a:r>
+            <a:r>
+              <a:rPr lang="en-US" dirty="0"/>
+              <a:t>t</a:t>
+            </a:r>
+            <a:r>
+              <a:rPr lang="en-US" dirty="0" smtClean="0"/>
+              <a:t>hreaded</a:t>
             </a:r>
             <a:endParaRPr lang="en-US" dirty="0"/>
           </a:p>
         </p:txBody>
       </p:sp>
-      <p:graphicFrame>
-        <p:nvGraphicFramePr>
-          <p:cNvPr id="4" name="Chart 3"/>
-          <p:cNvGraphicFramePr>
-            <a:graphicFrameLocks/>
-          </p:cNvGraphicFramePr>
-          <p:nvPr>
-            <p:extLst>
-              <p:ext uri="{D42A27DB-BD31-4B8C-83A1-F6EECF244321}">
-                <p14:modId xmlns:p14="http://schemas.microsoft.com/office/powerpoint/2010/main" val="466726344"/>
-              </p:ext>
-            </p:extLst>
-          </p:nvPr>
-        </p:nvGraphicFramePr>
-        <p:xfrm>
-          <a:off x="914400" y="1219200"/>
-          <a:ext cx="7816516" cy="5245768"/>
-        </p:xfrm>
-        <a:graphic>
-          <a:graphicData uri="http://schemas.openxmlformats.org/drawingml/2006/chart">
-            <c:chart xmlns:c="http://schemas.openxmlformats.org/drawingml/2006/chart" xmlns:r="http://schemas.openxmlformats.org/officeDocument/2006/relationships" r:id="rId2"/>
-          </a:graphicData>
-        </a:graphic>
-      </p:graphicFrame>
+      <p:pic>
+        <p:nvPicPr>
+          <p:cNvPr id="3074" name="Picture 2"/>
+          <p:cNvPicPr>
+            <a:picLocks noChangeAspect="1" noChangeArrowheads="1"/>
+          </p:cNvPicPr>
+          <p:nvPr/>
+        </p:nvPicPr>
+        <p:blipFill>
+          <a:blip r:embed="rId2">
+            <a:extLst>
+              <a:ext uri="{28A0092B-C50C-407E-A947-70E740481C1C}">
+                <a14:useLocalDpi xmlns:a14="http://schemas.microsoft.com/office/drawing/2010/main" val="0"/>
+              </a:ext>
+            </a:extLst>
+          </a:blip>
+          <a:srcRect/>
+          <a:stretch>
+            <a:fillRect/>
+          </a:stretch>
+        </p:blipFill>
+        <p:spPr bwMode="auto">
+          <a:xfrm>
+            <a:off x="1371600" y="1295400"/>
+            <a:ext cx="7102911" cy="4837113"/>
+          </a:xfrm>
+          <a:prstGeom prst="rect">
+            <a:avLst/>
+          </a:prstGeom>
+          <a:ln>
+            <a:noFill/>
+          </a:ln>
+          <a:effectLst>
+            <a:outerShdw blurRad="292100" dist="139700" dir="2700000" algn="tl" rotWithShape="0">
+              <a:srgbClr xmlns:mc="http://schemas.openxmlformats.org/markup-compatibility/2006" xmlns:a14="http://schemas.microsoft.com/office/drawing/2010/main" val="333333" mc:Ignorable="">
+                <a:alpha val="65000"/>
+              </a:srgbClr>
+            </a:outerShdw>
+          </a:effectLst>
+          <a:extLst>
+            <a:ext uri="{909E8E84-426E-40DD-AFC4-6F175D3DCCD1}">
+              <a14:hiddenFill xmlns:a14="http://schemas.microsoft.com/office/drawing/2010/main">
+                <a:solidFill>
+                  <a:schemeClr val="accent1"/>
+                </a:solidFill>
+              </a14:hiddenFill>
+            </a:ext>
+            <a:ext uri="{91240B29-F687-4F45-9708-019B960494DF}">
+              <a14:hiddenLine xmlns:a14="http://schemas.microsoft.com/office/drawing/2010/main" w="9525">
+                <a:solidFill>
+                  <a:schemeClr val="tx1"/>
+                </a:solidFill>
+                <a:miter lim="800000"/>
+                <a:headEnd/>
+                <a:tailEnd/>
+              </a14:hiddenLine>
+            </a:ext>
+            <a:ext uri="{AF507438-7753-43E0-B8FC-AC1667EBCBE1}">
+              <a14:hiddenEffects xmlns:a14="http://schemas.microsoft.com/office/drawing/2010/main">
+                <a:effectLst>
+                  <a:outerShdw dist="35921" dir="2700000" algn="ctr" rotWithShape="0">
+                    <a:schemeClr val="bg2"/>
+                  </a:outerShdw>
+                </a:effectLst>
+              </a14:hiddenEffects>
+            </a:ext>
+          </a:extLst>
+        </p:spPr>
+      </p:pic>
     </p:spTree>
     <p:extLst>
       <p:ext uri="{BB962C8B-B14F-4D97-AF65-F5344CB8AC3E}">
@@ -11217,6 +10163,18 @@
   <p:clrMapOvr>
     <a:masterClrMapping/>
   </p:clrMapOvr>
+  <mc:AlternateContent xmlns:mc="http://schemas.openxmlformats.org/markup-compatibility/2006" xmlns:p14="http://schemas.microsoft.com/office/powerpoint/2010/main">
+    <mc:Choice Requires="p14">
+      <p:transition spd="slow">
+        <p14:flash/>
+      </p:transition>
+    </mc:Choice>
+    <mc:Fallback xmlns="">
+      <p:transition xmlns:p14="http://schemas.microsoft.com/office/powerpoint/2010/main" spd="slow">
+        <p:fade/>
+      </p:transition>
+    </mc:Fallback>
+  </mc:AlternateContent>
   <p:timing>
     <p:tnLst>
       <p:par>
@@ -11324,6 +10282,16 @@
   <p:clrMapOvr>
     <a:masterClrMapping/>
   </p:clrMapOvr>
+  <p:transition xmlns:p14="http://schemas.microsoft.com/office/powerpoint/2010/main" spd="slow">
+    <p:cover/>
+  </p:transition>
+  <p:timing>
+    <p:tnLst>
+      <p:par>
+        <p:cTn xmlns:p14="http://schemas.microsoft.com/office/powerpoint/2010/main" id="1" dur="indefinite" restart="never" nodeType="tmRoot"/>
+      </p:par>
+    </p:tnLst>
+  </p:timing>
 </p:sld>
 </file>
 
@@ -11439,6 +10407,18 @@
   <p:clrMapOvr>
     <a:masterClrMapping/>
   </p:clrMapOvr>
+  <mc:AlternateContent xmlns:mc="http://schemas.openxmlformats.org/markup-compatibility/2006" xmlns:p14="http://schemas.microsoft.com/office/powerpoint/2010/main">
+    <mc:Choice Requires="p14">
+      <p:transition spd="slow">
+        <p14:ripple/>
+      </p:transition>
+    </mc:Choice>
+    <mc:Fallback xmlns="">
+      <p:transition xmlns:p14="http://schemas.microsoft.com/office/powerpoint/2010/main" spd="slow">
+        <p:fade/>
+      </p:transition>
+    </mc:Fallback>
+  </mc:AlternateContent>
   <p:timing>
     <p:tnLst>
       <p:par>
@@ -12052,6 +11032,18 @@
   <p:clrMapOvr>
     <a:masterClrMapping/>
   </p:clrMapOvr>
+  <mc:AlternateContent xmlns:mc="http://schemas.openxmlformats.org/markup-compatibility/2006" xmlns:p14="http://schemas.microsoft.com/office/powerpoint/2010/main">
+    <mc:Choice Requires="p14">
+      <p:transition spd="slow" p14:dur="1200">
+        <p14:prism/>
+      </p:transition>
+    </mc:Choice>
+    <mc:Fallback xmlns="">
+      <p:transition xmlns:p14="http://schemas.microsoft.com/office/powerpoint/2010/main" spd="slow">
+        <p:fade/>
+      </p:transition>
+    </mc:Fallback>
+  </mc:AlternateContent>
   <p:timing>
     <p:tnLst>
       <p:par>
@@ -12137,11 +11129,7 @@
           <a:p>
             <a:r>
               <a:rPr lang="en-US" dirty="0" smtClean="0"/>
-              <a:t>Algorithm </a:t>
-            </a:r>
-            <a:r>
-              <a:rPr lang="en-US" dirty="0" smtClean="0"/>
-              <a:t>applied recursively at phase 2, till appropriate granularity is achieved. </a:t>
+              <a:t>Algorithm applied recursively at phase 2, till appropriate granularity is achieved. </a:t>
             </a:r>
           </a:p>
           <a:p>
@@ -12415,6 +11403,9 @@
   <p:clrMapOvr>
     <a:masterClrMapping/>
   </p:clrMapOvr>
+  <p:transition xmlns:p14="http://schemas.microsoft.com/office/powerpoint/2010/main" spd="slow">
+    <p:pull/>
+  </p:transition>
   <p:timing>
     <p:tnLst>
       <p:par>
@@ -12454,7 +11445,9 @@
         </p:nvSpPr>
         <p:spPr/>
         <p:txBody>
-          <a:bodyPr/>
+          <a:bodyPr>
+            <a:normAutofit fontScale="90000"/>
+          </a:bodyPr>
           <a:lstStyle/>
           <a:p>
             <a:r>
@@ -12506,11 +11499,7 @@
             </a:r>
             <a:r>
               <a:rPr lang="en-US" dirty="0" smtClean="0"/>
-              <a:t> </a:t>
-            </a:r>
-            <a:r>
-              <a:rPr lang="en-US" dirty="0" smtClean="0"/>
-              <a:t>method reduces the number of multiplication operations to 7, not 8</a:t>
+              <a:t> method reduces the number of multiplication operations to 7, not 8</a:t>
             </a:r>
           </a:p>
           <a:p>
@@ -12820,6 +11809,18 @@
   <p:clrMapOvr>
     <a:masterClrMapping/>
   </p:clrMapOvr>
+  <mc:AlternateContent xmlns:mc="http://schemas.openxmlformats.org/markup-compatibility/2006" xmlns:p14="http://schemas.microsoft.com/office/powerpoint/2010/main">
+    <mc:Choice Requires="p14">
+      <p:transition spd="slow" p14:dur="1399">
+        <p14:ripple/>
+      </p:transition>
+    </mc:Choice>
+    <mc:Fallback xmlns="">
+      <p:transition xmlns:p14="http://schemas.microsoft.com/office/powerpoint/2010/main" spd="slow">
+        <p:fade/>
+      </p:transition>
+    </mc:Fallback>
+  </mc:AlternateContent>
   <p:timing>
     <p:tnLst>
       <p:par>
@@ -12902,13 +11903,8 @@
           <a:p>
             <a:r>
               <a:rPr lang="en-US" dirty="0" smtClean="0"/>
-              <a:t>All iterative processes are </a:t>
+              <a:t>All iterative processes are parallelized.</a:t>
             </a:r>
-            <a:r>
-              <a:rPr lang="en-US" dirty="0" smtClean="0"/>
-              <a:t>parallelized.</a:t>
-            </a:r>
-            <a:endParaRPr lang="en-US" dirty="0" smtClean="0"/>
           </a:p>
           <a:p>
             <a:r>
@@ -12940,6 +11936,18 @@
   <p:clrMapOvr>
     <a:masterClrMapping/>
   </p:clrMapOvr>
+  <mc:AlternateContent xmlns:mc="http://schemas.openxmlformats.org/markup-compatibility/2006" xmlns:p14="http://schemas.microsoft.com/office/powerpoint/2010/main">
+    <mc:Choice Requires="p14">
+      <p:transition spd="slow" p14:dur="1500">
+        <p:split orient="vert"/>
+      </p:transition>
+    </mc:Choice>
+    <mc:Fallback xmlns="">
+      <p:transition xmlns:p14="http://schemas.microsoft.com/office/powerpoint/2010/main" spd="slow">
+        <p:split orient="vert"/>
+      </p:transition>
+    </mc:Fallback>
+  </mc:AlternateContent>
   <p:timing>
     <p:tnLst>
       <p:par>
@@ -13025,6 +12033,18 @@
   <p:clrMapOvr>
     <a:masterClrMapping/>
   </p:clrMapOvr>
+  <mc:AlternateContent xmlns:mc="http://schemas.openxmlformats.org/markup-compatibility/2006" xmlns:p14="http://schemas.microsoft.com/office/powerpoint/2010/main">
+    <mc:Choice Requires="p14">
+      <p:transition spd="slow" p14:dur="800">
+        <p:circle/>
+      </p:transition>
+    </mc:Choice>
+    <mc:Fallback xmlns="">
+      <p:transition xmlns:p14="http://schemas.microsoft.com/office/powerpoint/2010/main" spd="slow">
+        <p:circle/>
+      </p:transition>
+    </mc:Fallback>
+  </mc:AlternateContent>
   <p:timing>
     <p:tnLst>
       <p:par>
@@ -13077,30 +12097,75 @@
           </a:p>
         </p:txBody>
       </p:sp>
-      <p:graphicFrame>
-        <p:nvGraphicFramePr>
-          <p:cNvPr id="4" name="Chart 3"/>
-          <p:cNvGraphicFramePr>
-            <a:graphicFrameLocks/>
-          </p:cNvGraphicFramePr>
-          <p:nvPr>
-            <p:extLst>
-              <p:ext uri="{D42A27DB-BD31-4B8C-83A1-F6EECF244321}">
-                <p14:modId xmlns:p14="http://schemas.microsoft.com/office/powerpoint/2010/main" val="1047627959"/>
-              </p:ext>
-            </p:extLst>
-          </p:nvPr>
-        </p:nvGraphicFramePr>
-        <p:xfrm>
-          <a:off x="914400" y="1143000"/>
-          <a:ext cx="7848600" cy="5486400"/>
-        </p:xfrm>
-        <a:graphic>
-          <a:graphicData uri="http://schemas.openxmlformats.org/drawingml/2006/chart">
-            <c:chart xmlns:c="http://schemas.openxmlformats.org/drawingml/2006/chart" xmlns:r="http://schemas.openxmlformats.org/officeDocument/2006/relationships" r:id="rId2"/>
-          </a:graphicData>
-        </a:graphic>
-      </p:graphicFrame>
+      <p:pic>
+        <p:nvPicPr>
+          <p:cNvPr id="1026" name="Picture 2"/>
+          <p:cNvPicPr>
+            <a:picLocks noChangeAspect="1" noChangeArrowheads="1"/>
+          </p:cNvPicPr>
+          <p:nvPr/>
+        </p:nvPicPr>
+        <p:blipFill>
+          <a:blip r:embed="rId2">
+            <a:extLst>
+              <a:ext uri="{28A0092B-C50C-407E-A947-70E740481C1C}">
+                <a14:useLocalDpi xmlns:a14="http://schemas.microsoft.com/office/drawing/2010/main" val="0"/>
+              </a:ext>
+            </a:extLst>
+          </a:blip>
+          <a:srcRect/>
+          <a:stretch>
+            <a:fillRect/>
+          </a:stretch>
+        </p:blipFill>
+        <p:spPr bwMode="auto">
+          <a:xfrm>
+            <a:off x="1143000" y="1219200"/>
+            <a:ext cx="7292353" cy="4914900"/>
+          </a:xfrm>
+          <a:prstGeom prst="rect">
+            <a:avLst/>
+          </a:prstGeom>
+          <a:ln>
+            <a:noFill/>
+          </a:ln>
+          <a:effectLst>
+            <a:outerShdw blurRad="292100" dist="139700" dir="2700000" algn="tl" rotWithShape="0">
+              <a:srgbClr xmlns:mc="http://schemas.openxmlformats.org/markup-compatibility/2006" xmlns:a14="http://schemas.microsoft.com/office/drawing/2010/main" val="333333" mc:Ignorable="">
+                <a:alpha val="65000"/>
+              </a:srgbClr>
+            </a:outerShdw>
+          </a:effectLst>
+          <a:extLst>
+            <a:ext uri="{909E8E84-426E-40DD-AFC4-6F175D3DCCD1}">
+              <a14:hiddenFill xmlns:a14="http://schemas.microsoft.com/office/drawing/2010/main">
+                <a:solidFill>
+                  <a:schemeClr val="accent1"/>
+                </a:solidFill>
+              </a14:hiddenFill>
+            </a:ext>
+            <a:ext uri="{91240B29-F687-4F45-9708-019B960494DF}">
+              <a14:hiddenLine xmlns:a14="http://schemas.microsoft.com/office/drawing/2010/main" w="9525">
+                <a:solidFill>
+                  <a:schemeClr val="tx1"/>
+                </a:solidFill>
+                <a:miter lim="800000"/>
+                <a:headEnd/>
+                <a:tailEnd/>
+              </a14:hiddenLine>
+            </a:ext>
+            <a:ext uri="{AF507438-7753-43E0-B8FC-AC1667EBCBE1}">
+              <a14:hiddenEffects xmlns:a14="http://schemas.microsoft.com/office/drawing/2010/main">
+                <a:effectLst>
+                  <a:outerShdw dist="35921" dir="2700000" algn="ctr" rotWithShape="0">
+                    <a:schemeClr val="bg2"/>
+                  </a:outerShdw>
+                </a:effectLst>
+              </a14:hiddenEffects>
+            </a:ext>
+          </a:extLst>
+        </p:spPr>
+      </p:pic>
     </p:spTree>
     <p:extLst>
       <p:ext uri="{BB962C8B-B14F-4D97-AF65-F5344CB8AC3E}">
@@ -13111,6 +12176,18 @@
   <p:clrMapOvr>
     <a:masterClrMapping/>
   </p:clrMapOvr>
+  <mc:AlternateContent xmlns:mc="http://schemas.openxmlformats.org/markup-compatibility/2006" xmlns:p14="http://schemas.microsoft.com/office/powerpoint/2010/main">
+    <mc:Choice Requires="p14">
+      <p:transition spd="slow">
+        <p14:flash/>
+      </p:transition>
+    </mc:Choice>
+    <mc:Fallback xmlns="">
+      <p:transition xmlns:p14="http://schemas.microsoft.com/office/powerpoint/2010/main" spd="slow">
+        <p:fade/>
+      </p:transition>
+    </mc:Fallback>
+  </mc:AlternateContent>
   <p:timing>
     <p:tnLst>
       <p:par>
@@ -13155,36 +12232,81 @@
           <a:p>
             <a:r>
               <a:rPr lang="en-US" dirty="0" smtClean="0"/>
-              <a:t>Results</a:t>
+              <a:t>Results, Multi-threaded</a:t>
             </a:r>
             <a:endParaRPr lang="en-US" dirty="0"/>
           </a:p>
         </p:txBody>
       </p:sp>
-      <p:graphicFrame>
-        <p:nvGraphicFramePr>
-          <p:cNvPr id="4" name="Chart 3"/>
-          <p:cNvGraphicFramePr>
-            <a:graphicFrameLocks/>
-          </p:cNvGraphicFramePr>
-          <p:nvPr>
-            <p:extLst>
-              <p:ext uri="{D42A27DB-BD31-4B8C-83A1-F6EECF244321}">
-                <p14:modId xmlns:p14="http://schemas.microsoft.com/office/powerpoint/2010/main" val="593460546"/>
-              </p:ext>
-            </p:extLst>
-          </p:nvPr>
-        </p:nvGraphicFramePr>
-        <p:xfrm>
-          <a:off x="914400" y="1143000"/>
-          <a:ext cx="8077200" cy="5410200"/>
-        </p:xfrm>
-        <a:graphic>
-          <a:graphicData uri="http://schemas.openxmlformats.org/drawingml/2006/chart">
-            <c:chart xmlns:c="http://schemas.openxmlformats.org/drawingml/2006/chart" xmlns:r="http://schemas.openxmlformats.org/officeDocument/2006/relationships" r:id="rId2"/>
-          </a:graphicData>
-        </a:graphic>
-      </p:graphicFrame>
+      <p:pic>
+        <p:nvPicPr>
+          <p:cNvPr id="2050" name="Picture 2"/>
+          <p:cNvPicPr>
+            <a:picLocks noChangeAspect="1" noChangeArrowheads="1"/>
+          </p:cNvPicPr>
+          <p:nvPr/>
+        </p:nvPicPr>
+        <p:blipFill>
+          <a:blip r:embed="rId2">
+            <a:extLst>
+              <a:ext uri="{28A0092B-C50C-407E-A947-70E740481C1C}">
+                <a14:useLocalDpi xmlns:a14="http://schemas.microsoft.com/office/drawing/2010/main" val="0"/>
+              </a:ext>
+            </a:extLst>
+          </a:blip>
+          <a:srcRect/>
+          <a:stretch>
+            <a:fillRect/>
+          </a:stretch>
+        </p:blipFill>
+        <p:spPr bwMode="auto">
+          <a:xfrm>
+            <a:off x="1295400" y="1295400"/>
+            <a:ext cx="6967538" cy="4766333"/>
+          </a:xfrm>
+          <a:prstGeom prst="rect">
+            <a:avLst/>
+          </a:prstGeom>
+          <a:ln>
+            <a:noFill/>
+          </a:ln>
+          <a:effectLst>
+            <a:outerShdw blurRad="292100" dist="139700" dir="2700000" algn="tl" rotWithShape="0">
+              <a:srgbClr xmlns:mc="http://schemas.openxmlformats.org/markup-compatibility/2006" xmlns:a14="http://schemas.microsoft.com/office/drawing/2010/main" val="333333" mc:Ignorable="">
+                <a:alpha val="65000"/>
+              </a:srgbClr>
+            </a:outerShdw>
+          </a:effectLst>
+          <a:extLst>
+            <a:ext uri="{909E8E84-426E-40DD-AFC4-6F175D3DCCD1}">
+              <a14:hiddenFill xmlns:a14="http://schemas.microsoft.com/office/drawing/2010/main">
+                <a:solidFill>
+                  <a:schemeClr val="accent1"/>
+                </a:solidFill>
+              </a14:hiddenFill>
+            </a:ext>
+            <a:ext uri="{91240B29-F687-4F45-9708-019B960494DF}">
+              <a14:hiddenLine xmlns:a14="http://schemas.microsoft.com/office/drawing/2010/main" w="9525">
+                <a:solidFill>
+                  <a:schemeClr val="tx1"/>
+                </a:solidFill>
+                <a:miter lim="800000"/>
+                <a:headEnd/>
+                <a:tailEnd/>
+              </a14:hiddenLine>
+            </a:ext>
+            <a:ext uri="{AF507438-7753-43E0-B8FC-AC1667EBCBE1}">
+              <a14:hiddenEffects xmlns:a14="http://schemas.microsoft.com/office/drawing/2010/main">
+                <a:effectLst>
+                  <a:outerShdw dist="35921" dir="2700000" algn="ctr" rotWithShape="0">
+                    <a:schemeClr val="bg2"/>
+                  </a:outerShdw>
+                </a:effectLst>
+              </a14:hiddenEffects>
+            </a:ext>
+          </a:extLst>
+        </p:spPr>
+      </p:pic>
     </p:spTree>
     <p:extLst>
       <p:ext uri="{BB962C8B-B14F-4D97-AF65-F5344CB8AC3E}">
@@ -13195,6 +12317,18 @@
   <p:clrMapOvr>
     <a:masterClrMapping/>
   </p:clrMapOvr>
+  <mc:AlternateContent xmlns:mc="http://schemas.openxmlformats.org/markup-compatibility/2006" xmlns:p14="http://schemas.microsoft.com/office/powerpoint/2010/main">
+    <mc:Choice Requires="p14">
+      <p:transition spd="slow">
+        <p14:flash/>
+      </p:transition>
+    </mc:Choice>
+    <mc:Fallback xmlns="">
+      <p:transition xmlns:p14="http://schemas.microsoft.com/office/powerpoint/2010/main" spd="slow">
+        <p:fade/>
+      </p:transition>
+    </mc:Fallback>
+  </mc:AlternateContent>
   <p:timing>
     <p:tnLst>
       <p:par>

</xml_diff>

<commit_message>
Made a couple of cosmetic changes to the powerpoint
</commit_message>
<xml_diff>
--- a/Strassen Multiplication Algorithm.pptx
+++ b/Strassen Multiplication Algorithm.pptx
@@ -2309,12 +2309,12 @@
         </a:fontRef>
       </dsp:style>
       <dsp:txBody>
-        <a:bodyPr spcFirstLastPara="0" vert="horz" wrap="square" lIns="10160" tIns="10160" rIns="10160" bIns="10160" numCol="1" spcCol="1270" anchor="ctr" anchorCtr="0">
+        <a:bodyPr spcFirstLastPara="0" vert="horz" wrap="square" lIns="10795" tIns="10795" rIns="10795" bIns="10795" numCol="1" spcCol="1270" anchor="ctr" anchorCtr="0">
           <a:noAutofit/>
         </a:bodyPr>
         <a:lstStyle/>
         <a:p>
-          <a:pPr lvl="0" algn="ctr" defTabSz="711200">
+          <a:pPr lvl="0" algn="ctr" defTabSz="755650">
             <a:lnSpc>
               <a:spcPct val="90000"/>
             </a:lnSpc>
@@ -2326,10 +2326,10 @@
             </a:spcAft>
           </a:pPr>
           <a:r>
-            <a:rPr lang="en-US" sz="1600" kern="1200" dirty="0" smtClean="0"/>
+            <a:rPr lang="en-US" sz="1700" kern="1200" dirty="0" smtClean="0"/>
             <a:t>C=A*B</a:t>
           </a:r>
-          <a:endParaRPr lang="en-US" sz="1600" kern="1200" dirty="0"/>
+          <a:endParaRPr lang="en-US" sz="1700" kern="1200" dirty="0"/>
         </a:p>
       </dsp:txBody>
       <dsp:txXfrm>
@@ -2467,12 +2467,12 @@
         </a:fontRef>
       </dsp:style>
       <dsp:txBody>
-        <a:bodyPr spcFirstLastPara="0" vert="horz" wrap="square" lIns="10160" tIns="10160" rIns="10160" bIns="10160" numCol="1" spcCol="1270" anchor="ctr" anchorCtr="0">
+        <a:bodyPr spcFirstLastPara="0" vert="horz" wrap="square" lIns="10795" tIns="10795" rIns="10795" bIns="10795" numCol="1" spcCol="1270" anchor="ctr" anchorCtr="0">
           <a:noAutofit/>
         </a:bodyPr>
         <a:lstStyle/>
         <a:p>
-          <a:pPr lvl="0" algn="ctr" defTabSz="711200">
+          <a:pPr lvl="0" algn="ctr" defTabSz="755650">
             <a:lnSpc>
               <a:spcPct val="90000"/>
             </a:lnSpc>
@@ -2484,10 +2484,10 @@
             </a:spcAft>
           </a:pPr>
           <a:r>
-            <a:rPr lang="en-US" sz="1600" kern="1200" dirty="0" smtClean="0"/>
+            <a:rPr lang="en-US" sz="1700" kern="1200" dirty="0" smtClean="0"/>
             <a:t>M1</a:t>
           </a:r>
-          <a:endParaRPr lang="en-US" sz="1600" kern="1200" dirty="0"/>
+          <a:endParaRPr lang="en-US" sz="1700" kern="1200" dirty="0"/>
         </a:p>
       </dsp:txBody>
       <dsp:txXfrm>
@@ -2625,12 +2625,12 @@
         </a:fontRef>
       </dsp:style>
       <dsp:txBody>
-        <a:bodyPr spcFirstLastPara="0" vert="horz" wrap="square" lIns="10160" tIns="10160" rIns="10160" bIns="10160" numCol="1" spcCol="1270" anchor="ctr" anchorCtr="0">
+        <a:bodyPr spcFirstLastPara="0" vert="horz" wrap="square" lIns="10795" tIns="10795" rIns="10795" bIns="10795" numCol="1" spcCol="1270" anchor="ctr" anchorCtr="0">
           <a:noAutofit/>
         </a:bodyPr>
         <a:lstStyle/>
         <a:p>
-          <a:pPr lvl="0" algn="ctr" defTabSz="711200">
+          <a:pPr lvl="0" algn="ctr" defTabSz="755650">
             <a:lnSpc>
               <a:spcPct val="90000"/>
             </a:lnSpc>
@@ -2642,10 +2642,10 @@
             </a:spcAft>
           </a:pPr>
           <a:r>
-            <a:rPr lang="en-US" sz="1600" kern="1200" dirty="0" smtClean="0"/>
+            <a:rPr lang="en-US" sz="1700" kern="1200" dirty="0" smtClean="0"/>
             <a:t>M1-&gt;M1</a:t>
           </a:r>
-          <a:endParaRPr lang="en-US" sz="1600" kern="1200" dirty="0"/>
+          <a:endParaRPr lang="en-US" sz="1700" kern="1200" dirty="0"/>
         </a:p>
       </dsp:txBody>
       <dsp:txXfrm>
@@ -2783,12 +2783,12 @@
         </a:fontRef>
       </dsp:style>
       <dsp:txBody>
-        <a:bodyPr spcFirstLastPara="0" vert="horz" wrap="square" lIns="10160" tIns="10160" rIns="10160" bIns="10160" numCol="1" spcCol="1270" anchor="ctr" anchorCtr="0">
+        <a:bodyPr spcFirstLastPara="0" vert="horz" wrap="square" lIns="10795" tIns="10795" rIns="10795" bIns="10795" numCol="1" spcCol="1270" anchor="ctr" anchorCtr="0">
           <a:noAutofit/>
         </a:bodyPr>
         <a:lstStyle/>
         <a:p>
-          <a:pPr lvl="0" algn="ctr" defTabSz="711200">
+          <a:pPr lvl="0" algn="ctr" defTabSz="755650">
             <a:lnSpc>
               <a:spcPct val="90000"/>
             </a:lnSpc>
@@ -2800,10 +2800,10 @@
             </a:spcAft>
           </a:pPr>
           <a:r>
-            <a:rPr lang="en-US" sz="1600" kern="1200" dirty="0" smtClean="0"/>
+            <a:rPr lang="en-US" sz="1700" kern="1200" dirty="0" smtClean="0"/>
             <a:t>M1-&gt;M2</a:t>
           </a:r>
-          <a:endParaRPr lang="en-US" sz="1600" kern="1200" dirty="0"/>
+          <a:endParaRPr lang="en-US" sz="1700" kern="1200" dirty="0"/>
         </a:p>
       </dsp:txBody>
       <dsp:txXfrm>
@@ -2941,12 +2941,12 @@
         </a:fontRef>
       </dsp:style>
       <dsp:txBody>
-        <a:bodyPr spcFirstLastPara="0" vert="horz" wrap="square" lIns="10160" tIns="10160" rIns="10160" bIns="10160" numCol="1" spcCol="1270" anchor="ctr" anchorCtr="0">
+        <a:bodyPr spcFirstLastPara="0" vert="horz" wrap="square" lIns="10795" tIns="10795" rIns="10795" bIns="10795" numCol="1" spcCol="1270" anchor="ctr" anchorCtr="0">
           <a:noAutofit/>
         </a:bodyPr>
         <a:lstStyle/>
         <a:p>
-          <a:pPr lvl="0" algn="ctr" defTabSz="711200">
+          <a:pPr lvl="0" algn="ctr" defTabSz="755650">
             <a:lnSpc>
               <a:spcPct val="90000"/>
             </a:lnSpc>
@@ -2958,10 +2958,10 @@
             </a:spcAft>
           </a:pPr>
           <a:r>
-            <a:rPr lang="en-US" sz="1600" kern="1200" dirty="0" smtClean="0"/>
+            <a:rPr lang="en-US" sz="1700" kern="1200" dirty="0" smtClean="0"/>
             <a:t>M1-&gt;M3</a:t>
           </a:r>
-          <a:endParaRPr lang="en-US" sz="1600" kern="1200" dirty="0"/>
+          <a:endParaRPr lang="en-US" sz="1700" kern="1200" dirty="0"/>
         </a:p>
       </dsp:txBody>
       <dsp:txXfrm>
@@ -3099,12 +3099,12 @@
         </a:fontRef>
       </dsp:style>
       <dsp:txBody>
-        <a:bodyPr spcFirstLastPara="0" vert="horz" wrap="square" lIns="10160" tIns="10160" rIns="10160" bIns="10160" numCol="1" spcCol="1270" anchor="ctr" anchorCtr="0">
+        <a:bodyPr spcFirstLastPara="0" vert="horz" wrap="square" lIns="10795" tIns="10795" rIns="10795" bIns="10795" numCol="1" spcCol="1270" anchor="ctr" anchorCtr="0">
           <a:noAutofit/>
         </a:bodyPr>
         <a:lstStyle/>
         <a:p>
-          <a:pPr lvl="0" algn="ctr" defTabSz="711200">
+          <a:pPr lvl="0" algn="ctr" defTabSz="755650">
             <a:lnSpc>
               <a:spcPct val="90000"/>
             </a:lnSpc>
@@ -3116,10 +3116,10 @@
             </a:spcAft>
           </a:pPr>
           <a:r>
-            <a:rPr lang="en-US" sz="1600" kern="1200" dirty="0" smtClean="0"/>
+            <a:rPr lang="en-US" sz="1700" kern="1200" dirty="0" smtClean="0"/>
             <a:t>……</a:t>
           </a:r>
-          <a:endParaRPr lang="en-US" sz="1600" kern="1200" dirty="0"/>
+          <a:endParaRPr lang="en-US" sz="1700" kern="1200" dirty="0"/>
         </a:p>
       </dsp:txBody>
       <dsp:txXfrm>
@@ -3257,12 +3257,12 @@
         </a:fontRef>
       </dsp:style>
       <dsp:txBody>
-        <a:bodyPr spcFirstLastPara="0" vert="horz" wrap="square" lIns="10160" tIns="10160" rIns="10160" bIns="10160" numCol="1" spcCol="1270" anchor="ctr" anchorCtr="0">
+        <a:bodyPr spcFirstLastPara="0" vert="horz" wrap="square" lIns="10795" tIns="10795" rIns="10795" bIns="10795" numCol="1" spcCol="1270" anchor="ctr" anchorCtr="0">
           <a:noAutofit/>
         </a:bodyPr>
         <a:lstStyle/>
         <a:p>
-          <a:pPr lvl="0" algn="ctr" defTabSz="711200">
+          <a:pPr lvl="0" algn="ctr" defTabSz="755650">
             <a:lnSpc>
               <a:spcPct val="90000"/>
             </a:lnSpc>
@@ -3274,10 +3274,10 @@
             </a:spcAft>
           </a:pPr>
           <a:r>
-            <a:rPr lang="en-US" sz="1600" kern="1200" dirty="0" smtClean="0"/>
+            <a:rPr lang="en-US" sz="1700" kern="1200" dirty="0" smtClean="0"/>
             <a:t>M2</a:t>
           </a:r>
-          <a:endParaRPr lang="en-US" sz="1600" kern="1200" dirty="0"/>
+          <a:endParaRPr lang="en-US" sz="1700" kern="1200" dirty="0"/>
         </a:p>
       </dsp:txBody>
       <dsp:txXfrm>
@@ -3415,12 +3415,12 @@
         </a:fontRef>
       </dsp:style>
       <dsp:txBody>
-        <a:bodyPr spcFirstLastPara="0" vert="horz" wrap="square" lIns="10160" tIns="10160" rIns="10160" bIns="10160" numCol="1" spcCol="1270" anchor="ctr" anchorCtr="0">
+        <a:bodyPr spcFirstLastPara="0" vert="horz" wrap="square" lIns="10795" tIns="10795" rIns="10795" bIns="10795" numCol="1" spcCol="1270" anchor="ctr" anchorCtr="0">
           <a:noAutofit/>
         </a:bodyPr>
         <a:lstStyle/>
         <a:p>
-          <a:pPr lvl="0" algn="ctr" defTabSz="711200">
+          <a:pPr lvl="0" algn="ctr" defTabSz="755650">
             <a:lnSpc>
               <a:spcPct val="90000"/>
             </a:lnSpc>
@@ -3432,10 +3432,10 @@
             </a:spcAft>
           </a:pPr>
           <a:r>
-            <a:rPr lang="en-US" sz="1600" kern="1200" dirty="0" smtClean="0"/>
+            <a:rPr lang="en-US" sz="1700" kern="1200" dirty="0" smtClean="0"/>
             <a:t>……</a:t>
           </a:r>
-          <a:endParaRPr lang="en-US" sz="1600" kern="1200" dirty="0"/>
+          <a:endParaRPr lang="en-US" sz="1700" kern="1200" dirty="0"/>
         </a:p>
       </dsp:txBody>
       <dsp:txXfrm>
@@ -3573,12 +3573,12 @@
         </a:fontRef>
       </dsp:style>
       <dsp:txBody>
-        <a:bodyPr spcFirstLastPara="0" vert="horz" wrap="square" lIns="10160" tIns="10160" rIns="10160" bIns="10160" numCol="1" spcCol="1270" anchor="ctr" anchorCtr="0">
+        <a:bodyPr spcFirstLastPara="0" vert="horz" wrap="square" lIns="10795" tIns="10795" rIns="10795" bIns="10795" numCol="1" spcCol="1270" anchor="ctr" anchorCtr="0">
           <a:noAutofit/>
         </a:bodyPr>
         <a:lstStyle/>
         <a:p>
-          <a:pPr lvl="0" algn="ctr" defTabSz="711200">
+          <a:pPr lvl="0" algn="ctr" defTabSz="755650">
             <a:lnSpc>
               <a:spcPct val="90000"/>
             </a:lnSpc>
@@ -3590,10 +3590,10 @@
             </a:spcAft>
           </a:pPr>
           <a:r>
-            <a:rPr lang="en-US" sz="1600" kern="1200" dirty="0" smtClean="0"/>
+            <a:rPr lang="en-US" sz="1700" kern="1200" dirty="0" smtClean="0"/>
             <a:t>M3</a:t>
           </a:r>
-          <a:endParaRPr lang="en-US" sz="1600" kern="1200" dirty="0"/>
+          <a:endParaRPr lang="en-US" sz="1700" kern="1200" dirty="0"/>
         </a:p>
       </dsp:txBody>
       <dsp:txXfrm>
@@ -3731,12 +3731,12 @@
         </a:fontRef>
       </dsp:style>
       <dsp:txBody>
-        <a:bodyPr spcFirstLastPara="0" vert="horz" wrap="square" lIns="10160" tIns="10160" rIns="10160" bIns="10160" numCol="1" spcCol="1270" anchor="ctr" anchorCtr="0">
+        <a:bodyPr spcFirstLastPara="0" vert="horz" wrap="square" lIns="10795" tIns="10795" rIns="10795" bIns="10795" numCol="1" spcCol="1270" anchor="ctr" anchorCtr="0">
           <a:noAutofit/>
         </a:bodyPr>
         <a:lstStyle/>
         <a:p>
-          <a:pPr lvl="0" algn="ctr" defTabSz="711200">
+          <a:pPr lvl="0" algn="ctr" defTabSz="755650">
             <a:lnSpc>
               <a:spcPct val="90000"/>
             </a:lnSpc>
@@ -3748,10 +3748,10 @@
             </a:spcAft>
           </a:pPr>
           <a:r>
-            <a:rPr lang="en-US" sz="1600" kern="1200" dirty="0" smtClean="0"/>
+            <a:rPr lang="en-US" sz="1700" kern="1200" dirty="0" smtClean="0"/>
             <a:t>……</a:t>
           </a:r>
-          <a:endParaRPr lang="en-US" sz="1600" kern="1200" dirty="0"/>
+          <a:endParaRPr lang="en-US" sz="1700" kern="1200" dirty="0"/>
         </a:p>
       </dsp:txBody>
       <dsp:txXfrm>
@@ -3889,12 +3889,12 @@
         </a:fontRef>
       </dsp:style>
       <dsp:txBody>
-        <a:bodyPr spcFirstLastPara="0" vert="horz" wrap="square" lIns="10160" tIns="10160" rIns="10160" bIns="10160" numCol="1" spcCol="1270" anchor="ctr" anchorCtr="0">
+        <a:bodyPr spcFirstLastPara="0" vert="horz" wrap="square" lIns="10795" tIns="10795" rIns="10795" bIns="10795" numCol="1" spcCol="1270" anchor="ctr" anchorCtr="0">
           <a:noAutofit/>
         </a:bodyPr>
         <a:lstStyle/>
         <a:p>
-          <a:pPr lvl="0" algn="ctr" defTabSz="711200">
+          <a:pPr lvl="0" algn="ctr" defTabSz="755650">
             <a:lnSpc>
               <a:spcPct val="90000"/>
             </a:lnSpc>
@@ -3906,10 +3906,10 @@
             </a:spcAft>
           </a:pPr>
           <a:r>
-            <a:rPr lang="en-US" sz="1600" kern="1200" dirty="0" smtClean="0"/>
+            <a:rPr lang="en-US" sz="1700" kern="1200" dirty="0" smtClean="0"/>
             <a:t>M4</a:t>
           </a:r>
-          <a:endParaRPr lang="en-US" sz="1600" kern="1200" dirty="0"/>
+          <a:endParaRPr lang="en-US" sz="1700" kern="1200" dirty="0"/>
         </a:p>
       </dsp:txBody>
       <dsp:txXfrm>
@@ -4047,12 +4047,12 @@
         </a:fontRef>
       </dsp:style>
       <dsp:txBody>
-        <a:bodyPr spcFirstLastPara="0" vert="horz" wrap="square" lIns="10160" tIns="10160" rIns="10160" bIns="10160" numCol="1" spcCol="1270" anchor="ctr" anchorCtr="0">
+        <a:bodyPr spcFirstLastPara="0" vert="horz" wrap="square" lIns="10795" tIns="10795" rIns="10795" bIns="10795" numCol="1" spcCol="1270" anchor="ctr" anchorCtr="0">
           <a:noAutofit/>
         </a:bodyPr>
         <a:lstStyle/>
         <a:p>
-          <a:pPr lvl="0" algn="ctr" defTabSz="711200">
+          <a:pPr lvl="0" algn="ctr" defTabSz="755650">
             <a:lnSpc>
               <a:spcPct val="90000"/>
             </a:lnSpc>
@@ -4064,10 +4064,10 @@
             </a:spcAft>
           </a:pPr>
           <a:r>
-            <a:rPr lang="en-US" sz="1600" kern="1200" dirty="0" smtClean="0"/>
+            <a:rPr lang="en-US" sz="1700" kern="1200" dirty="0" smtClean="0"/>
             <a:t>……</a:t>
           </a:r>
-          <a:endParaRPr lang="en-US" sz="1600" kern="1200" dirty="0"/>
+          <a:endParaRPr lang="en-US" sz="1700" kern="1200" dirty="0"/>
         </a:p>
       </dsp:txBody>
       <dsp:txXfrm>
@@ -4205,12 +4205,12 @@
         </a:fontRef>
       </dsp:style>
       <dsp:txBody>
-        <a:bodyPr spcFirstLastPara="0" vert="horz" wrap="square" lIns="10160" tIns="10160" rIns="10160" bIns="10160" numCol="1" spcCol="1270" anchor="ctr" anchorCtr="0">
+        <a:bodyPr spcFirstLastPara="0" vert="horz" wrap="square" lIns="10795" tIns="10795" rIns="10795" bIns="10795" numCol="1" spcCol="1270" anchor="ctr" anchorCtr="0">
           <a:noAutofit/>
         </a:bodyPr>
         <a:lstStyle/>
         <a:p>
-          <a:pPr lvl="0" algn="ctr" defTabSz="711200">
+          <a:pPr lvl="0" algn="ctr" defTabSz="755650">
             <a:lnSpc>
               <a:spcPct val="90000"/>
             </a:lnSpc>
@@ -4222,10 +4222,10 @@
             </a:spcAft>
           </a:pPr>
           <a:r>
-            <a:rPr lang="en-US" sz="1600" kern="1200" dirty="0" smtClean="0"/>
+            <a:rPr lang="en-US" sz="1700" kern="1200" dirty="0" smtClean="0"/>
             <a:t>M5</a:t>
           </a:r>
-          <a:endParaRPr lang="en-US" sz="1600" kern="1200" dirty="0"/>
+          <a:endParaRPr lang="en-US" sz="1700" kern="1200" dirty="0"/>
         </a:p>
       </dsp:txBody>
       <dsp:txXfrm>
@@ -4363,12 +4363,12 @@
         </a:fontRef>
       </dsp:style>
       <dsp:txBody>
-        <a:bodyPr spcFirstLastPara="0" vert="horz" wrap="square" lIns="10160" tIns="10160" rIns="10160" bIns="10160" numCol="1" spcCol="1270" anchor="ctr" anchorCtr="0">
+        <a:bodyPr spcFirstLastPara="0" vert="horz" wrap="square" lIns="10795" tIns="10795" rIns="10795" bIns="10795" numCol="1" spcCol="1270" anchor="ctr" anchorCtr="0">
           <a:noAutofit/>
         </a:bodyPr>
         <a:lstStyle/>
         <a:p>
-          <a:pPr lvl="0" algn="ctr" defTabSz="711200">
+          <a:pPr lvl="0" algn="ctr" defTabSz="755650">
             <a:lnSpc>
               <a:spcPct val="90000"/>
             </a:lnSpc>
@@ -4380,10 +4380,10 @@
             </a:spcAft>
           </a:pPr>
           <a:r>
-            <a:rPr lang="en-US" sz="1600" kern="1200" dirty="0" smtClean="0"/>
+            <a:rPr lang="en-US" sz="1700" kern="1200" dirty="0" smtClean="0"/>
             <a:t>M6</a:t>
           </a:r>
-          <a:endParaRPr lang="en-US" sz="1600" kern="1200" dirty="0"/>
+          <a:endParaRPr lang="en-US" sz="1700" kern="1200" dirty="0"/>
         </a:p>
       </dsp:txBody>
       <dsp:txXfrm>
@@ -4521,12 +4521,12 @@
         </a:fontRef>
       </dsp:style>
       <dsp:txBody>
-        <a:bodyPr spcFirstLastPara="0" vert="horz" wrap="square" lIns="10160" tIns="10160" rIns="10160" bIns="10160" numCol="1" spcCol="1270" anchor="ctr" anchorCtr="0">
+        <a:bodyPr spcFirstLastPara="0" vert="horz" wrap="square" lIns="10795" tIns="10795" rIns="10795" bIns="10795" numCol="1" spcCol="1270" anchor="ctr" anchorCtr="0">
           <a:noAutofit/>
         </a:bodyPr>
         <a:lstStyle/>
         <a:p>
-          <a:pPr lvl="0" algn="ctr" defTabSz="711200">
+          <a:pPr lvl="0" algn="ctr" defTabSz="755650">
             <a:lnSpc>
               <a:spcPct val="90000"/>
             </a:lnSpc>
@@ -4538,10 +4538,10 @@
             </a:spcAft>
           </a:pPr>
           <a:r>
-            <a:rPr lang="en-US" sz="1600" kern="1200" dirty="0" smtClean="0"/>
+            <a:rPr lang="en-US" sz="1700" kern="1200" dirty="0" smtClean="0"/>
             <a:t>M7</a:t>
           </a:r>
-          <a:endParaRPr lang="en-US" sz="1600" kern="1200" dirty="0"/>
+          <a:endParaRPr lang="en-US" sz="1700" kern="1200" dirty="0"/>
         </a:p>
       </dsp:txBody>
       <dsp:txXfrm>
@@ -6041,7 +6041,7 @@
           <a:p>
             <a:fld id="{97406A20-164F-454F-9228-81D3270AA27A}" type="datetimeFigureOut">
               <a:rPr lang="en-US" smtClean="0"/>
-              <a:t>5/3/2010</a:t>
+              <a:t>5/4/2010</a:t>
             </a:fld>
             <a:endParaRPr lang="en-US"/>
           </a:p>
@@ -6354,7 +6354,7 @@
           <a:p>
             <a:fld id="{97406A20-164F-454F-9228-81D3270AA27A}" type="datetimeFigureOut">
               <a:rPr lang="en-US" smtClean="0"/>
-              <a:t>5/3/2010</a:t>
+              <a:t>5/4/2010</a:t>
             </a:fld>
             <a:endParaRPr lang="en-US"/>
           </a:p>
@@ -6539,7 +6539,7 @@
           <a:p>
             <a:fld id="{97406A20-164F-454F-9228-81D3270AA27A}" type="datetimeFigureOut">
               <a:rPr lang="en-US" smtClean="0"/>
-              <a:t>5/3/2010</a:t>
+              <a:t>5/4/2010</a:t>
             </a:fld>
             <a:endParaRPr lang="en-US"/>
           </a:p>
@@ -6714,7 +6714,7 @@
           <a:p>
             <a:fld id="{97406A20-164F-454F-9228-81D3270AA27A}" type="datetimeFigureOut">
               <a:rPr lang="en-US" smtClean="0"/>
-              <a:t>5/3/2010</a:t>
+              <a:t>5/4/2010</a:t>
             </a:fld>
             <a:endParaRPr lang="en-US"/>
           </a:p>
@@ -6982,7 +6982,7 @@
           <a:p>
             <a:fld id="{97406A20-164F-454F-9228-81D3270AA27A}" type="datetimeFigureOut">
               <a:rPr lang="en-US" smtClean="0"/>
-              <a:t>5/3/2010</a:t>
+              <a:t>5/4/2010</a:t>
             </a:fld>
             <a:endParaRPr lang="en-US"/>
           </a:p>
@@ -7450,7 +7450,7 @@
           <a:p>
             <a:fld id="{97406A20-164F-454F-9228-81D3270AA27A}" type="datetimeFigureOut">
               <a:rPr lang="en-US" smtClean="0"/>
-              <a:t>5/3/2010</a:t>
+              <a:t>5/4/2010</a:t>
             </a:fld>
             <a:endParaRPr lang="en-US"/>
           </a:p>
@@ -7939,7 +7939,7 @@
           <a:p>
             <a:fld id="{97406A20-164F-454F-9228-81D3270AA27A}" type="datetimeFigureOut">
               <a:rPr lang="en-US" smtClean="0"/>
-              <a:t>5/3/2010</a:t>
+              <a:t>5/4/2010</a:t>
             </a:fld>
             <a:endParaRPr lang="en-US"/>
           </a:p>
@@ -8065,7 +8065,7 @@
           <a:p>
             <a:fld id="{97406A20-164F-454F-9228-81D3270AA27A}" type="datetimeFigureOut">
               <a:rPr lang="en-US" smtClean="0"/>
-              <a:t>5/3/2010</a:t>
+              <a:t>5/4/2010</a:t>
             </a:fld>
             <a:endParaRPr lang="en-US"/>
           </a:p>
@@ -8209,7 +8209,7 @@
           <a:p>
             <a:fld id="{97406A20-164F-454F-9228-81D3270AA27A}" type="datetimeFigureOut">
               <a:rPr lang="en-US" smtClean="0"/>
-              <a:t>5/3/2010</a:t>
+              <a:t>5/4/2010</a:t>
             </a:fld>
             <a:endParaRPr lang="en-US"/>
           </a:p>
@@ -8531,7 +8531,7 @@
           <a:p>
             <a:fld id="{97406A20-164F-454F-9228-81D3270AA27A}" type="datetimeFigureOut">
               <a:rPr lang="en-US" smtClean="0"/>
-              <a:t>5/3/2010</a:t>
+              <a:t>5/4/2010</a:t>
             </a:fld>
             <a:endParaRPr lang="en-US"/>
           </a:p>
@@ -8665,7 +8665,7 @@
           <a:p>
             <a:fld id="{97406A20-164F-454F-9228-81D3270AA27A}" type="datetimeFigureOut">
               <a:rPr lang="en-US" smtClean="0"/>
-              <a:t>5/3/2010</a:t>
+              <a:t>5/4/2010</a:t>
             </a:fld>
             <a:endParaRPr lang="en-US"/>
           </a:p>
@@ -9446,7 +9446,7 @@
           <a:p>
             <a:fld id="{97406A20-164F-454F-9228-81D3270AA27A}" type="datetimeFigureOut">
               <a:rPr lang="en-US" smtClean="0"/>
-              <a:t>5/3/2010</a:t>
+              <a:t>5/4/2010</a:t>
             </a:fld>
             <a:endParaRPr lang="en-US"/>
           </a:p>
@@ -9998,7 +9998,38 @@
             <a:pPr algn="ctr"/>
             <a:r>
               <a:rPr lang="en-US" dirty="0" smtClean="0"/>
-              <a:t>A Parallel Implementation</a:t>
+              <a:t>A Parallel </a:t>
+            </a:r>
+            <a:r>
+              <a:rPr lang="en-US" dirty="0" smtClean="0"/>
+              <a:t>Implementation</a:t>
+            </a:r>
+          </a:p>
+          <a:p>
+            <a:pPr algn="ctr"/>
+            <a:r>
+              <a:rPr lang="en-US" dirty="0" err="1" smtClean="0"/>
+              <a:t>Honghao</a:t>
+            </a:r>
+            <a:r>
+              <a:rPr lang="en-US" dirty="0" smtClean="0"/>
+              <a:t> </a:t>
+            </a:r>
+            <a:r>
+              <a:rPr lang="en-US" dirty="0" err="1" smtClean="0"/>
+              <a:t>Tian</a:t>
+            </a:r>
+            <a:endParaRPr lang="en-US" dirty="0" smtClean="0"/>
+          </a:p>
+          <a:p>
+            <a:pPr algn="ctr"/>
+            <a:r>
+              <a:rPr lang="en-US" dirty="0" smtClean="0"/>
+              <a:t>James </a:t>
+            </a:r>
+            <a:r>
+              <a:rPr lang="en-US" dirty="0" err="1" smtClean="0"/>
+              <a:t>Mwaura</a:t>
             </a:r>
             <a:endParaRPr lang="en-US" dirty="0"/>
           </a:p>
@@ -10140,15 +10171,6 @@
                 <a:headEnd/>
                 <a:tailEnd/>
               </a14:hiddenLine>
-            </a:ext>
-            <a:ext uri="{AF507438-7753-43E0-B8FC-AC1667EBCBE1}">
-              <a14:hiddenEffects xmlns:a14="http://schemas.microsoft.com/office/drawing/2010/main">
-                <a:effectLst>
-                  <a:outerShdw dist="35921" dir="2700000" algn="ctr" rotWithShape="0">
-                    <a:schemeClr val="bg2"/>
-                  </a:outerShdw>
-                </a:effectLst>
-              </a14:hiddenEffects>
             </a:ext>
           </a:extLst>
         </p:spPr>
@@ -10219,7 +10241,7 @@
           <a:p>
             <a:r>
               <a:rPr lang="en-US" dirty="0" smtClean="0"/>
-              <a:t>Results</a:t>
+              <a:t>Observations</a:t>
             </a:r>
             <a:endParaRPr lang="en-US" dirty="0"/>
           </a:p>
@@ -11446,7 +11468,7 @@
         <p:spPr/>
         <p:txBody>
           <a:bodyPr>
-            <a:normAutofit fontScale="90000"/>
+            <a:normAutofit/>
           </a:bodyPr>
           <a:lstStyle/>
           <a:p>
@@ -12154,15 +12176,6 @@
                 <a:tailEnd/>
               </a14:hiddenLine>
             </a:ext>
-            <a:ext uri="{AF507438-7753-43E0-B8FC-AC1667EBCBE1}">
-              <a14:hiddenEffects xmlns:a14="http://schemas.microsoft.com/office/drawing/2010/main">
-                <a:effectLst>
-                  <a:outerShdw dist="35921" dir="2700000" algn="ctr" rotWithShape="0">
-                    <a:schemeClr val="bg2"/>
-                  </a:outerShdw>
-                </a:effectLst>
-              </a14:hiddenEffects>
-            </a:ext>
           </a:extLst>
         </p:spPr>
       </p:pic>
@@ -12294,15 +12307,6 @@
                 <a:headEnd/>
                 <a:tailEnd/>
               </a14:hiddenLine>
-            </a:ext>
-            <a:ext uri="{AF507438-7753-43E0-B8FC-AC1667EBCBE1}">
-              <a14:hiddenEffects xmlns:a14="http://schemas.microsoft.com/office/drawing/2010/main">
-                <a:effectLst>
-                  <a:outerShdw dist="35921" dir="2700000" algn="ctr" rotWithShape="0">
-                    <a:schemeClr val="bg2"/>
-                  </a:outerShdw>
-                </a:effectLst>
-              </a14:hiddenEffects>
             </a:ext>
           </a:extLst>
         </p:spPr>

</xml_diff>

<commit_message>
Updated stuff with the OpenMPI data.
</commit_message>
<xml_diff>
--- a/Strassen Multiplication Algorithm.pptx
+++ b/Strassen Multiplication Algorithm.pptx
@@ -11,11 +11,15 @@
     <p:sldId id="259" r:id="rId5"/>
     <p:sldId id="260" r:id="rId6"/>
     <p:sldId id="261" r:id="rId7"/>
-    <p:sldId id="266" r:id="rId8"/>
-    <p:sldId id="262" r:id="rId9"/>
-    <p:sldId id="264" r:id="rId10"/>
-    <p:sldId id="265" r:id="rId11"/>
-    <p:sldId id="263" r:id="rId12"/>
+    <p:sldId id="267" r:id="rId8"/>
+    <p:sldId id="266" r:id="rId9"/>
+    <p:sldId id="262" r:id="rId10"/>
+    <p:sldId id="268" r:id="rId11"/>
+    <p:sldId id="264" r:id="rId12"/>
+    <p:sldId id="265" r:id="rId13"/>
+    <p:sldId id="269" r:id="rId14"/>
+    <p:sldId id="263" r:id="rId15"/>
+    <p:sldId id="270" r:id="rId16"/>
   </p:sldIdLst>
   <p:sldSz cx="9144000" cy="6858000" type="screen4x3"/>
   <p:notesSz cx="6858000" cy="9144000"/>
@@ -9992,7 +9996,9 @@
           </a:xfrm>
         </p:spPr>
         <p:txBody>
-          <a:bodyPr/>
+          <a:bodyPr>
+            <a:normAutofit lnSpcReduction="10000"/>
+          </a:bodyPr>
           <a:lstStyle/>
           <a:p>
             <a:pPr algn="ctr"/>
@@ -10004,6 +10010,10 @@
               <a:rPr lang="en-US" dirty="0" smtClean="0"/>
               <a:t>Implementation</a:t>
             </a:r>
+          </a:p>
+          <a:p>
+            <a:pPr algn="ctr"/>
+            <a:endParaRPr lang="en-US" dirty="0" smtClean="0"/>
           </a:p>
           <a:p>
             <a:pPr algn="ctr"/>
@@ -10101,15 +10111,19 @@
           <a:p>
             <a:r>
               <a:rPr lang="en-US" dirty="0" smtClean="0"/>
-              <a:t>Results Single-</a:t>
-            </a:r>
-            <a:r>
-              <a:rPr lang="en-US" dirty="0"/>
-              <a:t>t</a:t>
+              <a:t>Results: </a:t>
+            </a:r>
+            <a:r>
+              <a:rPr lang="en-US" dirty="0" err="1" smtClean="0"/>
+              <a:t>OpenMP</a:t>
             </a:r>
             <a:r>
               <a:rPr lang="en-US" dirty="0" smtClean="0"/>
-              <a:t>hreaded</a:t>
+              <a:t> </a:t>
+            </a:r>
+            <a:r>
+              <a:rPr lang="en-US" dirty="0" err="1" smtClean="0"/>
+              <a:t>Strassen</a:t>
             </a:r>
             <a:endParaRPr lang="en-US" dirty="0"/>
           </a:p>
@@ -10117,7 +10131,7 @@
       </p:sp>
       <p:pic>
         <p:nvPicPr>
-          <p:cNvPr id="3074" name="Picture 2"/>
+          <p:cNvPr id="2050" name="Picture 2"/>
           <p:cNvPicPr>
             <a:picLocks noChangeAspect="1" noChangeArrowheads="1"/>
           </p:cNvPicPr>
@@ -10138,8 +10152,8 @@
         </p:blipFill>
         <p:spPr bwMode="auto">
           <a:xfrm>
-            <a:off x="1371600" y="1295400"/>
-            <a:ext cx="7102911" cy="4837113"/>
+            <a:off x="1295400" y="1219200"/>
+            <a:ext cx="7391400" cy="4819244"/>
           </a:xfrm>
           <a:prstGeom prst="rect">
             <a:avLst/>
@@ -10172,26 +10186,35 @@
                 <a:tailEnd/>
               </a14:hiddenLine>
             </a:ext>
+            <a:ext uri="{AF507438-7753-43E0-B8FC-AC1667EBCBE1}">
+              <a14:hiddenEffects xmlns:a14="http://schemas.microsoft.com/office/drawing/2010/main">
+                <a:effectLst>
+                  <a:outerShdw dist="35921" dir="2700000" algn="ctr" rotWithShape="0">
+                    <a:schemeClr val="bg2"/>
+                  </a:outerShdw>
+                </a:effectLst>
+              </a14:hiddenEffects>
+            </a:ext>
           </a:extLst>
         </p:spPr>
       </p:pic>
     </p:spTree>
     <p:extLst>
       <p:ext uri="{BB962C8B-B14F-4D97-AF65-F5344CB8AC3E}">
-        <p14:creationId xmlns:p14="http://schemas.microsoft.com/office/powerpoint/2010/main" val="1452958616"/>
+        <p14:creationId xmlns:p14="http://schemas.microsoft.com/office/powerpoint/2010/main" val="3357160525"/>
       </p:ext>
     </p:extLst>
   </p:cSld>
   <p:clrMapOvr>
     <a:masterClrMapping/>
   </p:clrMapOvr>
-  <mc:AlternateContent xmlns:mc="http://schemas.openxmlformats.org/markup-compatibility/2006" xmlns:p14="http://schemas.microsoft.com/office/powerpoint/2010/main">
-    <mc:Choice Requires="p14">
-      <p:transition spd="slow">
-        <p14:flash/>
+  <mc:AlternateContent xmlns:mc="http://schemas.openxmlformats.org/markup-compatibility/2006">
+    <mc:Choice xmlns:p14="http://schemas.microsoft.com/office/powerpoint/2010/main" Requires="p14">
+      <p:transition spd="slow" p14:dur="2000">
+        <p14:ferris dir="l"/>
       </p:transition>
     </mc:Choice>
-    <mc:Fallback xmlns="">
+    <mc:Fallback>
       <p:transition xmlns:p14="http://schemas.microsoft.com/office/powerpoint/2010/main" spd="slow">
         <p:fade/>
       </p:transition>
@@ -10241,6 +10264,445 @@
           <a:p>
             <a:r>
               <a:rPr lang="en-US" dirty="0" smtClean="0"/>
+              <a:t>Results: MPI </a:t>
+            </a:r>
+            <a:r>
+              <a:rPr lang="en-US" dirty="0" err="1" smtClean="0"/>
+              <a:t>Strassen</a:t>
+            </a:r>
+            <a:endParaRPr lang="en-US" dirty="0"/>
+          </a:p>
+        </p:txBody>
+      </p:sp>
+      <p:pic>
+        <p:nvPicPr>
+          <p:cNvPr id="3074" name="Picture 2"/>
+          <p:cNvPicPr>
+            <a:picLocks noChangeAspect="1" noChangeArrowheads="1"/>
+          </p:cNvPicPr>
+          <p:nvPr/>
+        </p:nvPicPr>
+        <p:blipFill>
+          <a:blip r:embed="rId2">
+            <a:extLst>
+              <a:ext uri="{28A0092B-C50C-407E-A947-70E740481C1C}">
+                <a14:useLocalDpi xmlns:a14="http://schemas.microsoft.com/office/drawing/2010/main" val="0"/>
+              </a:ext>
+            </a:extLst>
+          </a:blip>
+          <a:srcRect/>
+          <a:stretch>
+            <a:fillRect/>
+          </a:stretch>
+        </p:blipFill>
+        <p:spPr bwMode="auto">
+          <a:xfrm>
+            <a:off x="1447800" y="1295400"/>
+            <a:ext cx="7293722" cy="5075238"/>
+          </a:xfrm>
+          <a:prstGeom prst="rect">
+            <a:avLst/>
+          </a:prstGeom>
+          <a:ln>
+            <a:noFill/>
+          </a:ln>
+          <a:effectLst>
+            <a:outerShdw blurRad="292100" dist="139700" dir="2700000" algn="tl" rotWithShape="0">
+              <a:srgbClr xmlns:mc="http://schemas.openxmlformats.org/markup-compatibility/2006" xmlns:a14="http://schemas.microsoft.com/office/drawing/2010/main" val="333333" mc:Ignorable="">
+                <a:alpha val="65000"/>
+              </a:srgbClr>
+            </a:outerShdw>
+          </a:effectLst>
+          <a:extLst>
+            <a:ext uri="{909E8E84-426E-40DD-AFC4-6F175D3DCCD1}">
+              <a14:hiddenFill xmlns:a14="http://schemas.microsoft.com/office/drawing/2010/main">
+                <a:solidFill>
+                  <a:schemeClr val="accent1"/>
+                </a:solidFill>
+              </a14:hiddenFill>
+            </a:ext>
+            <a:ext uri="{91240B29-F687-4F45-9708-019B960494DF}">
+              <a14:hiddenLine xmlns:a14="http://schemas.microsoft.com/office/drawing/2010/main" w="9525">
+                <a:solidFill>
+                  <a:schemeClr val="tx1"/>
+                </a:solidFill>
+                <a:miter lim="800000"/>
+                <a:headEnd/>
+                <a:tailEnd/>
+              </a14:hiddenLine>
+            </a:ext>
+            <a:ext uri="{AF507438-7753-43E0-B8FC-AC1667EBCBE1}">
+              <a14:hiddenEffects xmlns:a14="http://schemas.microsoft.com/office/drawing/2010/main">
+                <a:effectLst>
+                  <a:outerShdw dist="35921" dir="2700000" algn="ctr" rotWithShape="0">
+                    <a:schemeClr val="bg2"/>
+                  </a:outerShdw>
+                </a:effectLst>
+              </a14:hiddenEffects>
+            </a:ext>
+          </a:extLst>
+        </p:spPr>
+      </p:pic>
+    </p:spTree>
+    <p:extLst>
+      <p:ext uri="{BB962C8B-B14F-4D97-AF65-F5344CB8AC3E}">
+        <p14:creationId xmlns:p14="http://schemas.microsoft.com/office/powerpoint/2010/main" val="1287284576"/>
+      </p:ext>
+    </p:extLst>
+  </p:cSld>
+  <p:clrMapOvr>
+    <a:masterClrMapping/>
+  </p:clrMapOvr>
+  <mc:AlternateContent xmlns:mc="http://schemas.openxmlformats.org/markup-compatibility/2006">
+    <mc:Choice xmlns:p14="http://schemas.microsoft.com/office/powerpoint/2010/main" Requires="p14">
+      <p:transition spd="slow" p14:dur="1299">
+        <p14:pan dir="u"/>
+      </p:transition>
+    </mc:Choice>
+    <mc:Fallback>
+      <p:transition xmlns:p14="http://schemas.microsoft.com/office/powerpoint/2010/main" spd="slow">
+        <p:fade/>
+      </p:transition>
+    </mc:Fallback>
+  </mc:AlternateContent>
+  <p:timing>
+    <p:tnLst>
+      <p:par>
+        <p:cTn xmlns:p14="http://schemas.microsoft.com/office/powerpoint/2010/main" id="1" dur="indefinite" restart="never" nodeType="tmRoot"/>
+      </p:par>
+    </p:tnLst>
+  </p:timing>
+</p:sld>
+</file>
+
+<file path=ppt/slides/slide12.xml><?xml version="1.0" encoding="utf-8"?>
+<p:sld xmlns:a="http://schemas.openxmlformats.org/drawingml/2006/main" xmlns:r="http://schemas.openxmlformats.org/officeDocument/2006/relationships" xmlns:p="http://schemas.openxmlformats.org/presentationml/2006/main">
+  <p:cSld>
+    <p:spTree>
+      <p:nvGrpSpPr>
+        <p:cNvPr id="1" name=""/>
+        <p:cNvGrpSpPr/>
+        <p:nvPr/>
+      </p:nvGrpSpPr>
+      <p:grpSpPr>
+        <a:xfrm>
+          <a:off x="0" y="0"/>
+          <a:ext cx="0" cy="0"/>
+          <a:chOff x="0" y="0"/>
+          <a:chExt cx="0" cy="0"/>
+        </a:xfrm>
+      </p:grpSpPr>
+      <p:sp>
+        <p:nvSpPr>
+          <p:cNvPr id="2" name="Title 1"/>
+          <p:cNvSpPr>
+            <a:spLocks noGrp="1"/>
+          </p:cNvSpPr>
+          <p:nvPr>
+            <p:ph type="title"/>
+          </p:nvPr>
+        </p:nvSpPr>
+        <p:spPr/>
+        <p:txBody>
+          <a:bodyPr/>
+          <a:lstStyle/>
+          <a:p>
+            <a:r>
+              <a:rPr lang="en-US" dirty="0" smtClean="0"/>
+              <a:t>Results: </a:t>
+            </a:r>
+            <a:r>
+              <a:rPr lang="en-US" dirty="0" smtClean="0"/>
+              <a:t>Single-</a:t>
+            </a:r>
+            <a:r>
+              <a:rPr lang="en-US" dirty="0"/>
+              <a:t>t</a:t>
+            </a:r>
+            <a:r>
+              <a:rPr lang="en-US" dirty="0" smtClean="0"/>
+              <a:t>hreaded</a:t>
+            </a:r>
+            <a:endParaRPr lang="en-US" dirty="0"/>
+          </a:p>
+        </p:txBody>
+      </p:sp>
+      <p:pic>
+        <p:nvPicPr>
+          <p:cNvPr id="4098" name="Picture 2"/>
+          <p:cNvPicPr>
+            <a:picLocks noChangeAspect="1" noChangeArrowheads="1"/>
+          </p:cNvPicPr>
+          <p:nvPr/>
+        </p:nvPicPr>
+        <p:blipFill>
+          <a:blip r:embed="rId2">
+            <a:extLst>
+              <a:ext uri="{28A0092B-C50C-407E-A947-70E740481C1C}">
+                <a14:useLocalDpi xmlns:a14="http://schemas.microsoft.com/office/drawing/2010/main" val="0"/>
+              </a:ext>
+            </a:extLst>
+          </a:blip>
+          <a:srcRect/>
+          <a:stretch>
+            <a:fillRect/>
+          </a:stretch>
+        </p:blipFill>
+        <p:spPr bwMode="auto">
+          <a:xfrm>
+            <a:off x="1332852" y="1295400"/>
+            <a:ext cx="7430148" cy="4892356"/>
+          </a:xfrm>
+          <a:prstGeom prst="rect">
+            <a:avLst/>
+          </a:prstGeom>
+          <a:ln>
+            <a:noFill/>
+          </a:ln>
+          <a:effectLst>
+            <a:outerShdw blurRad="292100" dist="139700" dir="2700000" algn="tl" rotWithShape="0">
+              <a:srgbClr xmlns:mc="http://schemas.openxmlformats.org/markup-compatibility/2006" xmlns:a14="http://schemas.microsoft.com/office/drawing/2010/main" val="333333" mc:Ignorable="">
+                <a:alpha val="65000"/>
+              </a:srgbClr>
+            </a:outerShdw>
+          </a:effectLst>
+          <a:extLst>
+            <a:ext uri="{909E8E84-426E-40DD-AFC4-6F175D3DCCD1}">
+              <a14:hiddenFill xmlns:a14="http://schemas.microsoft.com/office/drawing/2010/main">
+                <a:solidFill>
+                  <a:schemeClr val="accent1"/>
+                </a:solidFill>
+              </a14:hiddenFill>
+            </a:ext>
+            <a:ext uri="{91240B29-F687-4F45-9708-019B960494DF}">
+              <a14:hiddenLine xmlns:a14="http://schemas.microsoft.com/office/drawing/2010/main" w="9525">
+                <a:solidFill>
+                  <a:schemeClr val="tx1"/>
+                </a:solidFill>
+                <a:miter lim="800000"/>
+                <a:headEnd/>
+                <a:tailEnd/>
+              </a14:hiddenLine>
+            </a:ext>
+            <a:ext uri="{AF507438-7753-43E0-B8FC-AC1667EBCBE1}">
+              <a14:hiddenEffects xmlns:a14="http://schemas.microsoft.com/office/drawing/2010/main">
+                <a:effectLst>
+                  <a:outerShdw dist="35921" dir="2700000" algn="ctr" rotWithShape="0">
+                    <a:schemeClr val="bg2"/>
+                  </a:outerShdw>
+                </a:effectLst>
+              </a14:hiddenEffects>
+            </a:ext>
+          </a:extLst>
+        </p:spPr>
+      </p:pic>
+    </p:spTree>
+    <p:extLst>
+      <p:ext uri="{BB962C8B-B14F-4D97-AF65-F5344CB8AC3E}">
+        <p14:creationId xmlns:p14="http://schemas.microsoft.com/office/powerpoint/2010/main" val="1452958616"/>
+      </p:ext>
+    </p:extLst>
+  </p:cSld>
+  <p:clrMapOvr>
+    <a:masterClrMapping/>
+  </p:clrMapOvr>
+  <mc:AlternateContent xmlns:mc="http://schemas.openxmlformats.org/markup-compatibility/2006">
+    <mc:Choice xmlns:p14="http://schemas.microsoft.com/office/powerpoint/2010/main" Requires="p14">
+      <p:transition spd="slow" p14:dur="1600">
+        <p14:prism isContent="1" isInverted="1"/>
+      </p:transition>
+    </mc:Choice>
+    <mc:Fallback>
+      <p:transition xmlns:p14="http://schemas.microsoft.com/office/powerpoint/2010/main" spd="slow">
+        <p:fade/>
+      </p:transition>
+    </mc:Fallback>
+  </mc:AlternateContent>
+  <p:timing>
+    <p:tnLst>
+      <p:par>
+        <p:cTn xmlns:p14="http://schemas.microsoft.com/office/powerpoint/2010/main" id="1" dur="indefinite" restart="never" nodeType="tmRoot"/>
+      </p:par>
+    </p:tnLst>
+  </p:timing>
+</p:sld>
+</file>
+
+<file path=ppt/slides/slide13.xml><?xml version="1.0" encoding="utf-8"?>
+<p:sld xmlns:a="http://schemas.openxmlformats.org/drawingml/2006/main" xmlns:r="http://schemas.openxmlformats.org/officeDocument/2006/relationships" xmlns:p="http://schemas.openxmlformats.org/presentationml/2006/main">
+  <p:cSld>
+    <p:spTree>
+      <p:nvGrpSpPr>
+        <p:cNvPr id="1" name=""/>
+        <p:cNvGrpSpPr/>
+        <p:nvPr/>
+      </p:nvGrpSpPr>
+      <p:grpSpPr>
+        <a:xfrm>
+          <a:off x="0" y="0"/>
+          <a:ext cx="0" cy="0"/>
+          <a:chOff x="0" y="0"/>
+          <a:chExt cx="0" cy="0"/>
+        </a:xfrm>
+      </p:grpSpPr>
+      <p:sp>
+        <p:nvSpPr>
+          <p:cNvPr id="2" name="Title 1"/>
+          <p:cNvSpPr>
+            <a:spLocks noGrp="1"/>
+          </p:cNvSpPr>
+          <p:nvPr>
+            <p:ph type="title"/>
+          </p:nvPr>
+        </p:nvSpPr>
+        <p:spPr/>
+        <p:txBody>
+          <a:bodyPr/>
+          <a:lstStyle/>
+          <a:p>
+            <a:r>
+              <a:rPr lang="en-US" dirty="0" smtClean="0"/>
+              <a:t>Results: Multi-threaded</a:t>
+            </a:r>
+            <a:endParaRPr lang="en-US" dirty="0"/>
+          </a:p>
+        </p:txBody>
+      </p:sp>
+      <p:pic>
+        <p:nvPicPr>
+          <p:cNvPr id="5122" name="Picture 2"/>
+          <p:cNvPicPr>
+            <a:picLocks noChangeAspect="1" noChangeArrowheads="1"/>
+          </p:cNvPicPr>
+          <p:nvPr/>
+        </p:nvPicPr>
+        <p:blipFill>
+          <a:blip r:embed="rId2">
+            <a:extLst>
+              <a:ext uri="{28A0092B-C50C-407E-A947-70E740481C1C}">
+                <a14:useLocalDpi xmlns:a14="http://schemas.microsoft.com/office/drawing/2010/main" val="0"/>
+              </a:ext>
+            </a:extLst>
+          </a:blip>
+          <a:srcRect/>
+          <a:stretch>
+            <a:fillRect/>
+          </a:stretch>
+        </p:blipFill>
+        <p:spPr bwMode="auto">
+          <a:xfrm>
+            <a:off x="1371600" y="1371600"/>
+            <a:ext cx="7374772" cy="4880660"/>
+          </a:xfrm>
+          <a:prstGeom prst="rect">
+            <a:avLst/>
+          </a:prstGeom>
+          <a:ln>
+            <a:noFill/>
+          </a:ln>
+          <a:effectLst>
+            <a:outerShdw blurRad="292100" dist="139700" dir="2700000" algn="tl" rotWithShape="0">
+              <a:srgbClr xmlns:mc="http://schemas.openxmlformats.org/markup-compatibility/2006" xmlns:a14="http://schemas.microsoft.com/office/drawing/2010/main" val="333333" mc:Ignorable="">
+                <a:alpha val="65000"/>
+              </a:srgbClr>
+            </a:outerShdw>
+          </a:effectLst>
+          <a:extLst>
+            <a:ext uri="{909E8E84-426E-40DD-AFC4-6F175D3DCCD1}">
+              <a14:hiddenFill xmlns:a14="http://schemas.microsoft.com/office/drawing/2010/main">
+                <a:solidFill>
+                  <a:schemeClr val="accent1"/>
+                </a:solidFill>
+              </a14:hiddenFill>
+            </a:ext>
+            <a:ext uri="{91240B29-F687-4F45-9708-019B960494DF}">
+              <a14:hiddenLine xmlns:a14="http://schemas.microsoft.com/office/drawing/2010/main" w="9525">
+                <a:solidFill>
+                  <a:schemeClr val="tx1"/>
+                </a:solidFill>
+                <a:miter lim="800000"/>
+                <a:headEnd/>
+                <a:tailEnd/>
+              </a14:hiddenLine>
+            </a:ext>
+            <a:ext uri="{AF507438-7753-43E0-B8FC-AC1667EBCBE1}">
+              <a14:hiddenEffects xmlns:a14="http://schemas.microsoft.com/office/drawing/2010/main">
+                <a:effectLst>
+                  <a:outerShdw dist="35921" dir="2700000" algn="ctr" rotWithShape="0">
+                    <a:schemeClr val="bg2"/>
+                  </a:outerShdw>
+                </a:effectLst>
+              </a14:hiddenEffects>
+            </a:ext>
+          </a:extLst>
+        </p:spPr>
+      </p:pic>
+    </p:spTree>
+    <p:extLst>
+      <p:ext uri="{BB962C8B-B14F-4D97-AF65-F5344CB8AC3E}">
+        <p14:creationId xmlns:p14="http://schemas.microsoft.com/office/powerpoint/2010/main" val="2312915348"/>
+      </p:ext>
+    </p:extLst>
+  </p:cSld>
+  <p:clrMapOvr>
+    <a:masterClrMapping/>
+  </p:clrMapOvr>
+  <mc:AlternateContent xmlns:mc="http://schemas.openxmlformats.org/markup-compatibility/2006">
+    <mc:Choice xmlns:p14="http://schemas.microsoft.com/office/powerpoint/2010/main" Requires="p14">
+      <p:transition spd="slow" p14:dur="1200">
+        <p14:prism/>
+      </p:transition>
+    </mc:Choice>
+    <mc:Fallback>
+      <p:transition xmlns:p14="http://schemas.microsoft.com/office/powerpoint/2010/main" spd="slow">
+        <p:fade/>
+      </p:transition>
+    </mc:Fallback>
+  </mc:AlternateContent>
+  <p:timing>
+    <p:tnLst>
+      <p:par>
+        <p:cTn xmlns:p14="http://schemas.microsoft.com/office/powerpoint/2010/main" id="1" dur="indefinite" restart="never" nodeType="tmRoot"/>
+      </p:par>
+    </p:tnLst>
+  </p:timing>
+</p:sld>
+</file>
+
+<file path=ppt/slides/slide14.xml><?xml version="1.0" encoding="utf-8"?>
+<p:sld xmlns:a="http://schemas.openxmlformats.org/drawingml/2006/main" xmlns:r="http://schemas.openxmlformats.org/officeDocument/2006/relationships" xmlns:p="http://schemas.openxmlformats.org/presentationml/2006/main">
+  <p:cSld>
+    <p:spTree>
+      <p:nvGrpSpPr>
+        <p:cNvPr id="1" name=""/>
+        <p:cNvGrpSpPr/>
+        <p:nvPr/>
+      </p:nvGrpSpPr>
+      <p:grpSpPr>
+        <a:xfrm>
+          <a:off x="0" y="0"/>
+          <a:ext cx="0" cy="0"/>
+          <a:chOff x="0" y="0"/>
+          <a:chExt cx="0" cy="0"/>
+        </a:xfrm>
+      </p:grpSpPr>
+      <p:sp>
+        <p:nvSpPr>
+          <p:cNvPr id="2" name="Title 1"/>
+          <p:cNvSpPr>
+            <a:spLocks noGrp="1"/>
+          </p:cNvSpPr>
+          <p:nvPr>
+            <p:ph type="title"/>
+          </p:nvPr>
+        </p:nvSpPr>
+        <p:spPr/>
+        <p:txBody>
+          <a:bodyPr/>
+          <a:lstStyle/>
+          <a:p>
+            <a:r>
+              <a:rPr lang="en-US" dirty="0" smtClean="0"/>
               <a:t>Observations</a:t>
             </a:r>
             <a:endParaRPr lang="en-US" dirty="0"/>
@@ -10280,8 +10742,17 @@
           <a:p>
             <a:r>
               <a:rPr lang="en-US" dirty="0" smtClean="0"/>
-              <a:t>Parallel algorithm is faster than serial one.</a:t>
-            </a:r>
+              <a:t>A combination of MPI and </a:t>
+            </a:r>
+            <a:r>
+              <a:rPr lang="en-US" dirty="0" err="1" smtClean="0"/>
+              <a:t>openMP</a:t>
+            </a:r>
+            <a:r>
+              <a:rPr lang="en-US" dirty="0" smtClean="0"/>
+              <a:t> is the fastest.</a:t>
+            </a:r>
+            <a:endParaRPr lang="en-US" dirty="0" smtClean="0"/>
           </a:p>
           <a:p>
             <a:r>
@@ -10307,6 +10778,147 @@
   <p:transition xmlns:p14="http://schemas.microsoft.com/office/powerpoint/2010/main" spd="slow">
     <p:cover/>
   </p:transition>
+  <p:timing>
+    <p:tnLst>
+      <p:par>
+        <p:cTn xmlns:p14="http://schemas.microsoft.com/office/powerpoint/2010/main" id="1" dur="indefinite" restart="never" nodeType="tmRoot"/>
+      </p:par>
+    </p:tnLst>
+  </p:timing>
+</p:sld>
+</file>
+
+<file path=ppt/slides/slide15.xml><?xml version="1.0" encoding="utf-8"?>
+<p:sld xmlns:a="http://schemas.openxmlformats.org/drawingml/2006/main" xmlns:r="http://schemas.openxmlformats.org/officeDocument/2006/relationships" xmlns:p="http://schemas.openxmlformats.org/presentationml/2006/main">
+  <p:cSld>
+    <p:spTree>
+      <p:nvGrpSpPr>
+        <p:cNvPr id="1" name=""/>
+        <p:cNvGrpSpPr/>
+        <p:nvPr/>
+      </p:nvGrpSpPr>
+      <p:grpSpPr>
+        <a:xfrm>
+          <a:off x="0" y="0"/>
+          <a:ext cx="0" cy="0"/>
+          <a:chOff x="0" y="0"/>
+          <a:chExt cx="0" cy="0"/>
+        </a:xfrm>
+      </p:grpSpPr>
+      <p:sp>
+        <p:nvSpPr>
+          <p:cNvPr id="2" name="Title 1"/>
+          <p:cNvSpPr>
+            <a:spLocks noGrp="1"/>
+          </p:cNvSpPr>
+          <p:nvPr>
+            <p:ph type="title"/>
+          </p:nvPr>
+        </p:nvSpPr>
+        <p:spPr/>
+        <p:txBody>
+          <a:bodyPr/>
+          <a:lstStyle/>
+          <a:p>
+            <a:r>
+              <a:rPr lang="en-US" dirty="0" smtClean="0"/>
+              <a:t>Questions?</a:t>
+            </a:r>
+            <a:endParaRPr lang="en-US" dirty="0"/>
+          </a:p>
+        </p:txBody>
+      </p:sp>
+      <p:sp>
+        <p:nvSpPr>
+          <p:cNvPr id="3" name="Content Placeholder 2"/>
+          <p:cNvSpPr>
+            <a:spLocks noGrp="1"/>
+          </p:cNvSpPr>
+          <p:nvPr>
+            <p:ph idx="1"/>
+          </p:nvPr>
+        </p:nvSpPr>
+        <p:spPr/>
+        <p:txBody>
+          <a:bodyPr/>
+          <a:lstStyle/>
+          <a:p>
+            <a:endParaRPr lang="en-US" dirty="0" smtClean="0"/>
+          </a:p>
+          <a:p>
+            <a:endParaRPr lang="en-US" dirty="0"/>
+          </a:p>
+          <a:p>
+            <a:endParaRPr lang="en-US" dirty="0" smtClean="0"/>
+          </a:p>
+          <a:p>
+            <a:endParaRPr lang="en-US" dirty="0"/>
+          </a:p>
+        </p:txBody>
+      </p:sp>
+      <p:pic>
+        <p:nvPicPr>
+          <p:cNvPr id="6146" name="Picture 2" descr="C:\Users\james\AppData\Local\Microsoft\Windows\Temporary Internet Files\Content.IE5\E33OGCL1\MC900441523[1].wmf"/>
+          <p:cNvPicPr>
+            <a:picLocks noChangeAspect="1" noChangeArrowheads="1"/>
+          </p:cNvPicPr>
+          <p:nvPr/>
+        </p:nvPicPr>
+        <p:blipFill>
+          <a:blip r:embed="rId2" cstate="print">
+            <a:extLst>
+              <a:ext uri="{28A0092B-C50C-407E-A947-70E740481C1C}">
+                <a14:useLocalDpi xmlns:a14="http://schemas.microsoft.com/office/drawing/2010/main" val="0"/>
+              </a:ext>
+            </a:extLst>
+          </a:blip>
+          <a:srcRect/>
+          <a:stretch>
+            <a:fillRect/>
+          </a:stretch>
+        </p:blipFill>
+        <p:spPr bwMode="auto">
+          <a:xfrm>
+            <a:off x="3657600" y="2667000"/>
+            <a:ext cx="1873250" cy="1600200"/>
+          </a:xfrm>
+          <a:prstGeom prst="rect">
+            <a:avLst/>
+          </a:prstGeom>
+          <a:noFill/>
+          <a:extLst>
+            <a:ext uri="{909E8E84-426E-40DD-AFC4-6F175D3DCCD1}">
+              <a14:hiddenFill xmlns:a14="http://schemas.microsoft.com/office/drawing/2010/main">
+                <a:solidFill>
+                  <a:srgbClr xmlns:mc="http://schemas.openxmlformats.org/markup-compatibility/2006" val="FFFFFF" mc:Ignorable=""/>
+                </a:solidFill>
+              </a14:hiddenFill>
+            </a:ext>
+          </a:extLst>
+        </p:spPr>
+      </p:pic>
+    </p:spTree>
+    <p:extLst>
+      <p:ext uri="{BB962C8B-B14F-4D97-AF65-F5344CB8AC3E}">
+        <p14:creationId xmlns:p14="http://schemas.microsoft.com/office/powerpoint/2010/main" val="215572060"/>
+      </p:ext>
+    </p:extLst>
+  </p:cSld>
+  <p:clrMapOvr>
+    <a:masterClrMapping/>
+  </p:clrMapOvr>
+  <mc:AlternateContent xmlns:mc="http://schemas.openxmlformats.org/markup-compatibility/2006">
+    <mc:Choice xmlns:p14="http://schemas.microsoft.com/office/powerpoint/2010/main" Requires="p14">
+      <p:transition spd="slow" p14:dur="1100">
+        <p14:switch dir="r"/>
+      </p:transition>
+    </mc:Choice>
+    <mc:Fallback>
+      <p:transition xmlns:p14="http://schemas.microsoft.com/office/powerpoint/2010/main" spd="slow">
+        <p:fade/>
+      </p:transition>
+    </mc:Fallback>
+  </mc:AlternateContent>
   <p:timing>
     <p:tnLst>
       <p:par>
@@ -11521,7 +12133,15 @@
             </a:r>
             <a:r>
               <a:rPr lang="en-US" dirty="0" smtClean="0"/>
-              <a:t> method reduces the number of multiplication operations to 7, not 8</a:t>
+              <a:t> method reduces the number of multiplication operations to 7, </a:t>
+            </a:r>
+            <a:r>
+              <a:rPr lang="en-US" dirty="0" smtClean="0"/>
+              <a:t>from </a:t>
+            </a:r>
+            <a:r>
+              <a:rPr lang="en-US" dirty="0" smtClean="0"/>
+              <a:t>8</a:t>
             </a:r>
           </a:p>
           <a:p>
@@ -11931,7 +12551,15 @@
           <a:p>
             <a:r>
               <a:rPr lang="en-US" dirty="0" smtClean="0"/>
-              <a:t>Used 1, 2 and 4 threads</a:t>
+              <a:t>Used 1, </a:t>
+            </a:r>
+            <a:r>
+              <a:rPr lang="en-US" dirty="0" smtClean="0"/>
+              <a:t>2, 3 and </a:t>
+            </a:r>
+            <a:r>
+              <a:rPr lang="en-US" dirty="0" smtClean="0"/>
+              <a:t>4 threads</a:t>
             </a:r>
           </a:p>
           <a:p>
@@ -12013,6 +12641,132 @@
           <a:lstStyle/>
           <a:p>
             <a:r>
+              <a:rPr lang="en-US" dirty="0" err="1" smtClean="0"/>
+              <a:t>OpenMPI</a:t>
+            </a:r>
+            <a:r>
+              <a:rPr lang="en-US" dirty="0" smtClean="0"/>
+              <a:t> Implementation</a:t>
+            </a:r>
+            <a:endParaRPr lang="en-US" dirty="0"/>
+          </a:p>
+        </p:txBody>
+      </p:sp>
+      <p:sp>
+        <p:nvSpPr>
+          <p:cNvPr id="3" name="Content Placeholder 2"/>
+          <p:cNvSpPr>
+            <a:spLocks noGrp="1"/>
+          </p:cNvSpPr>
+          <p:nvPr>
+            <p:ph idx="1"/>
+          </p:nvPr>
+        </p:nvSpPr>
+        <p:spPr/>
+        <p:txBody>
+          <a:bodyPr/>
+          <a:lstStyle/>
+          <a:p>
+            <a:r>
+              <a:rPr lang="en-US" dirty="0" smtClean="0"/>
+              <a:t>An extension of the </a:t>
+            </a:r>
+            <a:r>
+              <a:rPr lang="en-US" dirty="0" err="1" smtClean="0"/>
+              <a:t>openMP</a:t>
+            </a:r>
+            <a:r>
+              <a:rPr lang="en-US" dirty="0" smtClean="0"/>
+              <a:t> implementation</a:t>
+            </a:r>
+          </a:p>
+          <a:p>
+            <a:r>
+              <a:rPr lang="en-US" dirty="0" smtClean="0"/>
+              <a:t>First round of the recursive process carried out in 7 processes.</a:t>
+            </a:r>
+          </a:p>
+          <a:p>
+            <a:r>
+              <a:rPr lang="en-US" dirty="0" smtClean="0"/>
+              <a:t>Combined with </a:t>
+            </a:r>
+            <a:r>
+              <a:rPr lang="en-US" dirty="0" err="1" smtClean="0"/>
+              <a:t>openMP</a:t>
+            </a:r>
+            <a:r>
+              <a:rPr lang="en-US" dirty="0" smtClean="0"/>
+              <a:t> to speed up  iterative loops</a:t>
+            </a:r>
+          </a:p>
+        </p:txBody>
+      </p:sp>
+    </p:spTree>
+    <p:extLst>
+      <p:ext uri="{BB962C8B-B14F-4D97-AF65-F5344CB8AC3E}">
+        <p14:creationId xmlns:p14="http://schemas.microsoft.com/office/powerpoint/2010/main" val="3487181511"/>
+      </p:ext>
+    </p:extLst>
+  </p:cSld>
+  <p:clrMapOvr>
+    <a:masterClrMapping/>
+  </p:clrMapOvr>
+  <mc:AlternateContent xmlns:mc="http://schemas.openxmlformats.org/markup-compatibility/2006">
+    <mc:Choice xmlns:p14="http://schemas.microsoft.com/office/powerpoint/2010/main" Requires="p14">
+      <p:transition spd="slow" p14:dur="1600">
+        <p14:gallery dir="l"/>
+      </p:transition>
+    </mc:Choice>
+    <mc:Fallback>
+      <p:transition xmlns:p14="http://schemas.microsoft.com/office/powerpoint/2010/main" spd="slow">
+        <p:fade/>
+      </p:transition>
+    </mc:Fallback>
+  </mc:AlternateContent>
+  <p:timing>
+    <p:tnLst>
+      <p:par>
+        <p:cTn xmlns:p14="http://schemas.microsoft.com/office/powerpoint/2010/main" id="1" dur="indefinite" restart="never" nodeType="tmRoot"/>
+      </p:par>
+    </p:tnLst>
+  </p:timing>
+</p:sld>
+</file>
+
+<file path=ppt/slides/slide8.xml><?xml version="1.0" encoding="utf-8"?>
+<p:sld xmlns:a="http://schemas.openxmlformats.org/drawingml/2006/main" xmlns:r="http://schemas.openxmlformats.org/officeDocument/2006/relationships" xmlns:p="http://schemas.openxmlformats.org/presentationml/2006/main">
+  <p:cSld>
+    <p:spTree>
+      <p:nvGrpSpPr>
+        <p:cNvPr id="1" name=""/>
+        <p:cNvGrpSpPr/>
+        <p:nvPr/>
+      </p:nvGrpSpPr>
+      <p:grpSpPr>
+        <a:xfrm>
+          <a:off x="0" y="0"/>
+          <a:ext cx="0" cy="0"/>
+          <a:chOff x="0" y="0"/>
+          <a:chExt cx="0" cy="0"/>
+        </a:xfrm>
+      </p:grpSpPr>
+      <p:sp>
+        <p:nvSpPr>
+          <p:cNvPr id="2" name="Title 1"/>
+          <p:cNvSpPr>
+            <a:spLocks noGrp="1"/>
+          </p:cNvSpPr>
+          <p:nvPr>
+            <p:ph type="title"/>
+          </p:nvPr>
+        </p:nvSpPr>
+        <p:spPr/>
+        <p:txBody>
+          <a:bodyPr/>
+          <a:lstStyle/>
+          <a:p>
+            <a:r>
               <a:rPr lang="en-US" dirty="0" smtClean="0"/>
               <a:t>Recursive Function</a:t>
             </a:r>
@@ -12077,7 +12831,7 @@
 </p:sld>
 </file>
 
-<file path=ppt/slides/slide8.xml><?xml version="1.0" encoding="utf-8"?>
+<file path=ppt/slides/slide9.xml><?xml version="1.0" encoding="utf-8"?>
 <p:sld xmlns:a="http://schemas.openxmlformats.org/drawingml/2006/main" xmlns:r="http://schemas.openxmlformats.org/officeDocument/2006/relationships" xmlns:p="http://schemas.openxmlformats.org/presentationml/2006/main">
   <p:cSld>
     <p:spTree>
@@ -12113,7 +12867,7 @@
           <a:p>
             <a:r>
               <a:rPr lang="en-US" dirty="0" smtClean="0"/>
-              <a:t>Results</a:t>
+              <a:t>Results: Triple loop</a:t>
             </a:r>
             <a:endParaRPr lang="en-US" dirty="0"/>
           </a:p>
@@ -12121,7 +12875,7 @@
       </p:sp>
       <p:pic>
         <p:nvPicPr>
-          <p:cNvPr id="1026" name="Picture 2"/>
+          <p:cNvPr id="3" name="Picture 2"/>
           <p:cNvPicPr>
             <a:picLocks noChangeAspect="1" noChangeArrowheads="1"/>
           </p:cNvPicPr>
@@ -12142,8 +12896,8 @@
         </p:blipFill>
         <p:spPr bwMode="auto">
           <a:xfrm>
-            <a:off x="1143000" y="1219200"/>
-            <a:ext cx="7292353" cy="4914900"/>
+            <a:off x="1295400" y="1219200"/>
+            <a:ext cx="7455964" cy="5056188"/>
           </a:xfrm>
           <a:prstGeom prst="rect">
             <a:avLst/>
@@ -12176,6 +12930,15 @@
                 <a:tailEnd/>
               </a14:hiddenLine>
             </a:ext>
+            <a:ext uri="{AF507438-7753-43E0-B8FC-AC1667EBCBE1}">
+              <a14:hiddenEffects xmlns:a14="http://schemas.microsoft.com/office/drawing/2010/main">
+                <a:effectLst>
+                  <a:outerShdw dist="35921" dir="2700000" algn="ctr" rotWithShape="0">
+                    <a:schemeClr val="bg2"/>
+                  </a:outerShdw>
+                </a:effectLst>
+              </a14:hiddenEffects>
+            </a:ext>
           </a:extLst>
         </p:spPr>
       </p:pic>
@@ -12189,145 +12952,13 @@
   <p:clrMapOvr>
     <a:masterClrMapping/>
   </p:clrMapOvr>
-  <mc:AlternateContent xmlns:mc="http://schemas.openxmlformats.org/markup-compatibility/2006" xmlns:p14="http://schemas.microsoft.com/office/powerpoint/2010/main">
-    <mc:Choice Requires="p14">
-      <p:transition spd="slow">
-        <p14:flash/>
+  <mc:AlternateContent xmlns:mc="http://schemas.openxmlformats.org/markup-compatibility/2006">
+    <mc:Choice xmlns:p14="http://schemas.microsoft.com/office/powerpoint/2010/main" Requires="p14">
+      <p:transition spd="slow" p14:dur="2000">
+        <p14:prism isContent="1"/>
       </p:transition>
     </mc:Choice>
-    <mc:Fallback xmlns="">
-      <p:transition xmlns:p14="http://schemas.microsoft.com/office/powerpoint/2010/main" spd="slow">
-        <p:fade/>
-      </p:transition>
-    </mc:Fallback>
-  </mc:AlternateContent>
-  <p:timing>
-    <p:tnLst>
-      <p:par>
-        <p:cTn xmlns:p14="http://schemas.microsoft.com/office/powerpoint/2010/main" id="1" dur="indefinite" restart="never" nodeType="tmRoot"/>
-      </p:par>
-    </p:tnLst>
-  </p:timing>
-</p:sld>
-</file>
-
-<file path=ppt/slides/slide9.xml><?xml version="1.0" encoding="utf-8"?>
-<p:sld xmlns:a="http://schemas.openxmlformats.org/drawingml/2006/main" xmlns:r="http://schemas.openxmlformats.org/officeDocument/2006/relationships" xmlns:p="http://schemas.openxmlformats.org/presentationml/2006/main">
-  <p:cSld>
-    <p:spTree>
-      <p:nvGrpSpPr>
-        <p:cNvPr id="1" name=""/>
-        <p:cNvGrpSpPr/>
-        <p:nvPr/>
-      </p:nvGrpSpPr>
-      <p:grpSpPr>
-        <a:xfrm>
-          <a:off x="0" y="0"/>
-          <a:ext cx="0" cy="0"/>
-          <a:chOff x="0" y="0"/>
-          <a:chExt cx="0" cy="0"/>
-        </a:xfrm>
-      </p:grpSpPr>
-      <p:sp>
-        <p:nvSpPr>
-          <p:cNvPr id="2" name="Title 1"/>
-          <p:cNvSpPr>
-            <a:spLocks noGrp="1"/>
-          </p:cNvSpPr>
-          <p:nvPr>
-            <p:ph type="title"/>
-          </p:nvPr>
-        </p:nvSpPr>
-        <p:spPr/>
-        <p:txBody>
-          <a:bodyPr/>
-          <a:lstStyle/>
-          <a:p>
-            <a:r>
-              <a:rPr lang="en-US" dirty="0" smtClean="0"/>
-              <a:t>Results, Multi-threaded</a:t>
-            </a:r>
-            <a:endParaRPr lang="en-US" dirty="0"/>
-          </a:p>
-        </p:txBody>
-      </p:sp>
-      <p:pic>
-        <p:nvPicPr>
-          <p:cNvPr id="2050" name="Picture 2"/>
-          <p:cNvPicPr>
-            <a:picLocks noChangeAspect="1" noChangeArrowheads="1"/>
-          </p:cNvPicPr>
-          <p:nvPr/>
-        </p:nvPicPr>
-        <p:blipFill>
-          <a:blip r:embed="rId2">
-            <a:extLst>
-              <a:ext uri="{28A0092B-C50C-407E-A947-70E740481C1C}">
-                <a14:useLocalDpi xmlns:a14="http://schemas.microsoft.com/office/drawing/2010/main" val="0"/>
-              </a:ext>
-            </a:extLst>
-          </a:blip>
-          <a:srcRect/>
-          <a:stretch>
-            <a:fillRect/>
-          </a:stretch>
-        </p:blipFill>
-        <p:spPr bwMode="auto">
-          <a:xfrm>
-            <a:off x="1295400" y="1295400"/>
-            <a:ext cx="6967538" cy="4766333"/>
-          </a:xfrm>
-          <a:prstGeom prst="rect">
-            <a:avLst/>
-          </a:prstGeom>
-          <a:ln>
-            <a:noFill/>
-          </a:ln>
-          <a:effectLst>
-            <a:outerShdw blurRad="292100" dist="139700" dir="2700000" algn="tl" rotWithShape="0">
-              <a:srgbClr xmlns:mc="http://schemas.openxmlformats.org/markup-compatibility/2006" xmlns:a14="http://schemas.microsoft.com/office/drawing/2010/main" val="333333" mc:Ignorable="">
-                <a:alpha val="65000"/>
-              </a:srgbClr>
-            </a:outerShdw>
-          </a:effectLst>
-          <a:extLst>
-            <a:ext uri="{909E8E84-426E-40DD-AFC4-6F175D3DCCD1}">
-              <a14:hiddenFill xmlns:a14="http://schemas.microsoft.com/office/drawing/2010/main">
-                <a:solidFill>
-                  <a:schemeClr val="accent1"/>
-                </a:solidFill>
-              </a14:hiddenFill>
-            </a:ext>
-            <a:ext uri="{91240B29-F687-4F45-9708-019B960494DF}">
-              <a14:hiddenLine xmlns:a14="http://schemas.microsoft.com/office/drawing/2010/main" w="9525">
-                <a:solidFill>
-                  <a:schemeClr val="tx1"/>
-                </a:solidFill>
-                <a:miter lim="800000"/>
-                <a:headEnd/>
-                <a:tailEnd/>
-              </a14:hiddenLine>
-            </a:ext>
-          </a:extLst>
-        </p:spPr>
-      </p:pic>
-    </p:spTree>
-    <p:extLst>
-      <p:ext uri="{BB962C8B-B14F-4D97-AF65-F5344CB8AC3E}">
-        <p14:creationId xmlns:p14="http://schemas.microsoft.com/office/powerpoint/2010/main" val="1287284576"/>
-      </p:ext>
-    </p:extLst>
-  </p:cSld>
-  <p:clrMapOvr>
-    <a:masterClrMapping/>
-  </p:clrMapOvr>
-  <mc:AlternateContent xmlns:mc="http://schemas.openxmlformats.org/markup-compatibility/2006" xmlns:p14="http://schemas.microsoft.com/office/powerpoint/2010/main">
-    <mc:Choice Requires="p14">
-      <p:transition spd="slow">
-        <p14:flash/>
-      </p:transition>
-    </mc:Choice>
-    <mc:Fallback xmlns="">
+    <mc:Fallback>
       <p:transition xmlns:p14="http://schemas.microsoft.com/office/powerpoint/2010/main" spd="slow">
         <p:fade/>
       </p:transition>

</xml_diff>